<commit_message>
add ping, change presentaion order
</commit_message>
<xml_diff>
--- a/raw socket & libpcap & icmp.pptx
+++ b/raw socket & libpcap & icmp.pptx
@@ -18,14 +18,14 @@
     <p:sldId id="265" r:id="rId9"/>
     <p:sldId id="258" r:id="rId10"/>
     <p:sldId id="266" r:id="rId11"/>
-    <p:sldId id="267" r:id="rId12"/>
-    <p:sldId id="268" r:id="rId13"/>
-    <p:sldId id="269" r:id="rId14"/>
-    <p:sldId id="270" r:id="rId15"/>
-    <p:sldId id="271" r:id="rId16"/>
-    <p:sldId id="275" r:id="rId17"/>
-    <p:sldId id="273" r:id="rId18"/>
-    <p:sldId id="274" r:id="rId19"/>
+    <p:sldId id="275" r:id="rId12"/>
+    <p:sldId id="267" r:id="rId13"/>
+    <p:sldId id="270" r:id="rId14"/>
+    <p:sldId id="271" r:id="rId15"/>
+    <p:sldId id="268" r:id="rId16"/>
+    <p:sldId id="269" r:id="rId17"/>
+    <p:sldId id="274" r:id="rId18"/>
+    <p:sldId id="273" r:id="rId19"/>
     <p:sldId id="264" r:id="rId20"/>
   </p:sldIdLst>
   <p:sldSz cx="12192000" cy="6858000"/>
@@ -215,7 +215,7 @@
           <a:p>
             <a:fld id="{AF8E52BD-695E-44A2-AB0A-5B021781A95B}" type="datetimeFigureOut">
               <a:rPr lang="en-US" smtClean="0"/>
-              <a:t>7/26/2019</a:t>
+              <a:t>2019-08-03</a:t>
             </a:fld>
             <a:endParaRPr lang="en-US"/>
           </a:p>
@@ -529,75 +529,105 @@
             <a:pPr algn="r" rtl="1"/>
             <a:r>
               <a:rPr lang="he-IL" dirty="0"/>
-              <a:t>עשוי להגיע מה-</a:t>
+              <a:t>ה-</a:t>
             </a:r>
             <a:r>
               <a:rPr lang="en-US" dirty="0"/>
-              <a:t>gateway</a:t>
+              <a:t>data</a:t>
             </a:r>
             <a:r>
               <a:rPr lang="he-IL" dirty="0"/>
-              <a:t> אם הוא מזהה שהיעד לא ברשת, או משרת היעד עצמו אם הוא לא מסוגל לשלוח חזרה הודעות (לדוגמא, פורט לא פעיל).</a:t>
-            </a:r>
+              <a:t> שנשלח ב-</a:t>
+            </a:r>
+            <a:r>
+              <a:rPr lang="en-US" dirty="0"/>
+              <a:t>echo</a:t>
+            </a:r>
+            <a:r>
+              <a:rPr lang="he-IL" dirty="0"/>
+              <a:t> חייב להיות מוחזר ב-</a:t>
+            </a:r>
+            <a:r>
+              <a:rPr lang="en-US" dirty="0"/>
+              <a:t>echo reply</a:t>
+            </a:r>
+            <a:br>
+              <a:rPr lang="en-US" dirty="0"/>
+            </a:br>
+            <a:endParaRPr lang="he-IL" dirty="0"/>
           </a:p>
           <a:p>
             <a:pPr algn="r" rtl="1"/>
             <a:r>
+              <a:rPr lang="en-US" dirty="0"/>
+              <a:t>Identifier</a:t>
+            </a:r>
+            <a:r>
               <a:rPr lang="he-IL" dirty="0"/>
-              <a:t>מקרה נוסף – </a:t>
-            </a:r>
-            <a:r>
-              <a:rPr lang="he-IL" dirty="0" err="1"/>
-              <a:t>כשהפקטה</a:t>
+              <a:t> ו-</a:t>
+            </a:r>
+            <a:r>
+              <a:rPr lang="en-US" dirty="0"/>
+              <a:t>sequence</a:t>
             </a:r>
             <a:r>
               <a:rPr lang="he-IL" dirty="0"/>
-              <a:t> היא </a:t>
-            </a:r>
-            <a:r>
-              <a:rPr lang="en-US" dirty="0" err="1"/>
-              <a:t>fragmanted</a:t>
+              <a:t> = נועדו לעזור למקבל להתאים בין </a:t>
+            </a:r>
+            <a:r>
+              <a:rPr lang="en-US" dirty="0"/>
+              <a:t>echo</a:t>
             </a:r>
             <a:r>
               <a:rPr lang="he-IL" dirty="0"/>
-              <a:t> אבל הפלאג של </a:t>
+              <a:t> ל-</a:t>
             </a:r>
             <a:r>
               <a:rPr lang="en-US" dirty="0"/>
-              <a:t>Don’t Fragment</a:t>
+              <a:t>reply</a:t>
             </a:r>
             <a:r>
               <a:rPr lang="he-IL" dirty="0"/>
-              <a:t> דולק – ה</a:t>
+              <a:t>. </a:t>
+            </a:r>
+          </a:p>
+          <a:p>
+            <a:pPr algn="r" rtl="1"/>
+            <a:r>
+              <a:rPr lang="he-IL" dirty="0"/>
+              <a:t>למשל, </a:t>
             </a:r>
             <a:r>
               <a:rPr lang="en-US" dirty="0"/>
-              <a:t>gateway</a:t>
+              <a:t>identifier</a:t>
             </a:r>
             <a:r>
               <a:rPr lang="he-IL" dirty="0"/>
-              <a:t> יהיה חייב להחזיר </a:t>
+              <a:t> שיהיה כמו פורט ו-</a:t>
             </a:r>
             <a:r>
               <a:rPr lang="en-US" dirty="0"/>
-              <a:t>destination unreachable</a:t>
+              <a:t>sequence</a:t>
             </a:r>
             <a:r>
               <a:rPr lang="he-IL" dirty="0"/>
-              <a:t>.</a:t>
+              <a:t> שיעלה ב-1 עם כל בקשת </a:t>
+            </a:r>
+            <a:r>
+              <a:rPr lang="en-US" dirty="0"/>
+              <a:t>echo</a:t>
+            </a:r>
+            <a:r>
+              <a:rPr lang="he-IL" dirty="0"/>
+              <a:t> שנשלחה.</a:t>
             </a:r>
           </a:p>
           <a:p>
             <a:pPr algn="r" rtl="1"/>
-            <a:endParaRPr lang="he-IL" dirty="0"/>
-          </a:p>
-          <a:p>
-            <a:pPr algn="r" rtl="1"/>
-            <a:r>
-              <a:rPr lang="en-US" dirty="0"/>
-              <a:t>Codes 0, 1, 4, and 5 may be received from a gateway. Codes 2 and 3 may be received from a host.</a:t>
-            </a:r>
-            <a:endParaRPr lang="he-IL" dirty="0"/>
+            <a:r>
+              <a:rPr lang="he-IL" dirty="0"/>
+              <a:t>המחשב שעונה מחזיר את אותם הערכים כמו השולח.</a:t>
+            </a:r>
           </a:p>
           <a:p>
             <a:pPr algn="r" rtl="1"/>
@@ -631,7 +661,7 @@
     </p:spTree>
     <p:extLst>
       <p:ext uri="{BB962C8B-B14F-4D97-AF65-F5344CB8AC3E}">
-        <p14:creationId xmlns:p14="http://schemas.microsoft.com/office/powerpoint/2010/main" val="2684915426"/>
+        <p14:creationId xmlns:p14="http://schemas.microsoft.com/office/powerpoint/2010/main" val="3692536669"/>
       </p:ext>
     </p:extLst>
   </p:cSld>
@@ -688,15 +718,7 @@
             <a:pPr algn="r" rtl="1"/>
             <a:r>
               <a:rPr lang="he-IL" dirty="0"/>
-              <a:t>0 – נגמר ה-</a:t>
-            </a:r>
-            <a:r>
-              <a:rPr lang="en-US" dirty="0"/>
-              <a:t>TTL</a:t>
-            </a:r>
-            <a:r>
-              <a:rPr lang="he-IL" dirty="0"/>
-              <a:t> (מתגלה ע"י ה-</a:t>
+              <a:t>עשוי להגיע מה-</a:t>
             </a:r>
             <a:r>
               <a:rPr lang="en-US" dirty="0"/>
@@ -704,23 +726,70 @@
             </a:r>
             <a:r>
               <a:rPr lang="he-IL" dirty="0"/>
-              <a:t>).</a:t>
+              <a:t> אם הוא מזהה שהיעד לא ברשת, או משרת היעד עצמו אם הוא לא מסוגל לשלוח חזרה הודעות (לדוגמא, פורט לא פעיל).</a:t>
             </a:r>
           </a:p>
           <a:p>
             <a:pPr algn="r" rtl="1"/>
             <a:r>
               <a:rPr lang="he-IL" dirty="0"/>
-              <a:t>1 – לא התקבלו ב-</a:t>
+              <a:t>מקרה נוסף – </a:t>
+            </a:r>
+            <a:r>
+              <a:rPr lang="he-IL" dirty="0" err="1"/>
+              <a:t>כשהפקטה</a:t>
+            </a:r>
+            <a:r>
+              <a:rPr lang="he-IL" dirty="0"/>
+              <a:t> היא </a:t>
+            </a:r>
+            <a:r>
+              <a:rPr lang="en-US" dirty="0" err="1"/>
+              <a:t>fragmanted</a:t>
+            </a:r>
+            <a:r>
+              <a:rPr lang="he-IL" dirty="0"/>
+              <a:t> אבל הפלאג של </a:t>
             </a:r>
             <a:r>
               <a:rPr lang="en-US" dirty="0"/>
-              <a:t>host</a:t>
+              <a:t>Don’t Fragment</a:t>
             </a:r>
             <a:r>
               <a:rPr lang="he-IL" dirty="0"/>
-              <a:t> כל הפרגמנטים שהיו אמורים להגיע.</a:t>
-            </a:r>
+              <a:t> דולק – ה</a:t>
+            </a:r>
+            <a:r>
+              <a:rPr lang="en-US" dirty="0"/>
+              <a:t>gateway</a:t>
+            </a:r>
+            <a:r>
+              <a:rPr lang="he-IL" dirty="0"/>
+              <a:t> יהיה חייב להחזיר </a:t>
+            </a:r>
+            <a:r>
+              <a:rPr lang="en-US" dirty="0"/>
+              <a:t>destination unreachable</a:t>
+            </a:r>
+            <a:r>
+              <a:rPr lang="he-IL" dirty="0"/>
+              <a:t>.</a:t>
+            </a:r>
+          </a:p>
+          <a:p>
+            <a:pPr algn="r" rtl="1"/>
+            <a:endParaRPr lang="he-IL" dirty="0"/>
+          </a:p>
+          <a:p>
+            <a:pPr algn="r" rtl="1"/>
+            <a:r>
+              <a:rPr lang="en-US" dirty="0"/>
+              <a:t>Codes 0, 1, 4, and 5 may be received from a gateway. Codes 2 and 3 may be received from a host.</a:t>
+            </a:r>
+            <a:endParaRPr lang="he-IL" dirty="0"/>
+          </a:p>
+          <a:p>
+            <a:pPr algn="r" rtl="1"/>
             <a:endParaRPr lang="en-US" dirty="0"/>
           </a:p>
         </p:txBody>
@@ -751,7 +820,7 @@
     </p:spTree>
     <p:extLst>
       <p:ext uri="{BB962C8B-B14F-4D97-AF65-F5344CB8AC3E}">
-        <p14:creationId xmlns:p14="http://schemas.microsoft.com/office/powerpoint/2010/main" val="11729879"/>
+        <p14:creationId xmlns:p14="http://schemas.microsoft.com/office/powerpoint/2010/main" val="2684915426"/>
       </p:ext>
     </p:extLst>
   </p:cSld>
@@ -807,20 +876,46 @@
           <a:p>
             <a:pPr algn="r" rtl="1"/>
             <a:r>
-              <a:rPr lang="en-US" dirty="0"/>
-              <a:t>Pointer</a:t>
-            </a:r>
-            <a:r>
               <a:rPr lang="he-IL" dirty="0"/>
-              <a:t> = אם הקוד היה 0, זה מציין את המיקום של השגיאה </a:t>
-            </a:r>
-            <a:r>
-              <a:rPr lang="he-IL" dirty="0" err="1"/>
-              <a:t>בפקטה</a:t>
-            </a:r>
-            <a:r>
-              <a:rPr lang="he-IL" dirty="0"/>
-              <a:t> שנשלחה.</a:t>
+              <a:t>בקשה להאטה בקצב השידור</a:t>
+            </a:r>
+          </a:p>
+          <a:p>
+            <a:pPr algn="r" rtl="1"/>
+            <a:r>
+              <a:rPr lang="he-IL" baseline="0" dirty="0"/>
+              <a:t>יכול להישלח </a:t>
+            </a:r>
+            <a:r>
+              <a:rPr lang="he-IL" baseline="0" dirty="0" err="1"/>
+              <a:t>מראוטר</a:t>
+            </a:r>
+            <a:r>
+              <a:rPr lang="he-IL" baseline="0" dirty="0"/>
+              <a:t> שמבאפר תעבורה ולא עומד בקצב/מ</a:t>
+            </a:r>
+            <a:r>
+              <a:rPr lang="en-US" baseline="0" dirty="0"/>
+              <a:t>host</a:t>
+            </a:r>
+            <a:r>
+              <a:rPr lang="he-IL" baseline="0" dirty="0"/>
+              <a:t> שמקבל תעבורה.</a:t>
+            </a:r>
+          </a:p>
+          <a:p>
+            <a:pPr algn="r" rtl="1"/>
+            <a:r>
+              <a:rPr lang="he-IL" baseline="0" dirty="0"/>
+              <a:t>אפשר לשלוח את הבקשה הזאת לפני שנגמר המקום בחלון הקבלה ולפני שמתחילים להפיל </a:t>
+            </a:r>
+            <a:r>
+              <a:rPr lang="he-IL" baseline="0" dirty="0" err="1"/>
+              <a:t>פקטות</a:t>
+            </a:r>
+            <a:r>
+              <a:rPr lang="he-IL" baseline="0" dirty="0"/>
+              <a:t>.</a:t>
             </a:r>
             <a:endParaRPr lang="en-US" dirty="0"/>
           </a:p>
@@ -852,7 +947,7 @@
     </p:spTree>
     <p:extLst>
       <p:ext uri="{BB962C8B-B14F-4D97-AF65-F5344CB8AC3E}">
-        <p14:creationId xmlns:p14="http://schemas.microsoft.com/office/powerpoint/2010/main" val="2335080506"/>
+        <p14:creationId xmlns:p14="http://schemas.microsoft.com/office/powerpoint/2010/main" val="488932342"/>
       </p:ext>
     </p:extLst>
   </p:cSld>
@@ -908,42 +1003,154 @@
           <a:p>
             <a:pPr algn="r" rtl="1"/>
             <a:r>
+              <a:rPr lang="he-IL" dirty="0" err="1"/>
+              <a:t>ראוטר</a:t>
+            </a:r>
+            <a:r>
               <a:rPr lang="he-IL" dirty="0"/>
-              <a:t>בקשה להאטה בקצב השידור</a:t>
+              <a:t> (</a:t>
+            </a:r>
+            <a:r>
+              <a:rPr lang="en-US" dirty="0"/>
+              <a:t>G1</a:t>
+            </a:r>
+            <a:r>
+              <a:rPr lang="he-IL" dirty="0"/>
+              <a:t>) מקבל </a:t>
+            </a:r>
+            <a:r>
+              <a:rPr lang="he-IL" dirty="0" err="1"/>
+              <a:t>פקטה</a:t>
+            </a:r>
+            <a:r>
+              <a:rPr lang="he-IL" dirty="0"/>
+              <a:t> ובודק</a:t>
+            </a:r>
+            <a:r>
+              <a:rPr lang="he-IL" baseline="0" dirty="0"/>
+              <a:t> לאן לפי ה</a:t>
+            </a:r>
+            <a:r>
+              <a:rPr lang="en-US" baseline="0" dirty="0"/>
+              <a:t>route table</a:t>
+            </a:r>
+            <a:r>
+              <a:rPr lang="he-IL" baseline="0" dirty="0"/>
+              <a:t> שלו הוא צריך לשלוח אותה (נניח </a:t>
+            </a:r>
+            <a:r>
+              <a:rPr lang="en-US" baseline="0" dirty="0"/>
+              <a:t>G2</a:t>
+            </a:r>
+            <a:r>
+              <a:rPr lang="he-IL" baseline="0" dirty="0"/>
+              <a:t>).</a:t>
             </a:r>
           </a:p>
           <a:p>
             <a:pPr algn="r" rtl="1"/>
             <a:r>
               <a:rPr lang="he-IL" baseline="0" dirty="0"/>
-              <a:t>יכול להישלח </a:t>
+              <a:t>אם </a:t>
+            </a:r>
+            <a:r>
+              <a:rPr lang="en-US" baseline="0" dirty="0"/>
+              <a:t>G2</a:t>
+            </a:r>
+            <a:r>
+              <a:rPr lang="he-IL" baseline="0" dirty="0"/>
+              <a:t> באותה רשת עם ה</a:t>
+            </a:r>
+            <a:r>
+              <a:rPr lang="en-US" baseline="0" dirty="0"/>
+              <a:t>sender</a:t>
+            </a:r>
+            <a:r>
+              <a:rPr lang="he-IL" baseline="0" dirty="0"/>
+              <a:t> אז </a:t>
             </a:r>
             <a:r>
               <a:rPr lang="he-IL" baseline="0" dirty="0" err="1"/>
-              <a:t>מראוטר</a:t>
+              <a:t>הראוטר</a:t>
             </a:r>
             <a:r>
               <a:rPr lang="he-IL" baseline="0" dirty="0"/>
-              <a:t> שמבאפר תעבורה ולא עומד בקצב/מ</a:t>
+              <a:t> שולח ל</a:t>
             </a:r>
             <a:r>
               <a:rPr lang="en-US" baseline="0" dirty="0"/>
-              <a:t>host</a:t>
+              <a:t>sender</a:t>
             </a:r>
             <a:r>
               <a:rPr lang="he-IL" baseline="0" dirty="0"/>
-              <a:t> שמקבל תעבורה.</a:t>
+              <a:t> את ה</a:t>
+            </a:r>
+            <a:r>
+              <a:rPr lang="en-US" baseline="0" dirty="0" err="1"/>
+              <a:t>rediret</a:t>
+            </a:r>
+            <a:r>
+              <a:rPr lang="en-US" baseline="0" dirty="0"/>
+              <a:t> message</a:t>
+            </a:r>
+            <a:r>
+              <a:rPr lang="he-IL" baseline="0" dirty="0"/>
+              <a:t> שאומר לו שיותר מהר לשלוח ל</a:t>
+            </a:r>
+            <a:r>
+              <a:rPr lang="en-US" baseline="0" dirty="0"/>
+              <a:t>G2</a:t>
+            </a:r>
+            <a:r>
+              <a:rPr lang="he-IL" baseline="0" dirty="0"/>
+              <a:t>.</a:t>
             </a:r>
           </a:p>
           <a:p>
             <a:pPr algn="r" rtl="1"/>
+            <a:endParaRPr lang="he-IL" baseline="0" dirty="0"/>
+          </a:p>
+          <a:p>
+            <a:pPr algn="r" rtl="1"/>
             <a:r>
               <a:rPr lang="he-IL" baseline="0" dirty="0"/>
-              <a:t>אפשר לשלוח את הבקשה הזאת לפני שנגמר המקום בחלון הקבלה ולפני שמתחילים להפיל </a:t>
+              <a:t>אם ברמת ה</a:t>
+            </a:r>
+            <a:r>
+              <a:rPr lang="en-US" baseline="0" dirty="0" err="1"/>
+              <a:t>ip</a:t>
+            </a:r>
+            <a:r>
+              <a:rPr lang="he-IL" baseline="0" dirty="0"/>
+              <a:t> דלוק ה</a:t>
+            </a:r>
+            <a:r>
+              <a:rPr lang="en-US" dirty="0"/>
+              <a:t>IP source route options</a:t>
+            </a:r>
+            <a:r>
+              <a:rPr lang="he-IL" dirty="0"/>
+              <a:t> אז </a:t>
+            </a:r>
+            <a:r>
+              <a:rPr lang="en-US" dirty="0"/>
+              <a:t>G1</a:t>
+            </a:r>
+            <a:r>
+              <a:rPr lang="he-IL" baseline="0" dirty="0"/>
+              <a:t> לא ישלח את ה</a:t>
+            </a:r>
+            <a:r>
+              <a:rPr lang="en-US" baseline="0" dirty="0"/>
+              <a:t>redirect</a:t>
+            </a:r>
+            <a:r>
+              <a:rPr lang="he-IL" baseline="0" dirty="0"/>
+              <a:t> גם אם יש דרך מהירה יותר לשלוח את </a:t>
             </a:r>
             <a:r>
               <a:rPr lang="he-IL" baseline="0" dirty="0" err="1"/>
-              <a:t>פקטות</a:t>
+              <a:t>הפקטה</a:t>
             </a:r>
             <a:r>
               <a:rPr lang="he-IL" baseline="0" dirty="0"/>
@@ -979,7 +1186,7 @@
     </p:spTree>
     <p:extLst>
       <p:ext uri="{BB962C8B-B14F-4D97-AF65-F5344CB8AC3E}">
-        <p14:creationId xmlns:p14="http://schemas.microsoft.com/office/powerpoint/2010/main" val="488932342"/>
+        <p14:creationId xmlns:p14="http://schemas.microsoft.com/office/powerpoint/2010/main" val="219854658"/>
       </p:ext>
     </p:extLst>
   </p:cSld>
@@ -1035,158 +1242,39 @@
           <a:p>
             <a:pPr algn="r" rtl="1"/>
             <a:r>
-              <a:rPr lang="he-IL" dirty="0" err="1"/>
-              <a:t>ראוטר</a:t>
-            </a:r>
-            <a:r>
               <a:rPr lang="he-IL" dirty="0"/>
-              <a:t> (</a:t>
+              <a:t>0 – נגמר ה-</a:t>
             </a:r>
             <a:r>
               <a:rPr lang="en-US" dirty="0"/>
-              <a:t>G1</a:t>
+              <a:t>TTL</a:t>
             </a:r>
             <a:r>
               <a:rPr lang="he-IL" dirty="0"/>
-              <a:t>) מקבל </a:t>
-            </a:r>
-            <a:r>
-              <a:rPr lang="he-IL" dirty="0" err="1"/>
-              <a:t>פקטה</a:t>
+              <a:t> (מתגלה ע"י ה-</a:t>
+            </a:r>
+            <a:r>
+              <a:rPr lang="en-US" dirty="0"/>
+              <a:t>gateway</a:t>
             </a:r>
             <a:r>
               <a:rPr lang="he-IL" dirty="0"/>
-              <a:t> ובודק</a:t>
-            </a:r>
-            <a:r>
-              <a:rPr lang="he-IL" baseline="0" dirty="0"/>
-              <a:t> לאן לפי ה</a:t>
-            </a:r>
-            <a:r>
-              <a:rPr lang="en-US" baseline="0" dirty="0"/>
-              <a:t>route table</a:t>
-            </a:r>
-            <a:r>
-              <a:rPr lang="he-IL" baseline="0" dirty="0"/>
-              <a:t> שלו הוא צריך לשלוח אותה (נניח </a:t>
-            </a:r>
-            <a:r>
-              <a:rPr lang="en-US" baseline="0" dirty="0"/>
-              <a:t>G2</a:t>
-            </a:r>
-            <a:r>
-              <a:rPr lang="he-IL" baseline="0" dirty="0"/>
               <a:t>).</a:t>
             </a:r>
           </a:p>
           <a:p>
             <a:pPr algn="r" rtl="1"/>
             <a:r>
-              <a:rPr lang="he-IL" baseline="0" dirty="0"/>
-              <a:t>אם </a:t>
-            </a:r>
-            <a:r>
-              <a:rPr lang="en-US" baseline="0" dirty="0"/>
-              <a:t>G2</a:t>
-            </a:r>
-            <a:r>
-              <a:rPr lang="he-IL" baseline="0" dirty="0"/>
-              <a:t> באותה רשת עם ה</a:t>
-            </a:r>
-            <a:r>
-              <a:rPr lang="en-US" baseline="0" dirty="0"/>
-              <a:t>sender</a:t>
-            </a:r>
-            <a:r>
-              <a:rPr lang="he-IL" baseline="0" dirty="0"/>
-              <a:t> אז </a:t>
-            </a:r>
-            <a:r>
-              <a:rPr lang="he-IL" baseline="0" dirty="0" err="1"/>
-              <a:t>הראוטר</a:t>
-            </a:r>
-            <a:r>
-              <a:rPr lang="he-IL" baseline="0" dirty="0"/>
-              <a:t> שולח ל</a:t>
-            </a:r>
-            <a:r>
-              <a:rPr lang="en-US" baseline="0" dirty="0"/>
-              <a:t>sender</a:t>
-            </a:r>
-            <a:r>
-              <a:rPr lang="he-IL" baseline="0" dirty="0"/>
-              <a:t> את ה</a:t>
-            </a:r>
-            <a:r>
-              <a:rPr lang="en-US" baseline="0" dirty="0" err="1"/>
-              <a:t>rediret</a:t>
-            </a:r>
-            <a:r>
-              <a:rPr lang="en-US" baseline="0" dirty="0"/>
-              <a:t> message</a:t>
-            </a:r>
-            <a:r>
-              <a:rPr lang="he-IL" baseline="0" dirty="0"/>
-              <a:t> שאומר לו שיותר מהר לשלוח ל</a:t>
-            </a:r>
-            <a:r>
-              <a:rPr lang="en-US" baseline="0" dirty="0"/>
-              <a:t>G2</a:t>
-            </a:r>
-            <a:r>
-              <a:rPr lang="he-IL" baseline="0" dirty="0"/>
-              <a:t>.</a:t>
-            </a:r>
-          </a:p>
-          <a:p>
-            <a:pPr algn="r" rtl="1"/>
-            <a:endParaRPr lang="he-IL" baseline="0" dirty="0"/>
-          </a:p>
-          <a:p>
-            <a:pPr algn="r" rtl="1"/>
-            <a:r>
-              <a:rPr lang="he-IL" baseline="0" dirty="0"/>
-              <a:t>אם ברמת ה</a:t>
-            </a:r>
-            <a:r>
-              <a:rPr lang="en-US" baseline="0" dirty="0" err="1"/>
-              <a:t>ip</a:t>
-            </a:r>
-            <a:r>
-              <a:rPr lang="he-IL" baseline="0" dirty="0"/>
-              <a:t> דלוק ה</a:t>
+              <a:rPr lang="he-IL" dirty="0"/>
+              <a:t>1 – לא התקבלו ב-</a:t>
             </a:r>
             <a:r>
               <a:rPr lang="en-US" dirty="0"/>
-              <a:t>IP source route options</a:t>
+              <a:t>host</a:t>
             </a:r>
             <a:r>
               <a:rPr lang="he-IL" dirty="0"/>
-              <a:t> אז </a:t>
-            </a:r>
-            <a:r>
-              <a:rPr lang="en-US" dirty="0"/>
-              <a:t>G1</a:t>
-            </a:r>
-            <a:r>
-              <a:rPr lang="he-IL" baseline="0" dirty="0"/>
-              <a:t> לא ישלח את ה</a:t>
-            </a:r>
-            <a:r>
-              <a:rPr lang="en-US" baseline="0" dirty="0"/>
-              <a:t>redirect</a:t>
-            </a:r>
-            <a:r>
-              <a:rPr lang="he-IL" baseline="0" dirty="0"/>
-              <a:t> גם אם יש דרך מהירה יותר לשלוח את </a:t>
-            </a:r>
-            <a:r>
-              <a:rPr lang="he-IL" baseline="0" dirty="0" err="1"/>
-              <a:t>הפקטה</a:t>
-            </a:r>
-            <a:r>
-              <a:rPr lang="he-IL" baseline="0" dirty="0"/>
-              <a:t>.</a:t>
+              <a:t> כל הפרגמנטים שהיו אמורים להגיע.</a:t>
             </a:r>
             <a:endParaRPr lang="en-US" dirty="0"/>
           </a:p>
@@ -1218,7 +1306,7 @@
     </p:spTree>
     <p:extLst>
       <p:ext uri="{BB962C8B-B14F-4D97-AF65-F5344CB8AC3E}">
-        <p14:creationId xmlns:p14="http://schemas.microsoft.com/office/powerpoint/2010/main" val="219854658"/>
+        <p14:creationId xmlns:p14="http://schemas.microsoft.com/office/powerpoint/2010/main" val="11729879"/>
       </p:ext>
     </p:extLst>
   </p:cSld>
@@ -1274,109 +1362,21 @@
           <a:p>
             <a:pPr algn="r" rtl="1"/>
             <a:r>
+              <a:rPr lang="en-US" dirty="0"/>
+              <a:t>Pointer</a:t>
+            </a:r>
+            <a:r>
               <a:rPr lang="he-IL" dirty="0"/>
-              <a:t>ה-</a:t>
-            </a:r>
-            <a:r>
-              <a:rPr lang="en-US" dirty="0"/>
-              <a:t>data</a:t>
-            </a:r>
-            <a:r>
-              <a:rPr lang="he-IL" dirty="0"/>
-              <a:t> שנשלח ב-</a:t>
-            </a:r>
-            <a:r>
-              <a:rPr lang="en-US" dirty="0"/>
-              <a:t>echo</a:t>
-            </a:r>
-            <a:r>
-              <a:rPr lang="he-IL" dirty="0"/>
-              <a:t> חייב להיות מוחזר ב-</a:t>
-            </a:r>
-            <a:r>
-              <a:rPr lang="en-US" dirty="0"/>
-              <a:t>echo reply</a:t>
-            </a:r>
-            <a:br>
-              <a:rPr lang="en-US" dirty="0"/>
-            </a:br>
-            <a:endParaRPr lang="he-IL" dirty="0"/>
-          </a:p>
-          <a:p>
-            <a:pPr algn="r" rtl="1"/>
-            <a:r>
-              <a:rPr lang="en-US" dirty="0"/>
-              <a:t>Identifier</a:t>
-            </a:r>
-            <a:r>
-              <a:rPr lang="he-IL" dirty="0"/>
-              <a:t> ו-</a:t>
-            </a:r>
-            <a:r>
-              <a:rPr lang="en-US" dirty="0"/>
-              <a:t>sequence</a:t>
-            </a:r>
-            <a:r>
-              <a:rPr lang="he-IL" dirty="0"/>
-              <a:t> = נועדו לעזור למקבל להתאים בין </a:t>
-            </a:r>
-            <a:r>
-              <a:rPr lang="en-US" dirty="0"/>
-              <a:t>echo</a:t>
-            </a:r>
-            <a:r>
-              <a:rPr lang="he-IL" dirty="0"/>
-              <a:t> ל-</a:t>
-            </a:r>
-            <a:r>
-              <a:rPr lang="en-US" dirty="0"/>
-              <a:t>reply</a:t>
-            </a:r>
-            <a:r>
-              <a:rPr lang="he-IL" dirty="0"/>
-              <a:t>. </a:t>
-            </a:r>
-          </a:p>
-          <a:p>
-            <a:pPr algn="r" rtl="1"/>
-            <a:r>
-              <a:rPr lang="he-IL" dirty="0"/>
-              <a:t>למשל, </a:t>
-            </a:r>
-            <a:r>
-              <a:rPr lang="en-US" dirty="0"/>
-              <a:t>identifier</a:t>
-            </a:r>
-            <a:r>
-              <a:rPr lang="he-IL" dirty="0"/>
-              <a:t> שיהיה כמו פורט ו-</a:t>
-            </a:r>
-            <a:r>
-              <a:rPr lang="en-US" dirty="0"/>
-              <a:t>sequence</a:t>
-            </a:r>
-            <a:r>
-              <a:rPr lang="he-IL" dirty="0"/>
-              <a:t> שיעלה ב-1 עם כל בקשת </a:t>
-            </a:r>
-            <a:r>
-              <a:rPr lang="en-US" dirty="0"/>
-              <a:t>echo</a:t>
+              <a:t> = אם הקוד היה 0, זה מציין את המיקום של השגיאה </a:t>
+            </a:r>
+            <a:r>
+              <a:rPr lang="he-IL" dirty="0" err="1"/>
+              <a:t>בפקטה</a:t>
             </a:r>
             <a:r>
               <a:rPr lang="he-IL" dirty="0"/>
               <a:t> שנשלחה.</a:t>
             </a:r>
-          </a:p>
-          <a:p>
-            <a:pPr algn="r" rtl="1"/>
-            <a:r>
-              <a:rPr lang="he-IL" dirty="0"/>
-              <a:t>המחשב שעונה מחזיר את אותם הערכים כמו השולח.</a:t>
-            </a:r>
-          </a:p>
-          <a:p>
-            <a:pPr algn="r" rtl="1"/>
             <a:endParaRPr lang="en-US" dirty="0"/>
           </a:p>
         </p:txBody>
@@ -1407,7 +1407,7 @@
     </p:spTree>
     <p:extLst>
       <p:ext uri="{BB962C8B-B14F-4D97-AF65-F5344CB8AC3E}">
-        <p14:creationId xmlns:p14="http://schemas.microsoft.com/office/powerpoint/2010/main" val="3692536669"/>
+        <p14:creationId xmlns:p14="http://schemas.microsoft.com/office/powerpoint/2010/main" val="2335080506"/>
       </p:ext>
     </p:extLst>
   </p:cSld>
@@ -1461,46 +1461,132 @@
           <a:bodyPr/>
           <a:lstStyle/>
           <a:p>
-            <a:pPr algn="r" rtl="1"/>
+            <a:pPr marL="0" marR="0" indent="0" algn="r" defTabSz="914400" rtl="1" eaLnBrk="1" fontAlgn="auto" latinLnBrk="0" hangingPunct="1">
+              <a:lnSpc>
+                <a:spcPct val="100000"/>
+              </a:lnSpc>
+              <a:spcBef>
+                <a:spcPts val="0"/>
+              </a:spcBef>
+              <a:spcAft>
+                <a:spcPts val="0"/>
+              </a:spcAft>
+              <a:buClrTx/>
+              <a:buSzTx/>
+              <a:buFontTx/>
+              <a:buNone/>
+              <a:tabLst/>
+              <a:defRPr/>
+            </a:pPr>
             <a:r>
               <a:rPr lang="he-IL" dirty="0"/>
-              <a:t>השימוש בהודעה</a:t>
+              <a:t>ה</a:t>
+            </a:r>
+            <a:r>
+              <a:rPr lang="en-US" dirty="0"/>
+              <a:t>Originate Timestamp</a:t>
             </a:r>
             <a:r>
               <a:rPr lang="he-IL" baseline="0" dirty="0"/>
-              <a:t> זו היא לטובת הבנה של הרשת מה נמצא השולח.</a:t>
-            </a:r>
-          </a:p>
-          <a:p>
-            <a:pPr algn="r" rtl="1"/>
+              <a:t> זה הזמן האחרון שבו השולח נגע </a:t>
+            </a:r>
+            <a:r>
+              <a:rPr lang="he-IL" baseline="0" dirty="0" err="1"/>
+              <a:t>בפקטה</a:t>
+            </a:r>
+            <a:endParaRPr lang="he-IL" baseline="0" dirty="0"/>
+          </a:p>
+          <a:p>
+            <a:pPr marL="0" marR="0" indent="0" algn="r" defTabSz="914400" rtl="1" eaLnBrk="1" fontAlgn="auto" latinLnBrk="0" hangingPunct="1">
+              <a:lnSpc>
+                <a:spcPct val="100000"/>
+              </a:lnSpc>
+              <a:spcBef>
+                <a:spcPts val="0"/>
+              </a:spcBef>
+              <a:spcAft>
+                <a:spcPts val="0"/>
+              </a:spcAft>
+              <a:buClrTx/>
+              <a:buSzTx/>
+              <a:buFontTx/>
+              <a:buNone/>
+              <a:tabLst/>
+              <a:defRPr/>
+            </a:pPr>
+            <a:r>
+              <a:rPr lang="he-IL" dirty="0"/>
+              <a:t>ה</a:t>
+            </a:r>
+            <a:r>
+              <a:rPr lang="en-US" dirty="0"/>
+              <a:t>Receive Timestamp</a:t>
+            </a:r>
             <a:r>
               <a:rPr lang="he-IL" baseline="0" dirty="0"/>
-              <a:t>את הודעת ה</a:t>
-            </a:r>
-            <a:r>
-              <a:rPr lang="en-US" baseline="0" dirty="0"/>
-              <a:t>request</a:t>
+              <a:t> זה הזמן הראשון שבו המקבל נגע </a:t>
+            </a:r>
+            <a:r>
+              <a:rPr lang="he-IL" baseline="0" dirty="0" err="1"/>
+              <a:t>בפקטה</a:t>
+            </a:r>
+            <a:endParaRPr lang="en-US" dirty="0"/>
+          </a:p>
+          <a:p>
+            <a:pPr marL="0" marR="0" indent="0" algn="r" defTabSz="914400" rtl="1" eaLnBrk="1" fontAlgn="auto" latinLnBrk="0" hangingPunct="1">
+              <a:lnSpc>
+                <a:spcPct val="100000"/>
+              </a:lnSpc>
+              <a:spcBef>
+                <a:spcPts val="0"/>
+              </a:spcBef>
+              <a:spcAft>
+                <a:spcPts val="0"/>
+              </a:spcAft>
+              <a:buClrTx/>
+              <a:buSzTx/>
+              <a:buFontTx/>
+              <a:buNone/>
+              <a:tabLst/>
+              <a:defRPr/>
+            </a:pPr>
+            <a:r>
+              <a:rPr lang="he-IL" dirty="0" err="1"/>
+              <a:t>וה</a:t>
+            </a:r>
+            <a:r>
+              <a:rPr lang="en-US" dirty="0"/>
+              <a:t>Transmit Timestamp</a:t>
             </a:r>
             <a:r>
               <a:rPr lang="he-IL" baseline="0" dirty="0"/>
-              <a:t> הוא שולח עם שדה ה</a:t>
-            </a:r>
-            <a:r>
-              <a:rPr lang="en-US" baseline="0" dirty="0" err="1"/>
-              <a:t>dst</a:t>
-            </a:r>
-            <a:r>
-              <a:rPr lang="he-IL" baseline="0" dirty="0"/>
-              <a:t> ב</a:t>
-            </a:r>
-            <a:r>
-              <a:rPr lang="en-US" baseline="0" dirty="0" err="1"/>
-              <a:t>ip</a:t>
-            </a:r>
-            <a:r>
-              <a:rPr lang="he-IL" baseline="0" dirty="0"/>
-              <a:t> עם 0ים ומקבל תשובה מלאה, כך הוא יודע מה כתובת הרשת מה הוא נמצא.</a:t>
-            </a:r>
+              <a:t> זה הזמן האחרון שבו המקבל נגע </a:t>
+            </a:r>
+            <a:r>
+              <a:rPr lang="he-IL" baseline="0" dirty="0" err="1"/>
+              <a:t>בפקטה</a:t>
+            </a:r>
+            <a:endParaRPr lang="he-IL" baseline="0" dirty="0"/>
+          </a:p>
+          <a:p>
+            <a:pPr marL="0" marR="0" indent="0" algn="r" defTabSz="914400" rtl="1" eaLnBrk="1" fontAlgn="auto" latinLnBrk="0" hangingPunct="1">
+              <a:lnSpc>
+                <a:spcPct val="100000"/>
+              </a:lnSpc>
+              <a:spcBef>
+                <a:spcPts val="0"/>
+              </a:spcBef>
+              <a:spcAft>
+                <a:spcPts val="0"/>
+              </a:spcAft>
+              <a:buClrTx/>
+              <a:buSzTx/>
+              <a:buFontTx/>
+              <a:buNone/>
+              <a:tabLst/>
+              <a:defRPr/>
+            </a:pPr>
+            <a:endParaRPr lang="en-US" dirty="0"/>
           </a:p>
         </p:txBody>
       </p:sp>
@@ -1530,7 +1616,7 @@
     </p:spTree>
     <p:extLst>
       <p:ext uri="{BB962C8B-B14F-4D97-AF65-F5344CB8AC3E}">
-        <p14:creationId xmlns:p14="http://schemas.microsoft.com/office/powerpoint/2010/main" val="330551685"/>
+        <p14:creationId xmlns:p14="http://schemas.microsoft.com/office/powerpoint/2010/main" val="3669916765"/>
       </p:ext>
     </p:extLst>
   </p:cSld>
@@ -1584,132 +1670,46 @@
           <a:bodyPr/>
           <a:lstStyle/>
           <a:p>
-            <a:pPr marL="0" marR="0" indent="0" algn="r" defTabSz="914400" rtl="1" eaLnBrk="1" fontAlgn="auto" latinLnBrk="0" hangingPunct="1">
-              <a:lnSpc>
-                <a:spcPct val="100000"/>
-              </a:lnSpc>
-              <a:spcBef>
-                <a:spcPts val="0"/>
-              </a:spcBef>
-              <a:spcAft>
-                <a:spcPts val="0"/>
-              </a:spcAft>
-              <a:buClrTx/>
-              <a:buSzTx/>
-              <a:buFontTx/>
-              <a:buNone/>
-              <a:tabLst/>
-              <a:defRPr/>
-            </a:pPr>
+            <a:pPr algn="r" rtl="1"/>
             <a:r>
               <a:rPr lang="he-IL" dirty="0"/>
-              <a:t>ה</a:t>
-            </a:r>
-            <a:r>
-              <a:rPr lang="en-US" dirty="0"/>
-              <a:t>Originate Timestamp</a:t>
+              <a:t>השימוש בהודעה</a:t>
             </a:r>
             <a:r>
               <a:rPr lang="he-IL" baseline="0" dirty="0"/>
-              <a:t> זה הזמן האחרון שבו השולח נגע </a:t>
-            </a:r>
-            <a:r>
-              <a:rPr lang="he-IL" baseline="0" dirty="0" err="1"/>
-              <a:t>בפקטה</a:t>
-            </a:r>
-            <a:endParaRPr lang="he-IL" baseline="0" dirty="0"/>
-          </a:p>
-          <a:p>
-            <a:pPr marL="0" marR="0" indent="0" algn="r" defTabSz="914400" rtl="1" eaLnBrk="1" fontAlgn="auto" latinLnBrk="0" hangingPunct="1">
-              <a:lnSpc>
-                <a:spcPct val="100000"/>
-              </a:lnSpc>
-              <a:spcBef>
-                <a:spcPts val="0"/>
-              </a:spcBef>
-              <a:spcAft>
-                <a:spcPts val="0"/>
-              </a:spcAft>
-              <a:buClrTx/>
-              <a:buSzTx/>
-              <a:buFontTx/>
-              <a:buNone/>
-              <a:tabLst/>
-              <a:defRPr/>
-            </a:pPr>
-            <a:r>
-              <a:rPr lang="he-IL" dirty="0"/>
-              <a:t>ה</a:t>
-            </a:r>
-            <a:r>
-              <a:rPr lang="en-US" dirty="0"/>
-              <a:t>Receive Timestamp</a:t>
-            </a:r>
+              <a:t> זו היא לטובת הבנה של הרשת מה נמצא השולח.</a:t>
+            </a:r>
+          </a:p>
+          <a:p>
+            <a:pPr algn="r" rtl="1"/>
             <a:r>
               <a:rPr lang="he-IL" baseline="0" dirty="0"/>
-              <a:t> זה הזמן הראשון שבו המקבל נגע </a:t>
-            </a:r>
-            <a:r>
-              <a:rPr lang="he-IL" baseline="0" dirty="0" err="1"/>
-              <a:t>בפקטה</a:t>
-            </a:r>
-            <a:endParaRPr lang="en-US" dirty="0"/>
-          </a:p>
-          <a:p>
-            <a:pPr marL="0" marR="0" indent="0" algn="r" defTabSz="914400" rtl="1" eaLnBrk="1" fontAlgn="auto" latinLnBrk="0" hangingPunct="1">
-              <a:lnSpc>
-                <a:spcPct val="100000"/>
-              </a:lnSpc>
-              <a:spcBef>
-                <a:spcPts val="0"/>
-              </a:spcBef>
-              <a:spcAft>
-                <a:spcPts val="0"/>
-              </a:spcAft>
-              <a:buClrTx/>
-              <a:buSzTx/>
-              <a:buFontTx/>
-              <a:buNone/>
-              <a:tabLst/>
-              <a:defRPr/>
-            </a:pPr>
-            <a:r>
-              <a:rPr lang="he-IL" dirty="0" err="1"/>
-              <a:t>וה</a:t>
-            </a:r>
-            <a:r>
-              <a:rPr lang="en-US" dirty="0"/>
-              <a:t>Transmit Timestamp</a:t>
+              <a:t>את הודעת ה</a:t>
+            </a:r>
+            <a:r>
+              <a:rPr lang="en-US" baseline="0" dirty="0"/>
+              <a:t>request</a:t>
             </a:r>
             <a:r>
               <a:rPr lang="he-IL" baseline="0" dirty="0"/>
-              <a:t> זה הזמן האחרון שבו המקבל נגע </a:t>
-            </a:r>
-            <a:r>
-              <a:rPr lang="he-IL" baseline="0" dirty="0" err="1"/>
-              <a:t>בפקטה</a:t>
-            </a:r>
-            <a:endParaRPr lang="he-IL" baseline="0" dirty="0"/>
-          </a:p>
-          <a:p>
-            <a:pPr marL="0" marR="0" indent="0" algn="r" defTabSz="914400" rtl="1" eaLnBrk="1" fontAlgn="auto" latinLnBrk="0" hangingPunct="1">
-              <a:lnSpc>
-                <a:spcPct val="100000"/>
-              </a:lnSpc>
-              <a:spcBef>
-                <a:spcPts val="0"/>
-              </a:spcBef>
-              <a:spcAft>
-                <a:spcPts val="0"/>
-              </a:spcAft>
-              <a:buClrTx/>
-              <a:buSzTx/>
-              <a:buFontTx/>
-              <a:buNone/>
-              <a:tabLst/>
-              <a:defRPr/>
-            </a:pPr>
-            <a:endParaRPr lang="en-US" dirty="0"/>
+              <a:t> הוא שולח עם שדה ה</a:t>
+            </a:r>
+            <a:r>
+              <a:rPr lang="en-US" baseline="0" dirty="0" err="1"/>
+              <a:t>dst</a:t>
+            </a:r>
+            <a:r>
+              <a:rPr lang="he-IL" baseline="0" dirty="0"/>
+              <a:t> ב</a:t>
+            </a:r>
+            <a:r>
+              <a:rPr lang="en-US" baseline="0" dirty="0" err="1"/>
+              <a:t>ip</a:t>
+            </a:r>
+            <a:r>
+              <a:rPr lang="he-IL" baseline="0" dirty="0"/>
+              <a:t> עם 0ים ומקבל תשובה מלאה, כך הוא יודע מה כתובת הרשת מה הוא נמצא.</a:t>
+            </a:r>
           </a:p>
         </p:txBody>
       </p:sp>
@@ -1739,7 +1739,7 @@
     </p:spTree>
     <p:extLst>
       <p:ext uri="{BB962C8B-B14F-4D97-AF65-F5344CB8AC3E}">
-        <p14:creationId xmlns:p14="http://schemas.microsoft.com/office/powerpoint/2010/main" val="3669916765"/>
+        <p14:creationId xmlns:p14="http://schemas.microsoft.com/office/powerpoint/2010/main" val="330551685"/>
       </p:ext>
     </p:extLst>
   </p:cSld>
@@ -1771,7 +1771,7 @@
           <p:cNvPr id="2" name="Title 1">
             <a:extLst>
               <a:ext uri="{FF2B5EF4-FFF2-40B4-BE49-F238E27FC236}">
-                <a16:creationId xmlns:a16="http://schemas.microsoft.com/office/drawing/2014/main" id="{34DEA931-1349-45FB-A720-BC5E542963A4}"/>
+                <a16:creationId xmlns:a16="http://schemas.microsoft.com/office/drawing/2014/main" xmlns="" id="{34DEA931-1349-45FB-A720-BC5E542963A4}"/>
               </a:ext>
             </a:extLst>
           </p:cNvPr>
@@ -1808,7 +1808,7 @@
           <p:cNvPr id="3" name="Subtitle 2">
             <a:extLst>
               <a:ext uri="{FF2B5EF4-FFF2-40B4-BE49-F238E27FC236}">
-                <a16:creationId xmlns:a16="http://schemas.microsoft.com/office/drawing/2014/main" id="{40D19A2E-704C-4387-8230-BA874983CA71}"/>
+                <a16:creationId xmlns:a16="http://schemas.microsoft.com/office/drawing/2014/main" xmlns="" id="{40D19A2E-704C-4387-8230-BA874983CA71}"/>
               </a:ext>
             </a:extLst>
           </p:cNvPr>
@@ -1878,7 +1878,7 @@
           <p:cNvPr id="4" name="Date Placeholder 3">
             <a:extLst>
               <a:ext uri="{FF2B5EF4-FFF2-40B4-BE49-F238E27FC236}">
-                <a16:creationId xmlns:a16="http://schemas.microsoft.com/office/drawing/2014/main" id="{CAF4E38A-462C-475D-893A-9D4D8BB2DDD5}"/>
+                <a16:creationId xmlns:a16="http://schemas.microsoft.com/office/drawing/2014/main" xmlns="" id="{CAF4E38A-462C-475D-893A-9D4D8BB2DDD5}"/>
               </a:ext>
             </a:extLst>
           </p:cNvPr>
@@ -1896,7 +1896,7 @@
           <a:p>
             <a:fld id="{467B6F40-EC65-4722-BCEC-F5AF12719C12}" type="datetimeFigureOut">
               <a:rPr lang="en-US" smtClean="0"/>
-              <a:t>7/26/2019</a:t>
+              <a:t>2019-08-03</a:t>
             </a:fld>
             <a:endParaRPr lang="en-US"/>
           </a:p>
@@ -1907,7 +1907,7 @@
           <p:cNvPr id="5" name="Footer Placeholder 4">
             <a:extLst>
               <a:ext uri="{FF2B5EF4-FFF2-40B4-BE49-F238E27FC236}">
-                <a16:creationId xmlns:a16="http://schemas.microsoft.com/office/drawing/2014/main" id="{6F15DF81-09DF-429B-A78A-4035068826B0}"/>
+                <a16:creationId xmlns:a16="http://schemas.microsoft.com/office/drawing/2014/main" xmlns="" id="{6F15DF81-09DF-429B-A78A-4035068826B0}"/>
               </a:ext>
             </a:extLst>
           </p:cNvPr>
@@ -1932,7 +1932,7 @@
           <p:cNvPr id="6" name="Slide Number Placeholder 5">
             <a:extLst>
               <a:ext uri="{FF2B5EF4-FFF2-40B4-BE49-F238E27FC236}">
-                <a16:creationId xmlns:a16="http://schemas.microsoft.com/office/drawing/2014/main" id="{4F7C14CB-738C-4DF5-A810-C644C7C26306}"/>
+                <a16:creationId xmlns:a16="http://schemas.microsoft.com/office/drawing/2014/main" xmlns="" id="{4F7C14CB-738C-4DF5-A810-C644C7C26306}"/>
               </a:ext>
             </a:extLst>
           </p:cNvPr>
@@ -1991,7 +1991,7 @@
           <p:cNvPr id="2" name="Title 1">
             <a:extLst>
               <a:ext uri="{FF2B5EF4-FFF2-40B4-BE49-F238E27FC236}">
-                <a16:creationId xmlns:a16="http://schemas.microsoft.com/office/drawing/2014/main" id="{B52C3849-9FAA-4960-B846-89E9DD6F1E0E}"/>
+                <a16:creationId xmlns:a16="http://schemas.microsoft.com/office/drawing/2014/main" xmlns="" id="{B52C3849-9FAA-4960-B846-89E9DD6F1E0E}"/>
               </a:ext>
             </a:extLst>
           </p:cNvPr>
@@ -2019,7 +2019,7 @@
           <p:cNvPr id="3" name="Vertical Text Placeholder 2">
             <a:extLst>
               <a:ext uri="{FF2B5EF4-FFF2-40B4-BE49-F238E27FC236}">
-                <a16:creationId xmlns:a16="http://schemas.microsoft.com/office/drawing/2014/main" id="{BA23A670-4231-4756-B799-9AEEDBF3FCDF}"/>
+                <a16:creationId xmlns:a16="http://schemas.microsoft.com/office/drawing/2014/main" xmlns="" id="{BA23A670-4231-4756-B799-9AEEDBF3FCDF}"/>
               </a:ext>
             </a:extLst>
           </p:cNvPr>
@@ -2076,7 +2076,7 @@
           <p:cNvPr id="4" name="Date Placeholder 3">
             <a:extLst>
               <a:ext uri="{FF2B5EF4-FFF2-40B4-BE49-F238E27FC236}">
-                <a16:creationId xmlns:a16="http://schemas.microsoft.com/office/drawing/2014/main" id="{1A3B42D8-E24B-4C5C-9000-C95DBF437F1C}"/>
+                <a16:creationId xmlns:a16="http://schemas.microsoft.com/office/drawing/2014/main" xmlns="" id="{1A3B42D8-E24B-4C5C-9000-C95DBF437F1C}"/>
               </a:ext>
             </a:extLst>
           </p:cNvPr>
@@ -2094,7 +2094,7 @@
           <a:p>
             <a:fld id="{467B6F40-EC65-4722-BCEC-F5AF12719C12}" type="datetimeFigureOut">
               <a:rPr lang="en-US" smtClean="0"/>
-              <a:t>7/26/2019</a:t>
+              <a:t>2019-08-03</a:t>
             </a:fld>
             <a:endParaRPr lang="en-US"/>
           </a:p>
@@ -2105,7 +2105,7 @@
           <p:cNvPr id="5" name="Footer Placeholder 4">
             <a:extLst>
               <a:ext uri="{FF2B5EF4-FFF2-40B4-BE49-F238E27FC236}">
-                <a16:creationId xmlns:a16="http://schemas.microsoft.com/office/drawing/2014/main" id="{92AEEB0C-BF89-4B00-ACF5-1518DC48BAEA}"/>
+                <a16:creationId xmlns:a16="http://schemas.microsoft.com/office/drawing/2014/main" xmlns="" id="{92AEEB0C-BF89-4B00-ACF5-1518DC48BAEA}"/>
               </a:ext>
             </a:extLst>
           </p:cNvPr>
@@ -2130,7 +2130,7 @@
           <p:cNvPr id="6" name="Slide Number Placeholder 5">
             <a:extLst>
               <a:ext uri="{FF2B5EF4-FFF2-40B4-BE49-F238E27FC236}">
-                <a16:creationId xmlns:a16="http://schemas.microsoft.com/office/drawing/2014/main" id="{9FC1968B-C554-462A-911E-E42C41C82D19}"/>
+                <a16:creationId xmlns:a16="http://schemas.microsoft.com/office/drawing/2014/main" xmlns="" id="{9FC1968B-C554-462A-911E-E42C41C82D19}"/>
               </a:ext>
             </a:extLst>
           </p:cNvPr>
@@ -2189,7 +2189,7 @@
           <p:cNvPr id="2" name="Vertical Title 1">
             <a:extLst>
               <a:ext uri="{FF2B5EF4-FFF2-40B4-BE49-F238E27FC236}">
-                <a16:creationId xmlns:a16="http://schemas.microsoft.com/office/drawing/2014/main" id="{FC219046-EE6F-4F8F-8A9C-5C71CE1D7F49}"/>
+                <a16:creationId xmlns:a16="http://schemas.microsoft.com/office/drawing/2014/main" xmlns="" id="{FC219046-EE6F-4F8F-8A9C-5C71CE1D7F49}"/>
               </a:ext>
             </a:extLst>
           </p:cNvPr>
@@ -2222,7 +2222,7 @@
           <p:cNvPr id="3" name="Vertical Text Placeholder 2">
             <a:extLst>
               <a:ext uri="{FF2B5EF4-FFF2-40B4-BE49-F238E27FC236}">
-                <a16:creationId xmlns:a16="http://schemas.microsoft.com/office/drawing/2014/main" id="{CF50E0CA-0B02-4FFF-8ACC-ABA82A588BF1}"/>
+                <a16:creationId xmlns:a16="http://schemas.microsoft.com/office/drawing/2014/main" xmlns="" id="{CF50E0CA-0B02-4FFF-8ACC-ABA82A588BF1}"/>
               </a:ext>
             </a:extLst>
           </p:cNvPr>
@@ -2284,7 +2284,7 @@
           <p:cNvPr id="4" name="Date Placeholder 3">
             <a:extLst>
               <a:ext uri="{FF2B5EF4-FFF2-40B4-BE49-F238E27FC236}">
-                <a16:creationId xmlns:a16="http://schemas.microsoft.com/office/drawing/2014/main" id="{082E40BB-E5D8-4492-A9B5-AF8AE38A0A19}"/>
+                <a16:creationId xmlns:a16="http://schemas.microsoft.com/office/drawing/2014/main" xmlns="" id="{082E40BB-E5D8-4492-A9B5-AF8AE38A0A19}"/>
               </a:ext>
             </a:extLst>
           </p:cNvPr>
@@ -2302,7 +2302,7 @@
           <a:p>
             <a:fld id="{467B6F40-EC65-4722-BCEC-F5AF12719C12}" type="datetimeFigureOut">
               <a:rPr lang="en-US" smtClean="0"/>
-              <a:t>7/26/2019</a:t>
+              <a:t>2019-08-03</a:t>
             </a:fld>
             <a:endParaRPr lang="en-US"/>
           </a:p>
@@ -2313,7 +2313,7 @@
           <p:cNvPr id="5" name="Footer Placeholder 4">
             <a:extLst>
               <a:ext uri="{FF2B5EF4-FFF2-40B4-BE49-F238E27FC236}">
-                <a16:creationId xmlns:a16="http://schemas.microsoft.com/office/drawing/2014/main" id="{537D9C13-7BD6-485D-8030-0C1B941D469D}"/>
+                <a16:creationId xmlns:a16="http://schemas.microsoft.com/office/drawing/2014/main" xmlns="" id="{537D9C13-7BD6-485D-8030-0C1B941D469D}"/>
               </a:ext>
             </a:extLst>
           </p:cNvPr>
@@ -2338,7 +2338,7 @@
           <p:cNvPr id="6" name="Slide Number Placeholder 5">
             <a:extLst>
               <a:ext uri="{FF2B5EF4-FFF2-40B4-BE49-F238E27FC236}">
-                <a16:creationId xmlns:a16="http://schemas.microsoft.com/office/drawing/2014/main" id="{FECC56FA-9DD7-4226-8779-E0FC13FB65EF}"/>
+                <a16:creationId xmlns:a16="http://schemas.microsoft.com/office/drawing/2014/main" xmlns="" id="{FECC56FA-9DD7-4226-8779-E0FC13FB65EF}"/>
               </a:ext>
             </a:extLst>
           </p:cNvPr>
@@ -2397,7 +2397,7 @@
           <p:cNvPr id="2" name="Title 1">
             <a:extLst>
               <a:ext uri="{FF2B5EF4-FFF2-40B4-BE49-F238E27FC236}">
-                <a16:creationId xmlns:a16="http://schemas.microsoft.com/office/drawing/2014/main" id="{B8E9062E-A576-4C89-83B4-7735374FC004}"/>
+                <a16:creationId xmlns:a16="http://schemas.microsoft.com/office/drawing/2014/main" xmlns="" id="{B8E9062E-A576-4C89-83B4-7735374FC004}"/>
               </a:ext>
             </a:extLst>
           </p:cNvPr>
@@ -2425,7 +2425,7 @@
           <p:cNvPr id="3" name="Content Placeholder 2">
             <a:extLst>
               <a:ext uri="{FF2B5EF4-FFF2-40B4-BE49-F238E27FC236}">
-                <a16:creationId xmlns:a16="http://schemas.microsoft.com/office/drawing/2014/main" id="{C53C2A74-2685-4D33-83E3-07FBC983C7C4}"/>
+                <a16:creationId xmlns:a16="http://schemas.microsoft.com/office/drawing/2014/main" xmlns="" id="{C53C2A74-2685-4D33-83E3-07FBC983C7C4}"/>
               </a:ext>
             </a:extLst>
           </p:cNvPr>
@@ -2482,7 +2482,7 @@
           <p:cNvPr id="4" name="Date Placeholder 3">
             <a:extLst>
               <a:ext uri="{FF2B5EF4-FFF2-40B4-BE49-F238E27FC236}">
-                <a16:creationId xmlns:a16="http://schemas.microsoft.com/office/drawing/2014/main" id="{9800208B-45D5-4980-8EAC-6A448BDEBDC1}"/>
+                <a16:creationId xmlns:a16="http://schemas.microsoft.com/office/drawing/2014/main" xmlns="" id="{9800208B-45D5-4980-8EAC-6A448BDEBDC1}"/>
               </a:ext>
             </a:extLst>
           </p:cNvPr>
@@ -2500,7 +2500,7 @@
           <a:p>
             <a:fld id="{467B6F40-EC65-4722-BCEC-F5AF12719C12}" type="datetimeFigureOut">
               <a:rPr lang="en-US" smtClean="0"/>
-              <a:t>7/26/2019</a:t>
+              <a:t>2019-08-03</a:t>
             </a:fld>
             <a:endParaRPr lang="en-US"/>
           </a:p>
@@ -2511,7 +2511,7 @@
           <p:cNvPr id="5" name="Footer Placeholder 4">
             <a:extLst>
               <a:ext uri="{FF2B5EF4-FFF2-40B4-BE49-F238E27FC236}">
-                <a16:creationId xmlns:a16="http://schemas.microsoft.com/office/drawing/2014/main" id="{1A6C8672-D383-4544-B6E3-9DF2D374ABD3}"/>
+                <a16:creationId xmlns:a16="http://schemas.microsoft.com/office/drawing/2014/main" xmlns="" id="{1A6C8672-D383-4544-B6E3-9DF2D374ABD3}"/>
               </a:ext>
             </a:extLst>
           </p:cNvPr>
@@ -2536,7 +2536,7 @@
           <p:cNvPr id="6" name="Slide Number Placeholder 5">
             <a:extLst>
               <a:ext uri="{FF2B5EF4-FFF2-40B4-BE49-F238E27FC236}">
-                <a16:creationId xmlns:a16="http://schemas.microsoft.com/office/drawing/2014/main" id="{E0098C3B-4D80-48DC-87B6-07908CA693B0}"/>
+                <a16:creationId xmlns:a16="http://schemas.microsoft.com/office/drawing/2014/main" xmlns="" id="{E0098C3B-4D80-48DC-87B6-07908CA693B0}"/>
               </a:ext>
             </a:extLst>
           </p:cNvPr>
@@ -2595,7 +2595,7 @@
           <p:cNvPr id="2" name="Title 1">
             <a:extLst>
               <a:ext uri="{FF2B5EF4-FFF2-40B4-BE49-F238E27FC236}">
-                <a16:creationId xmlns:a16="http://schemas.microsoft.com/office/drawing/2014/main" id="{673743E7-92E0-4674-81F0-2BA23A856888}"/>
+                <a16:creationId xmlns:a16="http://schemas.microsoft.com/office/drawing/2014/main" xmlns="" id="{673743E7-92E0-4674-81F0-2BA23A856888}"/>
               </a:ext>
             </a:extLst>
           </p:cNvPr>
@@ -2632,7 +2632,7 @@
           <p:cNvPr id="3" name="Text Placeholder 2">
             <a:extLst>
               <a:ext uri="{FF2B5EF4-FFF2-40B4-BE49-F238E27FC236}">
-                <a16:creationId xmlns:a16="http://schemas.microsoft.com/office/drawing/2014/main" id="{44447823-22FD-49D3-AE13-831E31E426FD}"/>
+                <a16:creationId xmlns:a16="http://schemas.microsoft.com/office/drawing/2014/main" xmlns="" id="{44447823-22FD-49D3-AE13-831E31E426FD}"/>
               </a:ext>
             </a:extLst>
           </p:cNvPr>
@@ -2757,7 +2757,7 @@
           <p:cNvPr id="4" name="Date Placeholder 3">
             <a:extLst>
               <a:ext uri="{FF2B5EF4-FFF2-40B4-BE49-F238E27FC236}">
-                <a16:creationId xmlns:a16="http://schemas.microsoft.com/office/drawing/2014/main" id="{538EF0E8-FC70-43D7-8C75-6CDE6BE0F267}"/>
+                <a16:creationId xmlns:a16="http://schemas.microsoft.com/office/drawing/2014/main" xmlns="" id="{538EF0E8-FC70-43D7-8C75-6CDE6BE0F267}"/>
               </a:ext>
             </a:extLst>
           </p:cNvPr>
@@ -2775,7 +2775,7 @@
           <a:p>
             <a:fld id="{467B6F40-EC65-4722-BCEC-F5AF12719C12}" type="datetimeFigureOut">
               <a:rPr lang="en-US" smtClean="0"/>
-              <a:t>7/26/2019</a:t>
+              <a:t>2019-08-03</a:t>
             </a:fld>
             <a:endParaRPr lang="en-US"/>
           </a:p>
@@ -2786,7 +2786,7 @@
           <p:cNvPr id="5" name="Footer Placeholder 4">
             <a:extLst>
               <a:ext uri="{FF2B5EF4-FFF2-40B4-BE49-F238E27FC236}">
-                <a16:creationId xmlns:a16="http://schemas.microsoft.com/office/drawing/2014/main" id="{87B450F5-8F60-4CDC-93AB-A4CB6A8A4E87}"/>
+                <a16:creationId xmlns:a16="http://schemas.microsoft.com/office/drawing/2014/main" xmlns="" id="{87B450F5-8F60-4CDC-93AB-A4CB6A8A4E87}"/>
               </a:ext>
             </a:extLst>
           </p:cNvPr>
@@ -2811,7 +2811,7 @@
           <p:cNvPr id="6" name="Slide Number Placeholder 5">
             <a:extLst>
               <a:ext uri="{FF2B5EF4-FFF2-40B4-BE49-F238E27FC236}">
-                <a16:creationId xmlns:a16="http://schemas.microsoft.com/office/drawing/2014/main" id="{3CEA8156-894E-4E6B-A746-A435FE9C6A80}"/>
+                <a16:creationId xmlns:a16="http://schemas.microsoft.com/office/drawing/2014/main" xmlns="" id="{3CEA8156-894E-4E6B-A746-A435FE9C6A80}"/>
               </a:ext>
             </a:extLst>
           </p:cNvPr>
@@ -2870,7 +2870,7 @@
           <p:cNvPr id="2" name="Title 1">
             <a:extLst>
               <a:ext uri="{FF2B5EF4-FFF2-40B4-BE49-F238E27FC236}">
-                <a16:creationId xmlns:a16="http://schemas.microsoft.com/office/drawing/2014/main" id="{E125E2D8-7C2D-4482-A1D6-AB750EE1868E}"/>
+                <a16:creationId xmlns:a16="http://schemas.microsoft.com/office/drawing/2014/main" xmlns="" id="{E125E2D8-7C2D-4482-A1D6-AB750EE1868E}"/>
               </a:ext>
             </a:extLst>
           </p:cNvPr>
@@ -2898,7 +2898,7 @@
           <p:cNvPr id="3" name="Content Placeholder 2">
             <a:extLst>
               <a:ext uri="{FF2B5EF4-FFF2-40B4-BE49-F238E27FC236}">
-                <a16:creationId xmlns:a16="http://schemas.microsoft.com/office/drawing/2014/main" id="{605A9BF4-4D1A-4FBD-A779-0DC28F601772}"/>
+                <a16:creationId xmlns:a16="http://schemas.microsoft.com/office/drawing/2014/main" xmlns="" id="{605A9BF4-4D1A-4FBD-A779-0DC28F601772}"/>
               </a:ext>
             </a:extLst>
           </p:cNvPr>
@@ -2960,7 +2960,7 @@
           <p:cNvPr id="4" name="Content Placeholder 3">
             <a:extLst>
               <a:ext uri="{FF2B5EF4-FFF2-40B4-BE49-F238E27FC236}">
-                <a16:creationId xmlns:a16="http://schemas.microsoft.com/office/drawing/2014/main" id="{72E76A75-A52A-4EDF-B7B5-29DDA91AF8AD}"/>
+                <a16:creationId xmlns:a16="http://schemas.microsoft.com/office/drawing/2014/main" xmlns="" id="{72E76A75-A52A-4EDF-B7B5-29DDA91AF8AD}"/>
               </a:ext>
             </a:extLst>
           </p:cNvPr>
@@ -3022,7 +3022,7 @@
           <p:cNvPr id="5" name="Date Placeholder 4">
             <a:extLst>
               <a:ext uri="{FF2B5EF4-FFF2-40B4-BE49-F238E27FC236}">
-                <a16:creationId xmlns:a16="http://schemas.microsoft.com/office/drawing/2014/main" id="{0E1CA834-79E6-44FA-BCAF-4F26C92E2C8C}"/>
+                <a16:creationId xmlns:a16="http://schemas.microsoft.com/office/drawing/2014/main" xmlns="" id="{0E1CA834-79E6-44FA-BCAF-4F26C92E2C8C}"/>
               </a:ext>
             </a:extLst>
           </p:cNvPr>
@@ -3040,7 +3040,7 @@
           <a:p>
             <a:fld id="{467B6F40-EC65-4722-BCEC-F5AF12719C12}" type="datetimeFigureOut">
               <a:rPr lang="en-US" smtClean="0"/>
-              <a:t>7/26/2019</a:t>
+              <a:t>2019-08-03</a:t>
             </a:fld>
             <a:endParaRPr lang="en-US"/>
           </a:p>
@@ -3051,7 +3051,7 @@
           <p:cNvPr id="6" name="Footer Placeholder 5">
             <a:extLst>
               <a:ext uri="{FF2B5EF4-FFF2-40B4-BE49-F238E27FC236}">
-                <a16:creationId xmlns:a16="http://schemas.microsoft.com/office/drawing/2014/main" id="{7A70F81F-434E-46DD-A16F-2D20D3C7DA86}"/>
+                <a16:creationId xmlns:a16="http://schemas.microsoft.com/office/drawing/2014/main" xmlns="" id="{7A70F81F-434E-46DD-A16F-2D20D3C7DA86}"/>
               </a:ext>
             </a:extLst>
           </p:cNvPr>
@@ -3076,7 +3076,7 @@
           <p:cNvPr id="7" name="Slide Number Placeholder 6">
             <a:extLst>
               <a:ext uri="{FF2B5EF4-FFF2-40B4-BE49-F238E27FC236}">
-                <a16:creationId xmlns:a16="http://schemas.microsoft.com/office/drawing/2014/main" id="{07DE443C-6043-4A6F-8B18-03E3E389D509}"/>
+                <a16:creationId xmlns:a16="http://schemas.microsoft.com/office/drawing/2014/main" xmlns="" id="{07DE443C-6043-4A6F-8B18-03E3E389D509}"/>
               </a:ext>
             </a:extLst>
           </p:cNvPr>
@@ -3135,7 +3135,7 @@
           <p:cNvPr id="2" name="Title 1">
             <a:extLst>
               <a:ext uri="{FF2B5EF4-FFF2-40B4-BE49-F238E27FC236}">
-                <a16:creationId xmlns:a16="http://schemas.microsoft.com/office/drawing/2014/main" id="{D8D1E446-65DF-48FB-9115-348AC297F1D1}"/>
+                <a16:creationId xmlns:a16="http://schemas.microsoft.com/office/drawing/2014/main" xmlns="" id="{D8D1E446-65DF-48FB-9115-348AC297F1D1}"/>
               </a:ext>
             </a:extLst>
           </p:cNvPr>
@@ -3168,7 +3168,7 @@
           <p:cNvPr id="3" name="Text Placeholder 2">
             <a:extLst>
               <a:ext uri="{FF2B5EF4-FFF2-40B4-BE49-F238E27FC236}">
-                <a16:creationId xmlns:a16="http://schemas.microsoft.com/office/drawing/2014/main" id="{A16DFB35-E70F-4D11-9A37-36FB98621F32}"/>
+                <a16:creationId xmlns:a16="http://schemas.microsoft.com/office/drawing/2014/main" xmlns="" id="{A16DFB35-E70F-4D11-9A37-36FB98621F32}"/>
               </a:ext>
             </a:extLst>
           </p:cNvPr>
@@ -3239,7 +3239,7 @@
           <p:cNvPr id="4" name="Content Placeholder 3">
             <a:extLst>
               <a:ext uri="{FF2B5EF4-FFF2-40B4-BE49-F238E27FC236}">
-                <a16:creationId xmlns:a16="http://schemas.microsoft.com/office/drawing/2014/main" id="{8CF13E95-03BC-4E95-BE41-6E69A20AF9CB}"/>
+                <a16:creationId xmlns:a16="http://schemas.microsoft.com/office/drawing/2014/main" xmlns="" id="{8CF13E95-03BC-4E95-BE41-6E69A20AF9CB}"/>
               </a:ext>
             </a:extLst>
           </p:cNvPr>
@@ -3301,7 +3301,7 @@
           <p:cNvPr id="5" name="Text Placeholder 4">
             <a:extLst>
               <a:ext uri="{FF2B5EF4-FFF2-40B4-BE49-F238E27FC236}">
-                <a16:creationId xmlns:a16="http://schemas.microsoft.com/office/drawing/2014/main" id="{31525712-0278-46B4-8D1A-491E7C205411}"/>
+                <a16:creationId xmlns:a16="http://schemas.microsoft.com/office/drawing/2014/main" xmlns="" id="{31525712-0278-46B4-8D1A-491E7C205411}"/>
               </a:ext>
             </a:extLst>
           </p:cNvPr>
@@ -3372,7 +3372,7 @@
           <p:cNvPr id="6" name="Content Placeholder 5">
             <a:extLst>
               <a:ext uri="{FF2B5EF4-FFF2-40B4-BE49-F238E27FC236}">
-                <a16:creationId xmlns:a16="http://schemas.microsoft.com/office/drawing/2014/main" id="{98F1BECD-D182-4B3B-A460-DF2925735C7B}"/>
+                <a16:creationId xmlns:a16="http://schemas.microsoft.com/office/drawing/2014/main" xmlns="" id="{98F1BECD-D182-4B3B-A460-DF2925735C7B}"/>
               </a:ext>
             </a:extLst>
           </p:cNvPr>
@@ -3434,7 +3434,7 @@
           <p:cNvPr id="7" name="Date Placeholder 6">
             <a:extLst>
               <a:ext uri="{FF2B5EF4-FFF2-40B4-BE49-F238E27FC236}">
-                <a16:creationId xmlns:a16="http://schemas.microsoft.com/office/drawing/2014/main" id="{851E4F83-7272-4D84-852A-C382D02FE78B}"/>
+                <a16:creationId xmlns:a16="http://schemas.microsoft.com/office/drawing/2014/main" xmlns="" id="{851E4F83-7272-4D84-852A-C382D02FE78B}"/>
               </a:ext>
             </a:extLst>
           </p:cNvPr>
@@ -3452,7 +3452,7 @@
           <a:p>
             <a:fld id="{467B6F40-EC65-4722-BCEC-F5AF12719C12}" type="datetimeFigureOut">
               <a:rPr lang="en-US" smtClean="0"/>
-              <a:t>7/26/2019</a:t>
+              <a:t>2019-08-03</a:t>
             </a:fld>
             <a:endParaRPr lang="en-US"/>
           </a:p>
@@ -3463,7 +3463,7 @@
           <p:cNvPr id="8" name="Footer Placeholder 7">
             <a:extLst>
               <a:ext uri="{FF2B5EF4-FFF2-40B4-BE49-F238E27FC236}">
-                <a16:creationId xmlns:a16="http://schemas.microsoft.com/office/drawing/2014/main" id="{10D2CB22-0D2E-4F0C-97B4-DA076B19D8EF}"/>
+                <a16:creationId xmlns:a16="http://schemas.microsoft.com/office/drawing/2014/main" xmlns="" id="{10D2CB22-0D2E-4F0C-97B4-DA076B19D8EF}"/>
               </a:ext>
             </a:extLst>
           </p:cNvPr>
@@ -3488,7 +3488,7 @@
           <p:cNvPr id="9" name="Slide Number Placeholder 8">
             <a:extLst>
               <a:ext uri="{FF2B5EF4-FFF2-40B4-BE49-F238E27FC236}">
-                <a16:creationId xmlns:a16="http://schemas.microsoft.com/office/drawing/2014/main" id="{015611AF-89FE-4794-B4F6-F985E3DF5678}"/>
+                <a16:creationId xmlns:a16="http://schemas.microsoft.com/office/drawing/2014/main" xmlns="" id="{015611AF-89FE-4794-B4F6-F985E3DF5678}"/>
               </a:ext>
             </a:extLst>
           </p:cNvPr>
@@ -3547,7 +3547,7 @@
           <p:cNvPr id="2" name="Title 1">
             <a:extLst>
               <a:ext uri="{FF2B5EF4-FFF2-40B4-BE49-F238E27FC236}">
-                <a16:creationId xmlns:a16="http://schemas.microsoft.com/office/drawing/2014/main" id="{DDA9669C-255B-4399-A9E0-9AD3152F6009}"/>
+                <a16:creationId xmlns:a16="http://schemas.microsoft.com/office/drawing/2014/main" xmlns="" id="{DDA9669C-255B-4399-A9E0-9AD3152F6009}"/>
               </a:ext>
             </a:extLst>
           </p:cNvPr>
@@ -3575,7 +3575,7 @@
           <p:cNvPr id="3" name="Date Placeholder 2">
             <a:extLst>
               <a:ext uri="{FF2B5EF4-FFF2-40B4-BE49-F238E27FC236}">
-                <a16:creationId xmlns:a16="http://schemas.microsoft.com/office/drawing/2014/main" id="{36D472C8-66A7-416E-892E-433D0F25D9C8}"/>
+                <a16:creationId xmlns:a16="http://schemas.microsoft.com/office/drawing/2014/main" xmlns="" id="{36D472C8-66A7-416E-892E-433D0F25D9C8}"/>
               </a:ext>
             </a:extLst>
           </p:cNvPr>
@@ -3593,7 +3593,7 @@
           <a:p>
             <a:fld id="{467B6F40-EC65-4722-BCEC-F5AF12719C12}" type="datetimeFigureOut">
               <a:rPr lang="en-US" smtClean="0"/>
-              <a:t>7/26/2019</a:t>
+              <a:t>2019-08-03</a:t>
             </a:fld>
             <a:endParaRPr lang="en-US"/>
           </a:p>
@@ -3604,7 +3604,7 @@
           <p:cNvPr id="4" name="Footer Placeholder 3">
             <a:extLst>
               <a:ext uri="{FF2B5EF4-FFF2-40B4-BE49-F238E27FC236}">
-                <a16:creationId xmlns:a16="http://schemas.microsoft.com/office/drawing/2014/main" id="{E55BEA24-885E-4862-B843-1DC0AA7E90AB}"/>
+                <a16:creationId xmlns:a16="http://schemas.microsoft.com/office/drawing/2014/main" xmlns="" id="{E55BEA24-885E-4862-B843-1DC0AA7E90AB}"/>
               </a:ext>
             </a:extLst>
           </p:cNvPr>
@@ -3629,7 +3629,7 @@
           <p:cNvPr id="5" name="Slide Number Placeholder 4">
             <a:extLst>
               <a:ext uri="{FF2B5EF4-FFF2-40B4-BE49-F238E27FC236}">
-                <a16:creationId xmlns:a16="http://schemas.microsoft.com/office/drawing/2014/main" id="{A34FDA84-BEB8-4096-8F12-5179F49AC6C4}"/>
+                <a16:creationId xmlns:a16="http://schemas.microsoft.com/office/drawing/2014/main" xmlns="" id="{A34FDA84-BEB8-4096-8F12-5179F49AC6C4}"/>
               </a:ext>
             </a:extLst>
           </p:cNvPr>
@@ -3688,7 +3688,7 @@
           <p:cNvPr id="2" name="Date Placeholder 1">
             <a:extLst>
               <a:ext uri="{FF2B5EF4-FFF2-40B4-BE49-F238E27FC236}">
-                <a16:creationId xmlns:a16="http://schemas.microsoft.com/office/drawing/2014/main" id="{B29EF21E-0A8B-491B-BE7F-642E3CF6E449}"/>
+                <a16:creationId xmlns:a16="http://schemas.microsoft.com/office/drawing/2014/main" xmlns="" id="{B29EF21E-0A8B-491B-BE7F-642E3CF6E449}"/>
               </a:ext>
             </a:extLst>
           </p:cNvPr>
@@ -3706,7 +3706,7 @@
           <a:p>
             <a:fld id="{467B6F40-EC65-4722-BCEC-F5AF12719C12}" type="datetimeFigureOut">
               <a:rPr lang="en-US" smtClean="0"/>
-              <a:t>7/26/2019</a:t>
+              <a:t>2019-08-03</a:t>
             </a:fld>
             <a:endParaRPr lang="en-US"/>
           </a:p>
@@ -3717,7 +3717,7 @@
           <p:cNvPr id="3" name="Footer Placeholder 2">
             <a:extLst>
               <a:ext uri="{FF2B5EF4-FFF2-40B4-BE49-F238E27FC236}">
-                <a16:creationId xmlns:a16="http://schemas.microsoft.com/office/drawing/2014/main" id="{5342EE23-3452-4E34-8D5F-824562DD2A06}"/>
+                <a16:creationId xmlns:a16="http://schemas.microsoft.com/office/drawing/2014/main" xmlns="" id="{5342EE23-3452-4E34-8D5F-824562DD2A06}"/>
               </a:ext>
             </a:extLst>
           </p:cNvPr>
@@ -3742,7 +3742,7 @@
           <p:cNvPr id="4" name="Slide Number Placeholder 3">
             <a:extLst>
               <a:ext uri="{FF2B5EF4-FFF2-40B4-BE49-F238E27FC236}">
-                <a16:creationId xmlns:a16="http://schemas.microsoft.com/office/drawing/2014/main" id="{3ECB9CF3-422F-4F24-9EDF-9801153FCEA7}"/>
+                <a16:creationId xmlns:a16="http://schemas.microsoft.com/office/drawing/2014/main" xmlns="" id="{3ECB9CF3-422F-4F24-9EDF-9801153FCEA7}"/>
               </a:ext>
             </a:extLst>
           </p:cNvPr>
@@ -3801,7 +3801,7 @@
           <p:cNvPr id="2" name="Title 1">
             <a:extLst>
               <a:ext uri="{FF2B5EF4-FFF2-40B4-BE49-F238E27FC236}">
-                <a16:creationId xmlns:a16="http://schemas.microsoft.com/office/drawing/2014/main" id="{4B289673-5095-4334-8DB5-DDF5C58ACC16}"/>
+                <a16:creationId xmlns:a16="http://schemas.microsoft.com/office/drawing/2014/main" xmlns="" id="{4B289673-5095-4334-8DB5-DDF5C58ACC16}"/>
               </a:ext>
             </a:extLst>
           </p:cNvPr>
@@ -3838,7 +3838,7 @@
           <p:cNvPr id="3" name="Content Placeholder 2">
             <a:extLst>
               <a:ext uri="{FF2B5EF4-FFF2-40B4-BE49-F238E27FC236}">
-                <a16:creationId xmlns:a16="http://schemas.microsoft.com/office/drawing/2014/main" id="{3AC684BD-D4F1-4CF0-B351-1132643A9234}"/>
+                <a16:creationId xmlns:a16="http://schemas.microsoft.com/office/drawing/2014/main" xmlns="" id="{3AC684BD-D4F1-4CF0-B351-1132643A9234}"/>
               </a:ext>
             </a:extLst>
           </p:cNvPr>
@@ -3928,7 +3928,7 @@
           <p:cNvPr id="4" name="Text Placeholder 3">
             <a:extLst>
               <a:ext uri="{FF2B5EF4-FFF2-40B4-BE49-F238E27FC236}">
-                <a16:creationId xmlns:a16="http://schemas.microsoft.com/office/drawing/2014/main" id="{08E0BC37-D116-4F2C-98DA-74E5426C5491}"/>
+                <a16:creationId xmlns:a16="http://schemas.microsoft.com/office/drawing/2014/main" xmlns="" id="{08E0BC37-D116-4F2C-98DA-74E5426C5491}"/>
               </a:ext>
             </a:extLst>
           </p:cNvPr>
@@ -3999,7 +3999,7 @@
           <p:cNvPr id="5" name="Date Placeholder 4">
             <a:extLst>
               <a:ext uri="{FF2B5EF4-FFF2-40B4-BE49-F238E27FC236}">
-                <a16:creationId xmlns:a16="http://schemas.microsoft.com/office/drawing/2014/main" id="{F3FA9A3B-F33B-4649-B7C0-40746F4A70E0}"/>
+                <a16:creationId xmlns:a16="http://schemas.microsoft.com/office/drawing/2014/main" xmlns="" id="{F3FA9A3B-F33B-4649-B7C0-40746F4A70E0}"/>
               </a:ext>
             </a:extLst>
           </p:cNvPr>
@@ -4017,7 +4017,7 @@
           <a:p>
             <a:fld id="{467B6F40-EC65-4722-BCEC-F5AF12719C12}" type="datetimeFigureOut">
               <a:rPr lang="en-US" smtClean="0"/>
-              <a:t>7/26/2019</a:t>
+              <a:t>2019-08-03</a:t>
             </a:fld>
             <a:endParaRPr lang="en-US"/>
           </a:p>
@@ -4028,7 +4028,7 @@
           <p:cNvPr id="6" name="Footer Placeholder 5">
             <a:extLst>
               <a:ext uri="{FF2B5EF4-FFF2-40B4-BE49-F238E27FC236}">
-                <a16:creationId xmlns:a16="http://schemas.microsoft.com/office/drawing/2014/main" id="{362A181A-E6BE-4B51-9CF0-36661E50BD58}"/>
+                <a16:creationId xmlns:a16="http://schemas.microsoft.com/office/drawing/2014/main" xmlns="" id="{362A181A-E6BE-4B51-9CF0-36661E50BD58}"/>
               </a:ext>
             </a:extLst>
           </p:cNvPr>
@@ -4053,7 +4053,7 @@
           <p:cNvPr id="7" name="Slide Number Placeholder 6">
             <a:extLst>
               <a:ext uri="{FF2B5EF4-FFF2-40B4-BE49-F238E27FC236}">
-                <a16:creationId xmlns:a16="http://schemas.microsoft.com/office/drawing/2014/main" id="{B798CB95-CB7A-4985-8B86-90AE7E009233}"/>
+                <a16:creationId xmlns:a16="http://schemas.microsoft.com/office/drawing/2014/main" xmlns="" id="{B798CB95-CB7A-4985-8B86-90AE7E009233}"/>
               </a:ext>
             </a:extLst>
           </p:cNvPr>
@@ -4112,7 +4112,7 @@
           <p:cNvPr id="2" name="Title 1">
             <a:extLst>
               <a:ext uri="{FF2B5EF4-FFF2-40B4-BE49-F238E27FC236}">
-                <a16:creationId xmlns:a16="http://schemas.microsoft.com/office/drawing/2014/main" id="{A9846294-DCDB-4990-A5B4-5534E4A5575B}"/>
+                <a16:creationId xmlns:a16="http://schemas.microsoft.com/office/drawing/2014/main" xmlns="" id="{A9846294-DCDB-4990-A5B4-5534E4A5575B}"/>
               </a:ext>
             </a:extLst>
           </p:cNvPr>
@@ -4149,7 +4149,7 @@
           <p:cNvPr id="3" name="Picture Placeholder 2">
             <a:extLst>
               <a:ext uri="{FF2B5EF4-FFF2-40B4-BE49-F238E27FC236}">
-                <a16:creationId xmlns:a16="http://schemas.microsoft.com/office/drawing/2014/main" id="{31AB7A82-CC01-4539-8A5B-85F66FE2CAEE}"/>
+                <a16:creationId xmlns:a16="http://schemas.microsoft.com/office/drawing/2014/main" xmlns="" id="{31AB7A82-CC01-4539-8A5B-85F66FE2CAEE}"/>
               </a:ext>
             </a:extLst>
           </p:cNvPr>
@@ -4216,7 +4216,7 @@
           <p:cNvPr id="4" name="Text Placeholder 3">
             <a:extLst>
               <a:ext uri="{FF2B5EF4-FFF2-40B4-BE49-F238E27FC236}">
-                <a16:creationId xmlns:a16="http://schemas.microsoft.com/office/drawing/2014/main" id="{1AEFFB14-2035-4D92-9C83-AB4357373F06}"/>
+                <a16:creationId xmlns:a16="http://schemas.microsoft.com/office/drawing/2014/main" xmlns="" id="{1AEFFB14-2035-4D92-9C83-AB4357373F06}"/>
               </a:ext>
             </a:extLst>
           </p:cNvPr>
@@ -4287,7 +4287,7 @@
           <p:cNvPr id="5" name="Date Placeholder 4">
             <a:extLst>
               <a:ext uri="{FF2B5EF4-FFF2-40B4-BE49-F238E27FC236}">
-                <a16:creationId xmlns:a16="http://schemas.microsoft.com/office/drawing/2014/main" id="{9E5F68F1-6D78-4626-8E21-E48924FC5C7B}"/>
+                <a16:creationId xmlns:a16="http://schemas.microsoft.com/office/drawing/2014/main" xmlns="" id="{9E5F68F1-6D78-4626-8E21-E48924FC5C7B}"/>
               </a:ext>
             </a:extLst>
           </p:cNvPr>
@@ -4305,7 +4305,7 @@
           <a:p>
             <a:fld id="{467B6F40-EC65-4722-BCEC-F5AF12719C12}" type="datetimeFigureOut">
               <a:rPr lang="en-US" smtClean="0"/>
-              <a:t>7/26/2019</a:t>
+              <a:t>2019-08-03</a:t>
             </a:fld>
             <a:endParaRPr lang="en-US"/>
           </a:p>
@@ -4316,7 +4316,7 @@
           <p:cNvPr id="6" name="Footer Placeholder 5">
             <a:extLst>
               <a:ext uri="{FF2B5EF4-FFF2-40B4-BE49-F238E27FC236}">
-                <a16:creationId xmlns:a16="http://schemas.microsoft.com/office/drawing/2014/main" id="{86EC6FA6-7D28-433D-91FF-8610F12F24C4}"/>
+                <a16:creationId xmlns:a16="http://schemas.microsoft.com/office/drawing/2014/main" xmlns="" id="{86EC6FA6-7D28-433D-91FF-8610F12F24C4}"/>
               </a:ext>
             </a:extLst>
           </p:cNvPr>
@@ -4341,7 +4341,7 @@
           <p:cNvPr id="7" name="Slide Number Placeholder 6">
             <a:extLst>
               <a:ext uri="{FF2B5EF4-FFF2-40B4-BE49-F238E27FC236}">
-                <a16:creationId xmlns:a16="http://schemas.microsoft.com/office/drawing/2014/main" id="{3955159E-254A-4D0D-89E8-E537C07D2693}"/>
+                <a16:creationId xmlns:a16="http://schemas.microsoft.com/office/drawing/2014/main" xmlns="" id="{3955159E-254A-4D0D-89E8-E537C07D2693}"/>
               </a:ext>
             </a:extLst>
           </p:cNvPr>
@@ -4405,7 +4405,7 @@
           <p:cNvPr id="2" name="Title Placeholder 1">
             <a:extLst>
               <a:ext uri="{FF2B5EF4-FFF2-40B4-BE49-F238E27FC236}">
-                <a16:creationId xmlns:a16="http://schemas.microsoft.com/office/drawing/2014/main" id="{7999BA17-EC81-4422-8EAB-AE587E59DEC6}"/>
+                <a16:creationId xmlns:a16="http://schemas.microsoft.com/office/drawing/2014/main" xmlns="" id="{7999BA17-EC81-4422-8EAB-AE587E59DEC6}"/>
               </a:ext>
             </a:extLst>
           </p:cNvPr>
@@ -4443,7 +4443,7 @@
           <p:cNvPr id="3" name="Text Placeholder 2">
             <a:extLst>
               <a:ext uri="{FF2B5EF4-FFF2-40B4-BE49-F238E27FC236}">
-                <a16:creationId xmlns:a16="http://schemas.microsoft.com/office/drawing/2014/main" id="{B48D8447-27CA-4B93-8469-CD8AAE940C44}"/>
+                <a16:creationId xmlns:a16="http://schemas.microsoft.com/office/drawing/2014/main" xmlns="" id="{B48D8447-27CA-4B93-8469-CD8AAE940C44}"/>
               </a:ext>
             </a:extLst>
           </p:cNvPr>
@@ -4510,7 +4510,7 @@
           <p:cNvPr id="4" name="Date Placeholder 3">
             <a:extLst>
               <a:ext uri="{FF2B5EF4-FFF2-40B4-BE49-F238E27FC236}">
-                <a16:creationId xmlns:a16="http://schemas.microsoft.com/office/drawing/2014/main" id="{B4E4A6CA-8AB7-449D-B970-C0EDB7CE3C7D}"/>
+                <a16:creationId xmlns:a16="http://schemas.microsoft.com/office/drawing/2014/main" xmlns="" id="{B4E4A6CA-8AB7-449D-B970-C0EDB7CE3C7D}"/>
               </a:ext>
             </a:extLst>
           </p:cNvPr>
@@ -4546,7 +4546,7 @@
           <a:p>
             <a:fld id="{467B6F40-EC65-4722-BCEC-F5AF12719C12}" type="datetimeFigureOut">
               <a:rPr lang="en-US" smtClean="0"/>
-              <a:t>7/26/2019</a:t>
+              <a:t>2019-08-03</a:t>
             </a:fld>
             <a:endParaRPr lang="en-US"/>
           </a:p>
@@ -4557,7 +4557,7 @@
           <p:cNvPr id="5" name="Footer Placeholder 4">
             <a:extLst>
               <a:ext uri="{FF2B5EF4-FFF2-40B4-BE49-F238E27FC236}">
-                <a16:creationId xmlns:a16="http://schemas.microsoft.com/office/drawing/2014/main" id="{ED3F01A0-263B-439F-83C0-61B37E34D692}"/>
+                <a16:creationId xmlns:a16="http://schemas.microsoft.com/office/drawing/2014/main" xmlns="" id="{ED3F01A0-263B-439F-83C0-61B37E34D692}"/>
               </a:ext>
             </a:extLst>
           </p:cNvPr>
@@ -4600,7 +4600,7 @@
           <p:cNvPr id="6" name="Slide Number Placeholder 5">
             <a:extLst>
               <a:ext uri="{FF2B5EF4-FFF2-40B4-BE49-F238E27FC236}">
-                <a16:creationId xmlns:a16="http://schemas.microsoft.com/office/drawing/2014/main" id="{9CA1FAA9-EF8A-4953-83B2-808DC5AABE08}"/>
+                <a16:creationId xmlns:a16="http://schemas.microsoft.com/office/drawing/2014/main" xmlns="" id="{9CA1FAA9-EF8A-4953-83B2-808DC5AABE08}"/>
               </a:ext>
             </a:extLst>
           </p:cNvPr>
@@ -4968,7 +4968,7 @@
           <p:cNvPr id="2" name="Title 1">
             <a:extLst>
               <a:ext uri="{FF2B5EF4-FFF2-40B4-BE49-F238E27FC236}">
-                <a16:creationId xmlns:a16="http://schemas.microsoft.com/office/drawing/2014/main" id="{BD741483-B11E-445B-82D4-F69120BFE4F4}"/>
+                <a16:creationId xmlns:a16="http://schemas.microsoft.com/office/drawing/2014/main" xmlns="" id="{BD741483-B11E-445B-82D4-F69120BFE4F4}"/>
               </a:ext>
             </a:extLst>
           </p:cNvPr>
@@ -4996,7 +4996,7 @@
           <p:cNvPr id="3" name="Subtitle 2">
             <a:extLst>
               <a:ext uri="{FF2B5EF4-FFF2-40B4-BE49-F238E27FC236}">
-                <a16:creationId xmlns:a16="http://schemas.microsoft.com/office/drawing/2014/main" id="{25543615-085F-4258-A2E2-34551553B4FC}"/>
+                <a16:creationId xmlns:a16="http://schemas.microsoft.com/office/drawing/2014/main" xmlns="" id="{25543615-085F-4258-A2E2-34551553B4FC}"/>
               </a:ext>
             </a:extLst>
           </p:cNvPr>
@@ -5051,7 +5051,7 @@
           <p:cNvPr id="2" name="Title 1">
             <a:extLst>
               <a:ext uri="{FF2B5EF4-FFF2-40B4-BE49-F238E27FC236}">
-                <a16:creationId xmlns:a16="http://schemas.microsoft.com/office/drawing/2014/main" id="{99F7D6D0-C3C0-4F7D-85E0-921F9502D6CC}"/>
+                <a16:creationId xmlns:a16="http://schemas.microsoft.com/office/drawing/2014/main" xmlns="" id="{99F7D6D0-C3C0-4F7D-85E0-921F9502D6CC}"/>
               </a:ext>
             </a:extLst>
           </p:cNvPr>
@@ -5079,7 +5079,7 @@
           <p:cNvPr id="4" name="Content Placeholder 3">
             <a:extLst>
               <a:ext uri="{FF2B5EF4-FFF2-40B4-BE49-F238E27FC236}">
-                <a16:creationId xmlns:a16="http://schemas.microsoft.com/office/drawing/2014/main" id="{A2FBB0DC-C13F-4885-9425-924C452E33D9}"/>
+                <a16:creationId xmlns:a16="http://schemas.microsoft.com/office/drawing/2014/main" xmlns="" id="{A2FBB0DC-C13F-4885-9425-924C452E33D9}"/>
               </a:ext>
             </a:extLst>
           </p:cNvPr>
@@ -5104,28 +5104,28 @@
                 <a:gridCol w="2628900">
                   <a:extLst>
                     <a:ext uri="{9D8B030D-6E8A-4147-A177-3AD203B41FA5}">
-                      <a16:colId xmlns:a16="http://schemas.microsoft.com/office/drawing/2014/main" val="3470846463"/>
+                      <a16:colId xmlns:a16="http://schemas.microsoft.com/office/drawing/2014/main" xmlns="" val="3470846463"/>
                     </a:ext>
                   </a:extLst>
                 </a:gridCol>
                 <a:gridCol w="2628900">
                   <a:extLst>
                     <a:ext uri="{9D8B030D-6E8A-4147-A177-3AD203B41FA5}">
-                      <a16:colId xmlns:a16="http://schemas.microsoft.com/office/drawing/2014/main" val="3990732175"/>
+                      <a16:colId xmlns:a16="http://schemas.microsoft.com/office/drawing/2014/main" xmlns="" val="3990732175"/>
                     </a:ext>
                   </a:extLst>
                 </a:gridCol>
                 <a:gridCol w="2628900">
                   <a:extLst>
                     <a:ext uri="{9D8B030D-6E8A-4147-A177-3AD203B41FA5}">
-                      <a16:colId xmlns:a16="http://schemas.microsoft.com/office/drawing/2014/main" val="3113442537"/>
+                      <a16:colId xmlns:a16="http://schemas.microsoft.com/office/drawing/2014/main" xmlns="" val="3113442537"/>
                     </a:ext>
                   </a:extLst>
                 </a:gridCol>
                 <a:gridCol w="2628900">
                   <a:extLst>
                     <a:ext uri="{9D8B030D-6E8A-4147-A177-3AD203B41FA5}">
-                      <a16:colId xmlns:a16="http://schemas.microsoft.com/office/drawing/2014/main" val="3734812451"/>
+                      <a16:colId xmlns:a16="http://schemas.microsoft.com/office/drawing/2014/main" xmlns="" val="3734812451"/>
                     </a:ext>
                   </a:extLst>
                 </a:gridCol>
@@ -5189,7 +5189,7 @@
                 </a:tc>
                 <a:extLst>
                   <a:ext uri="{0D108BD9-81ED-4DB2-BD59-A6C34878D82A}">
-                    <a16:rowId xmlns:a16="http://schemas.microsoft.com/office/drawing/2014/main" val="3547791680"/>
+                    <a16:rowId xmlns:a16="http://schemas.microsoft.com/office/drawing/2014/main" xmlns="" val="3547791680"/>
                   </a:ext>
                 </a:extLst>
               </a:tr>
@@ -5248,7 +5248,7 @@
                 </a:tc>
                 <a:extLst>
                   <a:ext uri="{0D108BD9-81ED-4DB2-BD59-A6C34878D82A}">
-                    <a16:rowId xmlns:a16="http://schemas.microsoft.com/office/drawing/2014/main" val="2673285938"/>
+                    <a16:rowId xmlns:a16="http://schemas.microsoft.com/office/drawing/2014/main" xmlns="" val="2673285938"/>
                   </a:ext>
                 </a:extLst>
               </a:tr>
@@ -5299,7 +5299,7 @@
                 </a:tc>
                 <a:extLst>
                   <a:ext uri="{0D108BD9-81ED-4DB2-BD59-A6C34878D82A}">
-                    <a16:rowId xmlns:a16="http://schemas.microsoft.com/office/drawing/2014/main" val="761915796"/>
+                    <a16:rowId xmlns:a16="http://schemas.microsoft.com/office/drawing/2014/main" xmlns="" val="761915796"/>
                   </a:ext>
                 </a:extLst>
               </a:tr>
@@ -5350,7 +5350,7 @@
                 </a:tc>
                 <a:extLst>
                   <a:ext uri="{0D108BD9-81ED-4DB2-BD59-A6C34878D82A}">
-                    <a16:rowId xmlns:a16="http://schemas.microsoft.com/office/drawing/2014/main" val="3849345575"/>
+                    <a16:rowId xmlns:a16="http://schemas.microsoft.com/office/drawing/2014/main" xmlns="" val="3849345575"/>
                   </a:ext>
                 </a:extLst>
               </a:tr>
@@ -5393,7 +5393,7 @@
           <p:cNvPr id="2" name="Title 1">
             <a:extLst>
               <a:ext uri="{FF2B5EF4-FFF2-40B4-BE49-F238E27FC236}">
-                <a16:creationId xmlns:a16="http://schemas.microsoft.com/office/drawing/2014/main" id="{0A2A4053-83BE-448D-8877-DBBA7D7FBA62}"/>
+                <a16:creationId xmlns:a16="http://schemas.microsoft.com/office/drawing/2014/main" xmlns="" id="{0A2A4053-83BE-448D-8877-DBBA7D7FBA62}"/>
               </a:ext>
             </a:extLst>
           </p:cNvPr>
@@ -5411,7 +5411,7 @@
           <a:p>
             <a:r>
               <a:rPr lang="en-US" dirty="0"/>
-              <a:t>Types: 3 – Destination Unreachable Message</a:t>
+              <a:t>Types: 8/0 – Echo / Echo Reply Message</a:t>
             </a:r>
           </a:p>
         </p:txBody>
@@ -5421,7 +5421,7 @@
           <p:cNvPr id="3" name="Content Placeholder 2">
             <a:extLst>
               <a:ext uri="{FF2B5EF4-FFF2-40B4-BE49-F238E27FC236}">
-                <a16:creationId xmlns:a16="http://schemas.microsoft.com/office/drawing/2014/main" id="{2C05FB4C-A7FE-45D7-A696-BFFC90E02159}"/>
+                <a16:creationId xmlns:a16="http://schemas.microsoft.com/office/drawing/2014/main" xmlns="" id="{2C05FB4C-A7FE-45D7-A696-BFFC90E02159}"/>
               </a:ext>
             </a:extLst>
           </p:cNvPr>
@@ -5440,89 +5440,114 @@
         </p:spPr>
         <p:txBody>
           <a:bodyPr>
-            <a:normAutofit fontScale="92500" lnSpcReduction="10000"/>
+            <a:normAutofit/>
           </a:bodyPr>
           <a:lstStyle/>
           <a:p>
+            <a:pPr>
+              <a:lnSpc>
+                <a:spcPct val="70000"/>
+              </a:lnSpc>
+            </a:pPr>
             <a:r>
               <a:rPr lang="en-US" sz="2400" dirty="0"/>
               <a:t>Packet Format:</a:t>
             </a:r>
           </a:p>
           <a:p>
+            <a:pPr marL="0" indent="0">
+              <a:lnSpc>
+                <a:spcPct val="70000"/>
+              </a:lnSpc>
+              <a:buNone/>
+            </a:pPr>
             <a:endParaRPr lang="en-US" sz="2400" dirty="0"/>
           </a:p>
           <a:p>
+            <a:pPr>
+              <a:lnSpc>
+                <a:spcPct val="70000"/>
+              </a:lnSpc>
+            </a:pPr>
             <a:endParaRPr lang="en-US" sz="2400" dirty="0"/>
           </a:p>
           <a:p>
+            <a:pPr>
+              <a:lnSpc>
+                <a:spcPct val="70000"/>
+              </a:lnSpc>
+            </a:pPr>
+            <a:endParaRPr lang="en-US" sz="2400" dirty="0"/>
+          </a:p>
+          <a:p>
+            <a:pPr>
+              <a:lnSpc>
+                <a:spcPct val="70000"/>
+              </a:lnSpc>
+            </a:pPr>
+            <a:endParaRPr lang="en-US" sz="2400" dirty="0"/>
+          </a:p>
+          <a:p>
             <a:pPr marL="0" indent="0">
+              <a:lnSpc>
+                <a:spcPct val="70000"/>
+              </a:lnSpc>
               <a:buFont typeface="Arial" panose="020B0604020202020204" pitchFamily="34" charset="0"/>
               <a:buNone/>
             </a:pPr>
             <a:endParaRPr lang="en-US" sz="2400" dirty="0"/>
           </a:p>
           <a:p>
-            <a:pPr marL="0" indent="0">
+            <a:pPr marL="457200" lvl="1" indent="0">
+              <a:lnSpc>
+                <a:spcPct val="70000"/>
+              </a:lnSpc>
               <a:buFont typeface="Arial" panose="020B0604020202020204" pitchFamily="34" charset="0"/>
               <a:buNone/>
             </a:pPr>
-            <a:endParaRPr lang="en-US" sz="2400" dirty="0"/>
+            <a:endParaRPr lang="en-US" dirty="0"/>
+          </a:p>
+          <a:p>
+            <a:pPr>
+              <a:lnSpc>
+                <a:spcPct val="70000"/>
+              </a:lnSpc>
+            </a:pPr>
+            <a:r>
+              <a:rPr lang="en-US" sz="2400" dirty="0"/>
+              <a:t>Types:</a:t>
+            </a:r>
+          </a:p>
+          <a:p>
+            <a:pPr lvl="1">
+              <a:lnSpc>
+                <a:spcPct val="70000"/>
+              </a:lnSpc>
+            </a:pPr>
+            <a:r>
+              <a:rPr lang="en-US" sz="2000" dirty="0"/>
+              <a:t>0 = echo;</a:t>
+            </a:r>
+          </a:p>
+          <a:p>
+            <a:pPr lvl="1">
+              <a:lnSpc>
+                <a:spcPct val="70000"/>
+              </a:lnSpc>
+            </a:pPr>
+            <a:r>
+              <a:rPr lang="en-US" sz="2000" dirty="0"/>
+              <a:t>8 = echo reply</a:t>
+            </a:r>
           </a:p>
           <a:p>
             <a:pPr marL="0" indent="0">
-              <a:buFont typeface="Arial" panose="020B0604020202020204" pitchFamily="34" charset="0"/>
+              <a:lnSpc>
+                <a:spcPct val="70000"/>
+              </a:lnSpc>
               <a:buNone/>
             </a:pPr>
-            <a:endParaRPr lang="en-US" sz="2400" dirty="0"/>
-          </a:p>
-          <a:p>
-            <a:r>
-              <a:rPr lang="en-US" sz="2400" dirty="0"/>
-              <a:t>Code numbers:</a:t>
-            </a:r>
-          </a:p>
-          <a:p>
-            <a:pPr lvl="1"/>
-            <a:r>
-              <a:rPr lang="en-US" altLang="en-US" dirty="0"/>
-              <a:t>0 = net unreachable; </a:t>
-            </a:r>
-          </a:p>
-          <a:p>
-            <a:pPr lvl="1"/>
-            <a:r>
-              <a:rPr lang="en-US" altLang="en-US" dirty="0"/>
-              <a:t>1 = host unreachable; </a:t>
-            </a:r>
-          </a:p>
-          <a:p>
-            <a:pPr lvl="1"/>
-            <a:r>
-              <a:rPr lang="en-US" altLang="en-US" dirty="0"/>
-              <a:t>2 = protocol unreachable; </a:t>
-            </a:r>
-          </a:p>
-          <a:p>
-            <a:pPr lvl="1"/>
-            <a:r>
-              <a:rPr lang="en-US" altLang="en-US" dirty="0"/>
-              <a:t>3 = port unreachable; </a:t>
-            </a:r>
-          </a:p>
-          <a:p>
-            <a:pPr lvl="1"/>
-            <a:r>
-              <a:rPr lang="en-US" altLang="en-US" dirty="0"/>
-              <a:t>4 = fragmentation needed and DF set; </a:t>
-            </a:r>
-          </a:p>
-          <a:p>
-            <a:pPr lvl="1"/>
-            <a:r>
-              <a:rPr lang="en-US" altLang="en-US" dirty="0"/>
-              <a:t>5 = source route failed.</a:t>
-            </a:r>
+            <a:endParaRPr lang="en-US" dirty="0"/>
           </a:p>
         </p:txBody>
       </p:sp>
@@ -5531,7 +5556,7 @@
           <p:cNvPr id="6" name="Content Placeholder 3">
             <a:extLst>
               <a:ext uri="{FF2B5EF4-FFF2-40B4-BE49-F238E27FC236}">
-                <a16:creationId xmlns:a16="http://schemas.microsoft.com/office/drawing/2014/main" id="{25204249-12E6-4182-A578-16B88125DAD3}"/>
+                <a16:creationId xmlns:a16="http://schemas.microsoft.com/office/drawing/2014/main" xmlns="" id="{25204249-12E6-4182-A578-16B88125DAD3}"/>
               </a:ext>
             </a:extLst>
           </p:cNvPr>
@@ -5542,7 +5567,7 @@
         </p:nvGraphicFramePr>
         <p:xfrm>
           <a:off x="838200" y="2296142"/>
-          <a:ext cx="10515600" cy="1483360"/>
+          <a:ext cx="10515600" cy="1902996"/>
         </p:xfrm>
         <a:graphic>
           <a:graphicData uri="http://schemas.openxmlformats.org/drawingml/2006/table">
@@ -5554,28 +5579,28 @@
                 <a:gridCol w="2628900">
                   <a:extLst>
                     <a:ext uri="{9D8B030D-6E8A-4147-A177-3AD203B41FA5}">
-                      <a16:colId xmlns:a16="http://schemas.microsoft.com/office/drawing/2014/main" val="3470846463"/>
+                      <a16:colId xmlns:a16="http://schemas.microsoft.com/office/drawing/2014/main" xmlns="" val="3470846463"/>
                     </a:ext>
                   </a:extLst>
                 </a:gridCol>
                 <a:gridCol w="2628900">
                   <a:extLst>
                     <a:ext uri="{9D8B030D-6E8A-4147-A177-3AD203B41FA5}">
-                      <a16:colId xmlns:a16="http://schemas.microsoft.com/office/drawing/2014/main" val="3990732175"/>
+                      <a16:colId xmlns:a16="http://schemas.microsoft.com/office/drawing/2014/main" xmlns="" val="3990732175"/>
                     </a:ext>
                   </a:extLst>
                 </a:gridCol>
                 <a:gridCol w="2628900">
                   <a:extLst>
                     <a:ext uri="{9D8B030D-6E8A-4147-A177-3AD203B41FA5}">
-                      <a16:colId xmlns:a16="http://schemas.microsoft.com/office/drawing/2014/main" val="3113442537"/>
+                      <a16:colId xmlns:a16="http://schemas.microsoft.com/office/drawing/2014/main" xmlns="" val="3113442537"/>
                     </a:ext>
                   </a:extLst>
                 </a:gridCol>
                 <a:gridCol w="2628900">
                   <a:extLst>
                     <a:ext uri="{9D8B030D-6E8A-4147-A177-3AD203B41FA5}">
-                      <a16:colId xmlns:a16="http://schemas.microsoft.com/office/drawing/2014/main" val="3734812451"/>
+                      <a16:colId xmlns:a16="http://schemas.microsoft.com/office/drawing/2014/main" xmlns="" val="3734812451"/>
                     </a:ext>
                   </a:extLst>
                 </a:gridCol>
@@ -5639,7 +5664,7 @@
                 </a:tc>
                 <a:extLst>
                   <a:ext uri="{0D108BD9-81ED-4DB2-BD59-A6C34878D82A}">
-                    <a16:rowId xmlns:a16="http://schemas.microsoft.com/office/drawing/2014/main" val="3547791680"/>
+                    <a16:rowId xmlns:a16="http://schemas.microsoft.com/office/drawing/2014/main" xmlns="" val="3547791680"/>
                   </a:ext>
                 </a:extLst>
               </a:tr>
@@ -5656,7 +5681,17 @@
                       </a:r>
                     </a:p>
                   </a:txBody>
-                  <a:tcPr/>
+                  <a:tcPr>
+                    <a:lnR w="12700" cap="flat" cmpd="sng" algn="ctr">
+                      <a:solidFill>
+                        <a:schemeClr val="tx1"/>
+                      </a:solidFill>
+                      <a:prstDash val="solid"/>
+                      <a:round/>
+                      <a:headEnd type="none" w="med" len="med"/>
+                      <a:tailEnd type="none" w="med" len="med"/>
+                    </a:lnR>
+                  </a:tcPr>
                 </a:tc>
                 <a:tc>
                   <a:txBody>
@@ -5670,7 +5705,26 @@
                       </a:r>
                     </a:p>
                   </a:txBody>
-                  <a:tcPr/>
+                  <a:tcPr>
+                    <a:lnL w="12700" cap="flat" cmpd="sng" algn="ctr">
+                      <a:solidFill>
+                        <a:schemeClr val="tx1"/>
+                      </a:solidFill>
+                      <a:prstDash val="solid"/>
+                      <a:round/>
+                      <a:headEnd type="none" w="med" len="med"/>
+                      <a:tailEnd type="none" w="med" len="med"/>
+                    </a:lnL>
+                    <a:lnR w="12700" cap="flat" cmpd="sng" algn="ctr">
+                      <a:solidFill>
+                        <a:schemeClr val="tx1"/>
+                      </a:solidFill>
+                      <a:prstDash val="solid"/>
+                      <a:round/>
+                      <a:headEnd type="none" w="med" len="med"/>
+                      <a:tailEnd type="none" w="med" len="med"/>
+                    </a:lnR>
+                  </a:tcPr>
                 </a:tc>
                 <a:tc gridSpan="2">
                   <a:txBody>
@@ -5684,7 +5738,17 @@
                       </a:r>
                     </a:p>
                   </a:txBody>
-                  <a:tcPr/>
+                  <a:tcPr>
+                    <a:lnL w="12700" cap="flat" cmpd="sng" algn="ctr">
+                      <a:solidFill>
+                        <a:schemeClr val="tx1"/>
+                      </a:solidFill>
+                      <a:prstDash val="solid"/>
+                      <a:round/>
+                      <a:headEnd type="none" w="med" len="med"/>
+                      <a:tailEnd type="none" w="med" len="med"/>
+                    </a:lnL>
+                  </a:tcPr>
                 </a:tc>
                 <a:tc hMerge="1">
                   <a:txBody>
@@ -5698,12 +5762,12 @@
                 </a:tc>
                 <a:extLst>
                   <a:ext uri="{0D108BD9-81ED-4DB2-BD59-A6C34878D82A}">
-                    <a16:rowId xmlns:a16="http://schemas.microsoft.com/office/drawing/2014/main" val="2673285938"/>
+                    <a16:rowId xmlns:a16="http://schemas.microsoft.com/office/drawing/2014/main" xmlns="" val="2673285938"/>
                   </a:ext>
                 </a:extLst>
               </a:tr>
               <a:tr h="370840">
-                <a:tc gridSpan="4">
+                <a:tc gridSpan="2">
                   <a:txBody>
                     <a:bodyPr/>
                     <a:lstStyle/>
@@ -5711,31 +5775,66 @@
                       <a:pPr algn="ctr"/>
                       <a:r>
                         <a:rPr lang="en-US" dirty="0"/>
-                        <a:t>Unused</a:t>
+                        <a:t>Identifier</a:t>
                       </a:r>
                     </a:p>
                   </a:txBody>
-                  <a:tcPr/>
+                  <a:tcPr>
+                    <a:lnR w="12700" cap="flat" cmpd="sng" algn="ctr">
+                      <a:solidFill>
+                        <a:schemeClr val="tx1"/>
+                      </a:solidFill>
+                      <a:prstDash val="solid"/>
+                      <a:round/>
+                      <a:headEnd type="none" w="med" len="med"/>
+                      <a:tailEnd type="none" w="med" len="med"/>
+                    </a:lnR>
+                  </a:tcPr>
                 </a:tc>
                 <a:tc hMerge="1">
                   <a:txBody>
                     <a:bodyPr/>
                     <a:lstStyle/>
                     <a:p>
+                      <a:pPr algn="ctr"/>
                       <a:endParaRPr lang="en-US" dirty="0"/>
                     </a:p>
                   </a:txBody>
-                  <a:tcPr/>
-                </a:tc>
-                <a:tc hMerge="1">
-                  <a:txBody>
-                    <a:bodyPr/>
-                    <a:lstStyle/>
-                    <a:p>
-                      <a:endParaRPr lang="en-US" dirty="0"/>
-                    </a:p>
-                  </a:txBody>
-                  <a:tcPr/>
+                  <a:tcPr>
+                    <a:lnL w="12700" cap="flat" cmpd="sng" algn="ctr">
+                      <a:solidFill>
+                        <a:schemeClr val="tx1"/>
+                      </a:solidFill>
+                      <a:prstDash val="solid"/>
+                      <a:round/>
+                      <a:headEnd type="none" w="med" len="med"/>
+                      <a:tailEnd type="none" w="med" len="med"/>
+                    </a:lnL>
+                  </a:tcPr>
+                </a:tc>
+                <a:tc gridSpan="2">
+                  <a:txBody>
+                    <a:bodyPr/>
+                    <a:lstStyle/>
+                    <a:p>
+                      <a:pPr algn="ctr"/>
+                      <a:r>
+                        <a:rPr lang="en-US" dirty="0"/>
+                        <a:t>Sequence Number</a:t>
+                      </a:r>
+                    </a:p>
+                  </a:txBody>
+                  <a:tcPr>
+                    <a:lnL w="12700" cap="flat" cmpd="sng" algn="ctr">
+                      <a:solidFill>
+                        <a:schemeClr val="tx1"/>
+                      </a:solidFill>
+                      <a:prstDash val="solid"/>
+                      <a:round/>
+                      <a:headEnd type="none" w="med" len="med"/>
+                      <a:tailEnd type="none" w="med" len="med"/>
+                    </a:lnL>
+                  </a:tcPr>
                 </a:tc>
                 <a:tc hMerge="1">
                   <a:txBody>
@@ -5749,11 +5848,11 @@
                 </a:tc>
                 <a:extLst>
                   <a:ext uri="{0D108BD9-81ED-4DB2-BD59-A6C34878D82A}">
-                    <a16:rowId xmlns:a16="http://schemas.microsoft.com/office/drawing/2014/main" val="761915796"/>
+                    <a16:rowId xmlns:a16="http://schemas.microsoft.com/office/drawing/2014/main" xmlns="" val="761915796"/>
                   </a:ext>
                 </a:extLst>
               </a:tr>
-              <a:tr h="370840">
+              <a:tr h="790476">
                 <a:tc gridSpan="4">
                   <a:txBody>
                     <a:bodyPr/>
@@ -5762,11 +5861,11 @@
                       <a:pPr algn="ctr"/>
                       <a:r>
                         <a:rPr lang="en-US" dirty="0"/>
-                        <a:t>Internet Header + 64 bits of Original Data Datagram </a:t>
+                        <a:t>Data…</a:t>
                       </a:r>
                     </a:p>
                   </a:txBody>
-                  <a:tcPr/>
+                  <a:tcPr anchor="ctr"/>
                 </a:tc>
                 <a:tc hMerge="1">
                   <a:txBody>
@@ -5783,10 +5882,21 @@
                     <a:bodyPr/>
                     <a:lstStyle/>
                     <a:p>
+                      <a:pPr algn="ctr"/>
                       <a:endParaRPr lang="en-US" dirty="0"/>
                     </a:p>
                   </a:txBody>
-                  <a:tcPr/>
+                  <a:tcPr>
+                    <a:lnL w="12700" cap="flat" cmpd="sng" algn="ctr">
+                      <a:solidFill>
+                        <a:schemeClr val="tx1"/>
+                      </a:solidFill>
+                      <a:prstDash val="solid"/>
+                      <a:round/>
+                      <a:headEnd type="none" w="med" len="med"/>
+                      <a:tailEnd type="none" w="med" len="med"/>
+                    </a:lnL>
+                  </a:tcPr>
                 </a:tc>
                 <a:tc hMerge="1">
                   <a:txBody>
@@ -5800,7 +5910,7 @@
                 </a:tc>
                 <a:extLst>
                   <a:ext uri="{0D108BD9-81ED-4DB2-BD59-A6C34878D82A}">
-                    <a16:rowId xmlns:a16="http://schemas.microsoft.com/office/drawing/2014/main" val="3849345575"/>
+                    <a16:rowId xmlns:a16="http://schemas.microsoft.com/office/drawing/2014/main" xmlns="" val="3849345575"/>
                   </a:ext>
                 </a:extLst>
               </a:tr>
@@ -5811,7 +5921,7 @@
     </p:spTree>
     <p:extLst>
       <p:ext uri="{BB962C8B-B14F-4D97-AF65-F5344CB8AC3E}">
-        <p14:creationId xmlns:p14="http://schemas.microsoft.com/office/powerpoint/2010/main" val="2315592382"/>
+        <p14:creationId xmlns:p14="http://schemas.microsoft.com/office/powerpoint/2010/main" val="1667191860"/>
       </p:ext>
     </p:extLst>
   </p:cSld>
@@ -5843,7 +5953,7 @@
           <p:cNvPr id="2" name="Title 1">
             <a:extLst>
               <a:ext uri="{FF2B5EF4-FFF2-40B4-BE49-F238E27FC236}">
-                <a16:creationId xmlns:a16="http://schemas.microsoft.com/office/drawing/2014/main" id="{0A2A4053-83BE-448D-8877-DBBA7D7FBA62}"/>
+                <a16:creationId xmlns:a16="http://schemas.microsoft.com/office/drawing/2014/main" xmlns="" id="{0A2A4053-83BE-448D-8877-DBBA7D7FBA62}"/>
               </a:ext>
             </a:extLst>
           </p:cNvPr>
@@ -5861,7 +5971,7 @@
           <a:p>
             <a:r>
               <a:rPr lang="en-US" dirty="0"/>
-              <a:t>Types: 11 – Time Exceeded Message</a:t>
+              <a:t>Types: 3 – Destination Unreachable Message</a:t>
             </a:r>
           </a:p>
         </p:txBody>
@@ -5871,7 +5981,7 @@
           <p:cNvPr id="3" name="Content Placeholder 2">
             <a:extLst>
               <a:ext uri="{FF2B5EF4-FFF2-40B4-BE49-F238E27FC236}">
-                <a16:creationId xmlns:a16="http://schemas.microsoft.com/office/drawing/2014/main" id="{2C05FB4C-A7FE-45D7-A696-BFFC90E02159}"/>
+                <a16:creationId xmlns:a16="http://schemas.microsoft.com/office/drawing/2014/main" xmlns="" id="{2C05FB4C-A7FE-45D7-A696-BFFC90E02159}"/>
               </a:ext>
             </a:extLst>
           </p:cNvPr>
@@ -5890,49 +6000,23 @@
         </p:spPr>
         <p:txBody>
           <a:bodyPr>
-            <a:normAutofit/>
+            <a:normAutofit fontScale="92500" lnSpcReduction="10000"/>
           </a:bodyPr>
           <a:lstStyle/>
           <a:p>
-            <a:pPr>
-              <a:lnSpc>
-                <a:spcPct val="70000"/>
-              </a:lnSpc>
-            </a:pPr>
             <a:r>
               <a:rPr lang="en-US" sz="2400" dirty="0"/>
               <a:t>Packet Format:</a:t>
             </a:r>
           </a:p>
           <a:p>
-            <a:pPr>
-              <a:lnSpc>
-                <a:spcPct val="70000"/>
-              </a:lnSpc>
-            </a:pPr>
             <a:endParaRPr lang="en-US" sz="2400" dirty="0"/>
           </a:p>
           <a:p>
-            <a:pPr>
-              <a:lnSpc>
-                <a:spcPct val="70000"/>
-              </a:lnSpc>
-            </a:pPr>
             <a:endParaRPr lang="en-US" sz="2400" dirty="0"/>
           </a:p>
           <a:p>
-            <a:pPr>
-              <a:lnSpc>
-                <a:spcPct val="70000"/>
-              </a:lnSpc>
-            </a:pPr>
-            <a:endParaRPr lang="en-US" sz="2400" dirty="0"/>
-          </a:p>
-          <a:p>
             <a:pPr marL="0" indent="0">
-              <a:lnSpc>
-                <a:spcPct val="70000"/>
-              </a:lnSpc>
               <a:buFont typeface="Arial" panose="020B0604020202020204" pitchFamily="34" charset="0"/>
               <a:buNone/>
             </a:pPr>
@@ -5940,66 +6024,65 @@
           </a:p>
           <a:p>
             <a:pPr marL="0" indent="0">
-              <a:lnSpc>
-                <a:spcPct val="70000"/>
-              </a:lnSpc>
               <a:buFont typeface="Arial" panose="020B0604020202020204" pitchFamily="34" charset="0"/>
               <a:buNone/>
             </a:pPr>
             <a:endParaRPr lang="en-US" sz="2400" dirty="0"/>
           </a:p>
           <a:p>
-            <a:pPr>
-              <a:lnSpc>
-                <a:spcPct val="70000"/>
-              </a:lnSpc>
+            <a:pPr marL="0" indent="0">
+              <a:buFont typeface="Arial" panose="020B0604020202020204" pitchFamily="34" charset="0"/>
+              <a:buNone/>
             </a:pPr>
+            <a:endParaRPr lang="en-US" sz="2400" dirty="0"/>
+          </a:p>
+          <a:p>
             <a:r>
               <a:rPr lang="en-US" sz="2400" dirty="0"/>
               <a:t>Code numbers:</a:t>
             </a:r>
           </a:p>
           <a:p>
-            <a:pPr lvl="1">
-              <a:lnSpc>
-                <a:spcPct val="70000"/>
-              </a:lnSpc>
-            </a:pPr>
+            <a:pPr lvl="1"/>
             <a:r>
               <a:rPr lang="en-US" altLang="en-US" dirty="0"/>
-              <a:t>0 = time to live exceeded in transit;</a:t>
-            </a:r>
-          </a:p>
-          <a:p>
-            <a:pPr lvl="1">
-              <a:lnSpc>
-                <a:spcPct val="70000"/>
-              </a:lnSpc>
-            </a:pPr>
+              <a:t>0 = net unreachable; </a:t>
+            </a:r>
+          </a:p>
+          <a:p>
+            <a:pPr lvl="1"/>
             <a:r>
               <a:rPr lang="en-US" altLang="en-US" dirty="0"/>
-              <a:t>1 = fragment reassembly time exceeded. </a:t>
-            </a:r>
-            <a:br>
+              <a:t>1 = host unreachable; </a:t>
+            </a:r>
+          </a:p>
+          <a:p>
+            <a:pPr lvl="1"/>
+            <a:r>
               <a:rPr lang="en-US" altLang="en-US" dirty="0"/>
-            </a:br>
-            <a:endParaRPr lang="en-US" altLang="en-US" dirty="0"/>
-          </a:p>
-          <a:p>
-            <a:pPr lvl="1">
-              <a:lnSpc>
-                <a:spcPct val="70000"/>
-              </a:lnSpc>
-            </a:pPr>
-            <a:endParaRPr lang="en-US" dirty="0"/>
-          </a:p>
-          <a:p>
-            <a:pPr lvl="1">
-              <a:lnSpc>
-                <a:spcPct val="70000"/>
-              </a:lnSpc>
-            </a:pPr>
-            <a:endParaRPr lang="en-US" dirty="0"/>
+              <a:t>2 = protocol unreachable; </a:t>
+            </a:r>
+          </a:p>
+          <a:p>
+            <a:pPr lvl="1"/>
+            <a:r>
+              <a:rPr lang="en-US" altLang="en-US" dirty="0"/>
+              <a:t>3 = port unreachable; </a:t>
+            </a:r>
+          </a:p>
+          <a:p>
+            <a:pPr lvl="1"/>
+            <a:r>
+              <a:rPr lang="en-US" altLang="en-US" dirty="0"/>
+              <a:t>4 = fragmentation needed and DF set; </a:t>
+            </a:r>
+          </a:p>
+          <a:p>
+            <a:pPr lvl="1"/>
+            <a:r>
+              <a:rPr lang="en-US" altLang="en-US" dirty="0"/>
+              <a:t>5 = source route failed.</a:t>
+            </a:r>
           </a:p>
         </p:txBody>
       </p:sp>
@@ -6008,7 +6091,7 @@
           <p:cNvPr id="6" name="Content Placeholder 3">
             <a:extLst>
               <a:ext uri="{FF2B5EF4-FFF2-40B4-BE49-F238E27FC236}">
-                <a16:creationId xmlns:a16="http://schemas.microsoft.com/office/drawing/2014/main" id="{25204249-12E6-4182-A578-16B88125DAD3}"/>
+                <a16:creationId xmlns:a16="http://schemas.microsoft.com/office/drawing/2014/main" xmlns="" id="{25204249-12E6-4182-A578-16B88125DAD3}"/>
               </a:ext>
             </a:extLst>
           </p:cNvPr>
@@ -6031,28 +6114,28 @@
                 <a:gridCol w="2628900">
                   <a:extLst>
                     <a:ext uri="{9D8B030D-6E8A-4147-A177-3AD203B41FA5}">
-                      <a16:colId xmlns:a16="http://schemas.microsoft.com/office/drawing/2014/main" val="3470846463"/>
+                      <a16:colId xmlns:a16="http://schemas.microsoft.com/office/drawing/2014/main" xmlns="" val="3470846463"/>
                     </a:ext>
                   </a:extLst>
                 </a:gridCol>
                 <a:gridCol w="2628900">
                   <a:extLst>
                     <a:ext uri="{9D8B030D-6E8A-4147-A177-3AD203B41FA5}">
-                      <a16:colId xmlns:a16="http://schemas.microsoft.com/office/drawing/2014/main" val="3990732175"/>
+                      <a16:colId xmlns:a16="http://schemas.microsoft.com/office/drawing/2014/main" xmlns="" val="3990732175"/>
                     </a:ext>
                   </a:extLst>
                 </a:gridCol>
                 <a:gridCol w="2628900">
                   <a:extLst>
                     <a:ext uri="{9D8B030D-6E8A-4147-A177-3AD203B41FA5}">
-                      <a16:colId xmlns:a16="http://schemas.microsoft.com/office/drawing/2014/main" val="3113442537"/>
+                      <a16:colId xmlns:a16="http://schemas.microsoft.com/office/drawing/2014/main" xmlns="" val="3113442537"/>
                     </a:ext>
                   </a:extLst>
                 </a:gridCol>
                 <a:gridCol w="2628900">
                   <a:extLst>
                     <a:ext uri="{9D8B030D-6E8A-4147-A177-3AD203B41FA5}">
-                      <a16:colId xmlns:a16="http://schemas.microsoft.com/office/drawing/2014/main" val="3734812451"/>
+                      <a16:colId xmlns:a16="http://schemas.microsoft.com/office/drawing/2014/main" xmlns="" val="3734812451"/>
                     </a:ext>
                   </a:extLst>
                 </a:gridCol>
@@ -6116,7 +6199,7 @@
                 </a:tc>
                 <a:extLst>
                   <a:ext uri="{0D108BD9-81ED-4DB2-BD59-A6C34878D82A}">
-                    <a16:rowId xmlns:a16="http://schemas.microsoft.com/office/drawing/2014/main" val="3547791680"/>
+                    <a16:rowId xmlns:a16="http://schemas.microsoft.com/office/drawing/2014/main" xmlns="" val="3547791680"/>
                   </a:ext>
                 </a:extLst>
               </a:tr>
@@ -6175,7 +6258,7 @@
                 </a:tc>
                 <a:extLst>
                   <a:ext uri="{0D108BD9-81ED-4DB2-BD59-A6C34878D82A}">
-                    <a16:rowId xmlns:a16="http://schemas.microsoft.com/office/drawing/2014/main" val="2673285938"/>
+                    <a16:rowId xmlns:a16="http://schemas.microsoft.com/office/drawing/2014/main" xmlns="" val="2673285938"/>
                   </a:ext>
                 </a:extLst>
               </a:tr>
@@ -6226,7 +6309,7 @@
                 </a:tc>
                 <a:extLst>
                   <a:ext uri="{0D108BD9-81ED-4DB2-BD59-A6C34878D82A}">
-                    <a16:rowId xmlns:a16="http://schemas.microsoft.com/office/drawing/2014/main" val="761915796"/>
+                    <a16:rowId xmlns:a16="http://schemas.microsoft.com/office/drawing/2014/main" xmlns="" val="761915796"/>
                   </a:ext>
                 </a:extLst>
               </a:tr>
@@ -6277,7 +6360,7 @@
                 </a:tc>
                 <a:extLst>
                   <a:ext uri="{0D108BD9-81ED-4DB2-BD59-A6C34878D82A}">
-                    <a16:rowId xmlns:a16="http://schemas.microsoft.com/office/drawing/2014/main" val="3849345575"/>
+                    <a16:rowId xmlns:a16="http://schemas.microsoft.com/office/drawing/2014/main" xmlns="" val="3849345575"/>
                   </a:ext>
                 </a:extLst>
               </a:tr>
@@ -6288,7 +6371,7 @@
     </p:spTree>
     <p:extLst>
       <p:ext uri="{BB962C8B-B14F-4D97-AF65-F5344CB8AC3E}">
-        <p14:creationId xmlns:p14="http://schemas.microsoft.com/office/powerpoint/2010/main" val="4261805550"/>
+        <p14:creationId xmlns:p14="http://schemas.microsoft.com/office/powerpoint/2010/main" val="2315592382"/>
       </p:ext>
     </p:extLst>
   </p:cSld>
@@ -6320,7 +6403,7 @@
           <p:cNvPr id="2" name="Title 1">
             <a:extLst>
               <a:ext uri="{FF2B5EF4-FFF2-40B4-BE49-F238E27FC236}">
-                <a16:creationId xmlns:a16="http://schemas.microsoft.com/office/drawing/2014/main" id="{0A2A4053-83BE-448D-8877-DBBA7D7FBA62}"/>
+                <a16:creationId xmlns:a16="http://schemas.microsoft.com/office/drawing/2014/main" xmlns="" id="{0A2A4053-83BE-448D-8877-DBBA7D7FBA62}"/>
               </a:ext>
             </a:extLst>
           </p:cNvPr>
@@ -6338,7 +6421,7 @@
           <a:p>
             <a:r>
               <a:rPr lang="en-US" dirty="0"/>
-              <a:t>Types: 12 – Parameter Problem Message</a:t>
+              <a:t>Types: 4 – Source Quench Message</a:t>
             </a:r>
           </a:p>
         </p:txBody>
@@ -6348,7 +6431,7 @@
           <p:cNvPr id="3" name="Content Placeholder 2">
             <a:extLst>
               <a:ext uri="{FF2B5EF4-FFF2-40B4-BE49-F238E27FC236}">
-                <a16:creationId xmlns:a16="http://schemas.microsoft.com/office/drawing/2014/main" id="{2C05FB4C-A7FE-45D7-A696-BFFC90E02159}"/>
+                <a16:creationId xmlns:a16="http://schemas.microsoft.com/office/drawing/2014/main" xmlns="" id="{2C05FB4C-A7FE-45D7-A696-BFFC90E02159}"/>
               </a:ext>
             </a:extLst>
           </p:cNvPr>
@@ -6416,40 +6499,13 @@
             <a:endParaRPr lang="en-US" sz="2400" dirty="0"/>
           </a:p>
           <a:p>
-            <a:pPr marL="0" indent="0">
+            <a:pPr marL="457200" lvl="1" indent="0">
               <a:lnSpc>
                 <a:spcPct val="70000"/>
               </a:lnSpc>
-              <a:buFont typeface="Arial" panose="020B0604020202020204" pitchFamily="34" charset="0"/>
               <a:buNone/>
             </a:pPr>
-            <a:endParaRPr lang="en-US" sz="2400" dirty="0"/>
-          </a:p>
-          <a:p>
-            <a:pPr>
-              <a:lnSpc>
-                <a:spcPct val="70000"/>
-              </a:lnSpc>
-            </a:pPr>
-            <a:r>
-              <a:rPr lang="en-US" sz="2400" dirty="0"/>
-              <a:t>Code numbers:</a:t>
-            </a:r>
-          </a:p>
-          <a:p>
-            <a:pPr lvl="1">
-              <a:lnSpc>
-                <a:spcPct val="70000"/>
-              </a:lnSpc>
-            </a:pPr>
-            <a:r>
-              <a:rPr lang="en-US" altLang="en-US" dirty="0"/>
-              <a:t>0 = pointer indicates the error.</a:t>
-            </a:r>
-            <a:br>
-              <a:rPr lang="en-US" altLang="en-US" dirty="0"/>
-            </a:br>
-            <a:endParaRPr lang="en-US" altLang="en-US" dirty="0"/>
+            <a:endParaRPr lang="en-US" dirty="0"/>
           </a:p>
           <a:p>
             <a:pPr lvl="1">
@@ -6459,14 +6515,6 @@
             </a:pPr>
             <a:endParaRPr lang="en-US" dirty="0"/>
           </a:p>
-          <a:p>
-            <a:pPr lvl="1">
-              <a:lnSpc>
-                <a:spcPct val="70000"/>
-              </a:lnSpc>
-            </a:pPr>
-            <a:endParaRPr lang="en-US" dirty="0"/>
-          </a:p>
         </p:txBody>
       </p:sp>
       <p:graphicFrame>
@@ -6474,7 +6522,7 @@
           <p:cNvPr id="6" name="Content Placeholder 3">
             <a:extLst>
               <a:ext uri="{FF2B5EF4-FFF2-40B4-BE49-F238E27FC236}">
-                <a16:creationId xmlns:a16="http://schemas.microsoft.com/office/drawing/2014/main" id="{25204249-12E6-4182-A578-16B88125DAD3}"/>
+                <a16:creationId xmlns:a16="http://schemas.microsoft.com/office/drawing/2014/main" xmlns="" id="{25204249-12E6-4182-A578-16B88125DAD3}"/>
               </a:ext>
             </a:extLst>
           </p:cNvPr>
@@ -6497,28 +6545,28 @@
                 <a:gridCol w="2628900">
                   <a:extLst>
                     <a:ext uri="{9D8B030D-6E8A-4147-A177-3AD203B41FA5}">
-                      <a16:colId xmlns:a16="http://schemas.microsoft.com/office/drawing/2014/main" val="3470846463"/>
+                      <a16:colId xmlns:a16="http://schemas.microsoft.com/office/drawing/2014/main" xmlns="" val="3470846463"/>
                     </a:ext>
                   </a:extLst>
                 </a:gridCol>
                 <a:gridCol w="2628900">
                   <a:extLst>
                     <a:ext uri="{9D8B030D-6E8A-4147-A177-3AD203B41FA5}">
-                      <a16:colId xmlns:a16="http://schemas.microsoft.com/office/drawing/2014/main" val="3990732175"/>
+                      <a16:colId xmlns:a16="http://schemas.microsoft.com/office/drawing/2014/main" xmlns="" val="3990732175"/>
                     </a:ext>
                   </a:extLst>
                 </a:gridCol>
                 <a:gridCol w="2628900">
                   <a:extLst>
                     <a:ext uri="{9D8B030D-6E8A-4147-A177-3AD203B41FA5}">
-                      <a16:colId xmlns:a16="http://schemas.microsoft.com/office/drawing/2014/main" val="3113442537"/>
+                      <a16:colId xmlns:a16="http://schemas.microsoft.com/office/drawing/2014/main" xmlns="" val="3113442537"/>
                     </a:ext>
                   </a:extLst>
                 </a:gridCol>
                 <a:gridCol w="2628900">
                   <a:extLst>
                     <a:ext uri="{9D8B030D-6E8A-4147-A177-3AD203B41FA5}">
-                      <a16:colId xmlns:a16="http://schemas.microsoft.com/office/drawing/2014/main" val="3734812451"/>
+                      <a16:colId xmlns:a16="http://schemas.microsoft.com/office/drawing/2014/main" xmlns="" val="3734812451"/>
                     </a:ext>
                   </a:extLst>
                 </a:gridCol>
@@ -6582,7 +6630,7 @@
                 </a:tc>
                 <a:extLst>
                   <a:ext uri="{0D108BD9-81ED-4DB2-BD59-A6C34878D82A}">
-                    <a16:rowId xmlns:a16="http://schemas.microsoft.com/office/drawing/2014/main" val="3547791680"/>
+                    <a16:rowId xmlns:a16="http://schemas.microsoft.com/office/drawing/2014/main" xmlns="" val="3547791680"/>
                   </a:ext>
                 </a:extLst>
               </a:tr>
@@ -6661,36 +6709,12 @@
                 </a:tc>
                 <a:extLst>
                   <a:ext uri="{0D108BD9-81ED-4DB2-BD59-A6C34878D82A}">
-                    <a16:rowId xmlns:a16="http://schemas.microsoft.com/office/drawing/2014/main" val="2673285938"/>
+                    <a16:rowId xmlns:a16="http://schemas.microsoft.com/office/drawing/2014/main" xmlns="" val="2673285938"/>
                   </a:ext>
                 </a:extLst>
               </a:tr>
               <a:tr h="370840">
-                <a:tc>
-                  <a:txBody>
-                    <a:bodyPr/>
-                    <a:lstStyle/>
-                    <a:p>
-                      <a:pPr algn="ctr"/>
-                      <a:r>
-                        <a:rPr lang="en-US" dirty="0"/>
-                        <a:t>Pointer</a:t>
-                      </a:r>
-                    </a:p>
-                  </a:txBody>
-                  <a:tcPr>
-                    <a:lnR w="12700" cap="flat" cmpd="sng" algn="ctr">
-                      <a:solidFill>
-                        <a:schemeClr val="tx1"/>
-                      </a:solidFill>
-                      <a:prstDash val="solid"/>
-                      <a:round/>
-                      <a:headEnd type="none" w="med" len="med"/>
-                      <a:tailEnd type="none" w="med" len="med"/>
-                    </a:lnR>
-                  </a:tcPr>
-                </a:tc>
-                <a:tc gridSpan="3">
+                <a:tc gridSpan="4">
                   <a:txBody>
                     <a:bodyPr/>
                     <a:lstStyle/>
@@ -6700,6 +6724,17 @@
                         <a:rPr lang="en-US" dirty="0"/>
                         <a:t>Unused</a:t>
                       </a:r>
+                    </a:p>
+                  </a:txBody>
+                  <a:tcPr/>
+                </a:tc>
+                <a:tc hMerge="1">
+                  <a:txBody>
+                    <a:bodyPr/>
+                    <a:lstStyle/>
+                    <a:p>
+                      <a:pPr algn="ctr"/>
+                      <a:endParaRPr lang="en-US" dirty="0"/>
                     </a:p>
                   </a:txBody>
                   <a:tcPr>
@@ -6736,7 +6771,7 @@
                 </a:tc>
                 <a:extLst>
                   <a:ext uri="{0D108BD9-81ED-4DB2-BD59-A6C34878D82A}">
-                    <a16:rowId xmlns:a16="http://schemas.microsoft.com/office/drawing/2014/main" val="761915796"/>
+                    <a16:rowId xmlns:a16="http://schemas.microsoft.com/office/drawing/2014/main" xmlns="" val="761915796"/>
                   </a:ext>
                 </a:extLst>
               </a:tr>
@@ -6787,7 +6822,7 @@
                 </a:tc>
                 <a:extLst>
                   <a:ext uri="{0D108BD9-81ED-4DB2-BD59-A6C34878D82A}">
-                    <a16:rowId xmlns:a16="http://schemas.microsoft.com/office/drawing/2014/main" val="3849345575"/>
+                    <a16:rowId xmlns:a16="http://schemas.microsoft.com/office/drawing/2014/main" xmlns="" val="3849345575"/>
                   </a:ext>
                 </a:extLst>
               </a:tr>
@@ -6798,7 +6833,7 @@
     </p:spTree>
     <p:extLst>
       <p:ext uri="{BB962C8B-B14F-4D97-AF65-F5344CB8AC3E}">
-        <p14:creationId xmlns:p14="http://schemas.microsoft.com/office/powerpoint/2010/main" val="472754971"/>
+        <p14:creationId xmlns:p14="http://schemas.microsoft.com/office/powerpoint/2010/main" val="3816912382"/>
       </p:ext>
     </p:extLst>
   </p:cSld>
@@ -6830,7 +6865,7 @@
           <p:cNvPr id="2" name="Title 1">
             <a:extLst>
               <a:ext uri="{FF2B5EF4-FFF2-40B4-BE49-F238E27FC236}">
-                <a16:creationId xmlns:a16="http://schemas.microsoft.com/office/drawing/2014/main" id="{0A2A4053-83BE-448D-8877-DBBA7D7FBA62}"/>
+                <a16:creationId xmlns:a16="http://schemas.microsoft.com/office/drawing/2014/main" xmlns="" id="{0A2A4053-83BE-448D-8877-DBBA7D7FBA62}"/>
               </a:ext>
             </a:extLst>
           </p:cNvPr>
@@ -6848,7 +6883,7 @@
           <a:p>
             <a:r>
               <a:rPr lang="en-US" dirty="0"/>
-              <a:t>Types: 4 – Source Quench Message</a:t>
+              <a:t>Types: 5 – Redirect Message</a:t>
             </a:r>
           </a:p>
         </p:txBody>
@@ -6858,7 +6893,7 @@
           <p:cNvPr id="3" name="Content Placeholder 2">
             <a:extLst>
               <a:ext uri="{FF2B5EF4-FFF2-40B4-BE49-F238E27FC236}">
-                <a16:creationId xmlns:a16="http://schemas.microsoft.com/office/drawing/2014/main" id="{2C05FB4C-A7FE-45D7-A696-BFFC90E02159}"/>
+                <a16:creationId xmlns:a16="http://schemas.microsoft.com/office/drawing/2014/main" xmlns="" id="{2C05FB4C-A7FE-45D7-A696-BFFC90E02159}"/>
               </a:ext>
             </a:extLst>
           </p:cNvPr>
@@ -6930,9 +6965,21 @@
               <a:lnSpc>
                 <a:spcPct val="70000"/>
               </a:lnSpc>
+              <a:buFont typeface="Arial" panose="020B0604020202020204" pitchFamily="34" charset="0"/>
               <a:buNone/>
             </a:pPr>
             <a:endParaRPr lang="en-US" dirty="0"/>
+          </a:p>
+          <a:p>
+            <a:pPr>
+              <a:lnSpc>
+                <a:spcPct val="70000"/>
+              </a:lnSpc>
+            </a:pPr>
+            <a:r>
+              <a:rPr lang="en-US" sz="2400" dirty="0"/>
+              <a:t>Code numbers:</a:t>
+            </a:r>
           </a:p>
           <a:p>
             <a:pPr lvl="1">
@@ -6940,7 +6987,43 @@
                 <a:spcPct val="70000"/>
               </a:lnSpc>
             </a:pPr>
-            <a:endParaRPr lang="en-US" dirty="0"/>
+            <a:r>
+              <a:rPr lang="en-US" dirty="0"/>
+              <a:t>0 = Redirect datagrams for the Network.</a:t>
+            </a:r>
+          </a:p>
+          <a:p>
+            <a:pPr lvl="1">
+              <a:lnSpc>
+                <a:spcPct val="70000"/>
+              </a:lnSpc>
+            </a:pPr>
+            <a:r>
+              <a:rPr lang="en-US" dirty="0"/>
+              <a:t>1 = Redirect datagrams for the Host.</a:t>
+            </a:r>
+          </a:p>
+          <a:p>
+            <a:pPr lvl="1">
+              <a:lnSpc>
+                <a:spcPct val="70000"/>
+              </a:lnSpc>
+            </a:pPr>
+            <a:r>
+              <a:rPr lang="en-US" dirty="0"/>
+              <a:t>2 = Redirect datagrams for the Type of Service and Network.</a:t>
+            </a:r>
+          </a:p>
+          <a:p>
+            <a:pPr lvl="1">
+              <a:lnSpc>
+                <a:spcPct val="70000"/>
+              </a:lnSpc>
+            </a:pPr>
+            <a:r>
+              <a:rPr lang="en-US" dirty="0"/>
+              <a:t>3 = Redirect datagrams for the Type of Service and Host.</a:t>
+            </a:r>
           </a:p>
         </p:txBody>
       </p:sp>
@@ -6949,7 +7032,7 @@
           <p:cNvPr id="6" name="Content Placeholder 3">
             <a:extLst>
               <a:ext uri="{FF2B5EF4-FFF2-40B4-BE49-F238E27FC236}">
-                <a16:creationId xmlns:a16="http://schemas.microsoft.com/office/drawing/2014/main" id="{25204249-12E6-4182-A578-16B88125DAD3}"/>
+                <a16:creationId xmlns:a16="http://schemas.microsoft.com/office/drawing/2014/main" xmlns="" id="{25204249-12E6-4182-A578-16B88125DAD3}"/>
               </a:ext>
             </a:extLst>
           </p:cNvPr>
@@ -6972,28 +7055,28 @@
                 <a:gridCol w="2628900">
                   <a:extLst>
                     <a:ext uri="{9D8B030D-6E8A-4147-A177-3AD203B41FA5}">
-                      <a16:colId xmlns:a16="http://schemas.microsoft.com/office/drawing/2014/main" val="3470846463"/>
+                      <a16:colId xmlns:a16="http://schemas.microsoft.com/office/drawing/2014/main" xmlns="" val="3470846463"/>
                     </a:ext>
                   </a:extLst>
                 </a:gridCol>
                 <a:gridCol w="2628900">
                   <a:extLst>
                     <a:ext uri="{9D8B030D-6E8A-4147-A177-3AD203B41FA5}">
-                      <a16:colId xmlns:a16="http://schemas.microsoft.com/office/drawing/2014/main" val="3990732175"/>
+                      <a16:colId xmlns:a16="http://schemas.microsoft.com/office/drawing/2014/main" xmlns="" val="3990732175"/>
                     </a:ext>
                   </a:extLst>
                 </a:gridCol>
                 <a:gridCol w="2628900">
                   <a:extLst>
                     <a:ext uri="{9D8B030D-6E8A-4147-A177-3AD203B41FA5}">
-                      <a16:colId xmlns:a16="http://schemas.microsoft.com/office/drawing/2014/main" val="3113442537"/>
+                      <a16:colId xmlns:a16="http://schemas.microsoft.com/office/drawing/2014/main" xmlns="" val="3113442537"/>
                     </a:ext>
                   </a:extLst>
                 </a:gridCol>
                 <a:gridCol w="2628900">
                   <a:extLst>
                     <a:ext uri="{9D8B030D-6E8A-4147-A177-3AD203B41FA5}">
-                      <a16:colId xmlns:a16="http://schemas.microsoft.com/office/drawing/2014/main" val="3734812451"/>
+                      <a16:colId xmlns:a16="http://schemas.microsoft.com/office/drawing/2014/main" xmlns="" val="3734812451"/>
                     </a:ext>
                   </a:extLst>
                 </a:gridCol>
@@ -7057,7 +7140,7 @@
                 </a:tc>
                 <a:extLst>
                   <a:ext uri="{0D108BD9-81ED-4DB2-BD59-A6C34878D82A}">
-                    <a16:rowId xmlns:a16="http://schemas.microsoft.com/office/drawing/2014/main" val="3547791680"/>
+                    <a16:rowId xmlns:a16="http://schemas.microsoft.com/office/drawing/2014/main" xmlns="" val="3547791680"/>
                   </a:ext>
                 </a:extLst>
               </a:tr>
@@ -7136,7 +7219,7 @@
                 </a:tc>
                 <a:extLst>
                   <a:ext uri="{0D108BD9-81ED-4DB2-BD59-A6C34878D82A}">
-                    <a16:rowId xmlns:a16="http://schemas.microsoft.com/office/drawing/2014/main" val="2673285938"/>
+                    <a16:rowId xmlns:a16="http://schemas.microsoft.com/office/drawing/2014/main" xmlns="" val="2673285938"/>
                   </a:ext>
                 </a:extLst>
               </a:tr>
@@ -7198,7 +7281,7 @@
                 </a:tc>
                 <a:extLst>
                   <a:ext uri="{0D108BD9-81ED-4DB2-BD59-A6C34878D82A}">
-                    <a16:rowId xmlns:a16="http://schemas.microsoft.com/office/drawing/2014/main" val="761915796"/>
+                    <a16:rowId xmlns:a16="http://schemas.microsoft.com/office/drawing/2014/main" xmlns="" val="761915796"/>
                   </a:ext>
                 </a:extLst>
               </a:tr>
@@ -7249,7 +7332,7 @@
                 </a:tc>
                 <a:extLst>
                   <a:ext uri="{0D108BD9-81ED-4DB2-BD59-A6C34878D82A}">
-                    <a16:rowId xmlns:a16="http://schemas.microsoft.com/office/drawing/2014/main" val="3849345575"/>
+                    <a16:rowId xmlns:a16="http://schemas.microsoft.com/office/drawing/2014/main" xmlns="" val="3849345575"/>
                   </a:ext>
                 </a:extLst>
               </a:tr>
@@ -7260,7 +7343,7 @@
     </p:spTree>
     <p:extLst>
       <p:ext uri="{BB962C8B-B14F-4D97-AF65-F5344CB8AC3E}">
-        <p14:creationId xmlns:p14="http://schemas.microsoft.com/office/powerpoint/2010/main" val="3816912382"/>
+        <p14:creationId xmlns:p14="http://schemas.microsoft.com/office/powerpoint/2010/main" val="547624146"/>
       </p:ext>
     </p:extLst>
   </p:cSld>
@@ -7292,7 +7375,7 @@
           <p:cNvPr id="2" name="Title 1">
             <a:extLst>
               <a:ext uri="{FF2B5EF4-FFF2-40B4-BE49-F238E27FC236}">
-                <a16:creationId xmlns:a16="http://schemas.microsoft.com/office/drawing/2014/main" id="{0A2A4053-83BE-448D-8877-DBBA7D7FBA62}"/>
+                <a16:creationId xmlns:a16="http://schemas.microsoft.com/office/drawing/2014/main" xmlns="" id="{0A2A4053-83BE-448D-8877-DBBA7D7FBA62}"/>
               </a:ext>
             </a:extLst>
           </p:cNvPr>
@@ -7310,7 +7393,7 @@
           <a:p>
             <a:r>
               <a:rPr lang="en-US" dirty="0"/>
-              <a:t>Types: 5 – Redirect Message</a:t>
+              <a:t>Types: 11 – Time Exceeded Message</a:t>
             </a:r>
           </a:p>
         </p:txBody>
@@ -7320,7 +7403,7 @@
           <p:cNvPr id="3" name="Content Placeholder 2">
             <a:extLst>
               <a:ext uri="{FF2B5EF4-FFF2-40B4-BE49-F238E27FC236}">
-                <a16:creationId xmlns:a16="http://schemas.microsoft.com/office/drawing/2014/main" id="{2C05FB4C-A7FE-45D7-A696-BFFC90E02159}"/>
+                <a16:creationId xmlns:a16="http://schemas.microsoft.com/office/drawing/2014/main" xmlns="" id="{2C05FB4C-A7FE-45D7-A696-BFFC90E02159}"/>
               </a:ext>
             </a:extLst>
           </p:cNvPr>
@@ -7388,14 +7471,14 @@
             <a:endParaRPr lang="en-US" sz="2400" dirty="0"/>
           </a:p>
           <a:p>
-            <a:pPr marL="457200" lvl="1" indent="0">
+            <a:pPr marL="0" indent="0">
               <a:lnSpc>
                 <a:spcPct val="70000"/>
               </a:lnSpc>
               <a:buFont typeface="Arial" panose="020B0604020202020204" pitchFamily="34" charset="0"/>
               <a:buNone/>
             </a:pPr>
-            <a:endParaRPr lang="en-US" dirty="0"/>
+            <a:endParaRPr lang="en-US" sz="2400" dirty="0"/>
           </a:p>
           <a:p>
             <a:pPr>
@@ -7415,8 +7498,8 @@
               </a:lnSpc>
             </a:pPr>
             <a:r>
-              <a:rPr lang="en-US" dirty="0"/>
-              <a:t>0 = Redirect datagrams for the Network.</a:t>
+              <a:rPr lang="en-US" altLang="en-US" dirty="0"/>
+              <a:t>0 = time to live exceeded in transit;</a:t>
             </a:r>
           </a:p>
           <a:p>
@@ -7426,9 +7509,13 @@
               </a:lnSpc>
             </a:pPr>
             <a:r>
-              <a:rPr lang="en-US" dirty="0"/>
-              <a:t>1 = Redirect datagrams for the Host.</a:t>
-            </a:r>
+              <a:rPr lang="en-US" altLang="en-US" dirty="0"/>
+              <a:t>1 = fragment reassembly time exceeded. </a:t>
+            </a:r>
+            <a:br>
+              <a:rPr lang="en-US" altLang="en-US" dirty="0"/>
+            </a:br>
+            <a:endParaRPr lang="en-US" altLang="en-US" dirty="0"/>
           </a:p>
           <a:p>
             <a:pPr lvl="1">
@@ -7436,10 +7523,7 @@
                 <a:spcPct val="70000"/>
               </a:lnSpc>
             </a:pPr>
-            <a:r>
-              <a:rPr lang="en-US" dirty="0"/>
-              <a:t>2 = Redirect datagrams for the Type of Service and Network.</a:t>
-            </a:r>
+            <a:endParaRPr lang="en-US" dirty="0"/>
           </a:p>
           <a:p>
             <a:pPr lvl="1">
@@ -7447,10 +7531,7 @@
                 <a:spcPct val="70000"/>
               </a:lnSpc>
             </a:pPr>
-            <a:r>
-              <a:rPr lang="en-US" dirty="0"/>
-              <a:t>3 = Redirect datagrams for the Type of Service and Host.</a:t>
-            </a:r>
+            <a:endParaRPr lang="en-US" dirty="0"/>
           </a:p>
         </p:txBody>
       </p:sp>
@@ -7459,7 +7540,7 @@
           <p:cNvPr id="6" name="Content Placeholder 3">
             <a:extLst>
               <a:ext uri="{FF2B5EF4-FFF2-40B4-BE49-F238E27FC236}">
-                <a16:creationId xmlns:a16="http://schemas.microsoft.com/office/drawing/2014/main" id="{25204249-12E6-4182-A578-16B88125DAD3}"/>
+                <a16:creationId xmlns:a16="http://schemas.microsoft.com/office/drawing/2014/main" xmlns="" id="{25204249-12E6-4182-A578-16B88125DAD3}"/>
               </a:ext>
             </a:extLst>
           </p:cNvPr>
@@ -7482,28 +7563,28 @@
                 <a:gridCol w="2628900">
                   <a:extLst>
                     <a:ext uri="{9D8B030D-6E8A-4147-A177-3AD203B41FA5}">
-                      <a16:colId xmlns:a16="http://schemas.microsoft.com/office/drawing/2014/main" val="3470846463"/>
+                      <a16:colId xmlns:a16="http://schemas.microsoft.com/office/drawing/2014/main" xmlns="" val="3470846463"/>
                     </a:ext>
                   </a:extLst>
                 </a:gridCol>
                 <a:gridCol w="2628900">
                   <a:extLst>
                     <a:ext uri="{9D8B030D-6E8A-4147-A177-3AD203B41FA5}">
-                      <a16:colId xmlns:a16="http://schemas.microsoft.com/office/drawing/2014/main" val="3990732175"/>
+                      <a16:colId xmlns:a16="http://schemas.microsoft.com/office/drawing/2014/main" xmlns="" val="3990732175"/>
                     </a:ext>
                   </a:extLst>
                 </a:gridCol>
                 <a:gridCol w="2628900">
                   <a:extLst>
                     <a:ext uri="{9D8B030D-6E8A-4147-A177-3AD203B41FA5}">
-                      <a16:colId xmlns:a16="http://schemas.microsoft.com/office/drawing/2014/main" val="3113442537"/>
+                      <a16:colId xmlns:a16="http://schemas.microsoft.com/office/drawing/2014/main" xmlns="" val="3113442537"/>
                     </a:ext>
                   </a:extLst>
                 </a:gridCol>
                 <a:gridCol w="2628900">
                   <a:extLst>
                     <a:ext uri="{9D8B030D-6E8A-4147-A177-3AD203B41FA5}">
-                      <a16:colId xmlns:a16="http://schemas.microsoft.com/office/drawing/2014/main" val="3734812451"/>
+                      <a16:colId xmlns:a16="http://schemas.microsoft.com/office/drawing/2014/main" xmlns="" val="3734812451"/>
                     </a:ext>
                   </a:extLst>
                 </a:gridCol>
@@ -7567,7 +7648,7 @@
                 </a:tc>
                 <a:extLst>
                   <a:ext uri="{0D108BD9-81ED-4DB2-BD59-A6C34878D82A}">
-                    <a16:rowId xmlns:a16="http://schemas.microsoft.com/office/drawing/2014/main" val="3547791680"/>
+                    <a16:rowId xmlns:a16="http://schemas.microsoft.com/office/drawing/2014/main" xmlns="" val="3547791680"/>
                   </a:ext>
                 </a:extLst>
               </a:tr>
@@ -7584,17 +7665,7 @@
                       </a:r>
                     </a:p>
                   </a:txBody>
-                  <a:tcPr>
-                    <a:lnR w="12700" cap="flat" cmpd="sng" algn="ctr">
-                      <a:solidFill>
-                        <a:schemeClr val="tx1"/>
-                      </a:solidFill>
-                      <a:prstDash val="solid"/>
-                      <a:round/>
-                      <a:headEnd type="none" w="med" len="med"/>
-                      <a:tailEnd type="none" w="med" len="med"/>
-                    </a:lnR>
-                  </a:tcPr>
+                  <a:tcPr/>
                 </a:tc>
                 <a:tc>
                   <a:txBody>
@@ -7608,17 +7679,7 @@
                       </a:r>
                     </a:p>
                   </a:txBody>
-                  <a:tcPr>
-                    <a:lnL w="12700" cap="flat" cmpd="sng" algn="ctr">
-                      <a:solidFill>
-                        <a:schemeClr val="tx1"/>
-                      </a:solidFill>
-                      <a:prstDash val="solid"/>
-                      <a:round/>
-                      <a:headEnd type="none" w="med" len="med"/>
-                      <a:tailEnd type="none" w="med" len="med"/>
-                    </a:lnL>
-                  </a:tcPr>
+                  <a:tcPr/>
                 </a:tc>
                 <a:tc gridSpan="2">
                   <a:txBody>
@@ -7646,7 +7707,7 @@
                 </a:tc>
                 <a:extLst>
                   <a:ext uri="{0D108BD9-81ED-4DB2-BD59-A6C34878D82A}">
-                    <a16:rowId xmlns:a16="http://schemas.microsoft.com/office/drawing/2014/main" val="2673285938"/>
+                    <a16:rowId xmlns:a16="http://schemas.microsoft.com/office/drawing/2014/main" xmlns="" val="2673285938"/>
                   </a:ext>
                 </a:extLst>
               </a:tr>
@@ -7670,21 +7731,10 @@
                     <a:bodyPr/>
                     <a:lstStyle/>
                     <a:p>
-                      <a:pPr algn="ctr"/>
                       <a:endParaRPr lang="en-US" dirty="0"/>
                     </a:p>
                   </a:txBody>
-                  <a:tcPr>
-                    <a:lnL w="12700" cap="flat" cmpd="sng" algn="ctr">
-                      <a:solidFill>
-                        <a:schemeClr val="tx1"/>
-                      </a:solidFill>
-                      <a:prstDash val="solid"/>
-                      <a:round/>
-                      <a:headEnd type="none" w="med" len="med"/>
-                      <a:tailEnd type="none" w="med" len="med"/>
-                    </a:lnL>
-                  </a:tcPr>
+                  <a:tcPr/>
                 </a:tc>
                 <a:tc hMerge="1">
                   <a:txBody>
@@ -7708,7 +7758,7 @@
                 </a:tc>
                 <a:extLst>
                   <a:ext uri="{0D108BD9-81ED-4DB2-BD59-A6C34878D82A}">
-                    <a16:rowId xmlns:a16="http://schemas.microsoft.com/office/drawing/2014/main" val="761915796"/>
+                    <a16:rowId xmlns:a16="http://schemas.microsoft.com/office/drawing/2014/main" xmlns="" val="761915796"/>
                   </a:ext>
                 </a:extLst>
               </a:tr>
@@ -7759,7 +7809,7 @@
                 </a:tc>
                 <a:extLst>
                   <a:ext uri="{0D108BD9-81ED-4DB2-BD59-A6C34878D82A}">
-                    <a16:rowId xmlns:a16="http://schemas.microsoft.com/office/drawing/2014/main" val="3849345575"/>
+                    <a16:rowId xmlns:a16="http://schemas.microsoft.com/office/drawing/2014/main" xmlns="" val="3849345575"/>
                   </a:ext>
                 </a:extLst>
               </a:tr>
@@ -7770,7 +7820,7 @@
     </p:spTree>
     <p:extLst>
       <p:ext uri="{BB962C8B-B14F-4D97-AF65-F5344CB8AC3E}">
-        <p14:creationId xmlns:p14="http://schemas.microsoft.com/office/powerpoint/2010/main" val="547624146"/>
+        <p14:creationId xmlns:p14="http://schemas.microsoft.com/office/powerpoint/2010/main" val="4261805550"/>
       </p:ext>
     </p:extLst>
   </p:cSld>
@@ -7802,7 +7852,7 @@
           <p:cNvPr id="2" name="Title 1">
             <a:extLst>
               <a:ext uri="{FF2B5EF4-FFF2-40B4-BE49-F238E27FC236}">
-                <a16:creationId xmlns:a16="http://schemas.microsoft.com/office/drawing/2014/main" id="{0A2A4053-83BE-448D-8877-DBBA7D7FBA62}"/>
+                <a16:creationId xmlns:a16="http://schemas.microsoft.com/office/drawing/2014/main" xmlns="" id="{0A2A4053-83BE-448D-8877-DBBA7D7FBA62}"/>
               </a:ext>
             </a:extLst>
           </p:cNvPr>
@@ -7820,7 +7870,7 @@
           <a:p>
             <a:r>
               <a:rPr lang="en-US" dirty="0"/>
-              <a:t>Types: 8/0 – Echo / Echo Reply Message</a:t>
+              <a:t>Types: 12 – Parameter Problem Message</a:t>
             </a:r>
           </a:p>
         </p:txBody>
@@ -7830,7 +7880,7 @@
           <p:cNvPr id="3" name="Content Placeholder 2">
             <a:extLst>
               <a:ext uri="{FF2B5EF4-FFF2-40B4-BE49-F238E27FC236}">
-                <a16:creationId xmlns:a16="http://schemas.microsoft.com/office/drawing/2014/main" id="{2C05FB4C-A7FE-45D7-A696-BFFC90E02159}"/>
+                <a16:creationId xmlns:a16="http://schemas.microsoft.com/office/drawing/2014/main" xmlns="" id="{2C05FB4C-A7FE-45D7-A696-BFFC90E02159}"/>
               </a:ext>
             </a:extLst>
           </p:cNvPr>
@@ -7862,15 +7912,6 @@
               <a:rPr lang="en-US" sz="2400" dirty="0"/>
               <a:t>Packet Format:</a:t>
             </a:r>
-          </a:p>
-          <a:p>
-            <a:pPr marL="0" indent="0">
-              <a:lnSpc>
-                <a:spcPct val="70000"/>
-              </a:lnSpc>
-              <a:buNone/>
-            </a:pPr>
-            <a:endParaRPr lang="en-US" sz="2400" dirty="0"/>
           </a:p>
           <a:p>
             <a:pPr>
@@ -7907,14 +7948,14 @@
             <a:endParaRPr lang="en-US" sz="2400" dirty="0"/>
           </a:p>
           <a:p>
-            <a:pPr marL="457200" lvl="1" indent="0">
+            <a:pPr marL="0" indent="0">
               <a:lnSpc>
                 <a:spcPct val="70000"/>
               </a:lnSpc>
               <a:buFont typeface="Arial" panose="020B0604020202020204" pitchFamily="34" charset="0"/>
               <a:buNone/>
             </a:pPr>
-            <a:endParaRPr lang="en-US" dirty="0"/>
+            <a:endParaRPr lang="en-US" sz="2400" dirty="0"/>
           </a:p>
           <a:p>
             <a:pPr>
@@ -7924,7 +7965,7 @@
             </a:pPr>
             <a:r>
               <a:rPr lang="en-US" sz="2400" dirty="0"/>
-              <a:t>Types:</a:t>
+              <a:t>Code numbers:</a:t>
             </a:r>
           </a:p>
           <a:p>
@@ -7934,9 +7975,13 @@
               </a:lnSpc>
             </a:pPr>
             <a:r>
-              <a:rPr lang="en-US" sz="2000" dirty="0"/>
-              <a:t>0 = echo;</a:t>
-            </a:r>
+              <a:rPr lang="en-US" altLang="en-US" dirty="0"/>
+              <a:t>0 = pointer indicates the error.</a:t>
+            </a:r>
+            <a:br>
+              <a:rPr lang="en-US" altLang="en-US" dirty="0"/>
+            </a:br>
+            <a:endParaRPr lang="en-US" altLang="en-US" dirty="0"/>
           </a:p>
           <a:p>
             <a:pPr lvl="1">
@@ -7944,17 +7989,13 @@
                 <a:spcPct val="70000"/>
               </a:lnSpc>
             </a:pPr>
-            <a:r>
-              <a:rPr lang="en-US" sz="2000" dirty="0"/>
-              <a:t>8 = echo reply</a:t>
-            </a:r>
-          </a:p>
-          <a:p>
-            <a:pPr marL="0" indent="0">
+            <a:endParaRPr lang="en-US" dirty="0"/>
+          </a:p>
+          <a:p>
+            <a:pPr lvl="1">
               <a:lnSpc>
                 <a:spcPct val="70000"/>
               </a:lnSpc>
-              <a:buNone/>
             </a:pPr>
             <a:endParaRPr lang="en-US" dirty="0"/>
           </a:p>
@@ -7965,7 +8006,7 @@
           <p:cNvPr id="6" name="Content Placeholder 3">
             <a:extLst>
               <a:ext uri="{FF2B5EF4-FFF2-40B4-BE49-F238E27FC236}">
-                <a16:creationId xmlns:a16="http://schemas.microsoft.com/office/drawing/2014/main" id="{25204249-12E6-4182-A578-16B88125DAD3}"/>
+                <a16:creationId xmlns:a16="http://schemas.microsoft.com/office/drawing/2014/main" xmlns="" id="{25204249-12E6-4182-A578-16B88125DAD3}"/>
               </a:ext>
             </a:extLst>
           </p:cNvPr>
@@ -7976,7 +8017,7 @@
         </p:nvGraphicFramePr>
         <p:xfrm>
           <a:off x="838200" y="2296142"/>
-          <a:ext cx="10515600" cy="1902996"/>
+          <a:ext cx="10515600" cy="1483360"/>
         </p:xfrm>
         <a:graphic>
           <a:graphicData uri="http://schemas.openxmlformats.org/drawingml/2006/table">
@@ -7988,28 +8029,28 @@
                 <a:gridCol w="2628900">
                   <a:extLst>
                     <a:ext uri="{9D8B030D-6E8A-4147-A177-3AD203B41FA5}">
-                      <a16:colId xmlns:a16="http://schemas.microsoft.com/office/drawing/2014/main" val="3470846463"/>
+                      <a16:colId xmlns:a16="http://schemas.microsoft.com/office/drawing/2014/main" xmlns="" val="3470846463"/>
                     </a:ext>
                   </a:extLst>
                 </a:gridCol>
                 <a:gridCol w="2628900">
                   <a:extLst>
                     <a:ext uri="{9D8B030D-6E8A-4147-A177-3AD203B41FA5}">
-                      <a16:colId xmlns:a16="http://schemas.microsoft.com/office/drawing/2014/main" val="3990732175"/>
+                      <a16:colId xmlns:a16="http://schemas.microsoft.com/office/drawing/2014/main" xmlns="" val="3990732175"/>
                     </a:ext>
                   </a:extLst>
                 </a:gridCol>
                 <a:gridCol w="2628900">
                   <a:extLst>
                     <a:ext uri="{9D8B030D-6E8A-4147-A177-3AD203B41FA5}">
-                      <a16:colId xmlns:a16="http://schemas.microsoft.com/office/drawing/2014/main" val="3113442537"/>
+                      <a16:colId xmlns:a16="http://schemas.microsoft.com/office/drawing/2014/main" xmlns="" val="3113442537"/>
                     </a:ext>
                   </a:extLst>
                 </a:gridCol>
                 <a:gridCol w="2628900">
                   <a:extLst>
                     <a:ext uri="{9D8B030D-6E8A-4147-A177-3AD203B41FA5}">
-                      <a16:colId xmlns:a16="http://schemas.microsoft.com/office/drawing/2014/main" val="3734812451"/>
+                      <a16:colId xmlns:a16="http://schemas.microsoft.com/office/drawing/2014/main" xmlns="" val="3734812451"/>
                     </a:ext>
                   </a:extLst>
                 </a:gridCol>
@@ -8073,7 +8114,7 @@
                 </a:tc>
                 <a:extLst>
                   <a:ext uri="{0D108BD9-81ED-4DB2-BD59-A6C34878D82A}">
-                    <a16:rowId xmlns:a16="http://schemas.microsoft.com/office/drawing/2014/main" val="3547791680"/>
+                    <a16:rowId xmlns:a16="http://schemas.microsoft.com/office/drawing/2014/main" xmlns="" val="3547791680"/>
                   </a:ext>
                 </a:extLst>
               </a:tr>
@@ -8124,6 +8165,52 @@
                       <a:headEnd type="none" w="med" len="med"/>
                       <a:tailEnd type="none" w="med" len="med"/>
                     </a:lnL>
+                  </a:tcPr>
+                </a:tc>
+                <a:tc gridSpan="2">
+                  <a:txBody>
+                    <a:bodyPr/>
+                    <a:lstStyle/>
+                    <a:p>
+                      <a:pPr algn="ctr"/>
+                      <a:r>
+                        <a:rPr lang="en-US" dirty="0"/>
+                        <a:t>Checksum</a:t>
+                      </a:r>
+                    </a:p>
+                  </a:txBody>
+                  <a:tcPr/>
+                </a:tc>
+                <a:tc hMerge="1">
+                  <a:txBody>
+                    <a:bodyPr/>
+                    <a:lstStyle/>
+                    <a:p>
+                      <a:endParaRPr lang="en-US" dirty="0"/>
+                    </a:p>
+                  </a:txBody>
+                  <a:tcPr/>
+                </a:tc>
+                <a:extLst>
+                  <a:ext uri="{0D108BD9-81ED-4DB2-BD59-A6C34878D82A}">
+                    <a16:rowId xmlns:a16="http://schemas.microsoft.com/office/drawing/2014/main" xmlns="" val="2673285938"/>
+                  </a:ext>
+                </a:extLst>
+              </a:tr>
+              <a:tr h="370840">
+                <a:tc>
+                  <a:txBody>
+                    <a:bodyPr/>
+                    <a:lstStyle/>
+                    <a:p>
+                      <a:pPr algn="ctr"/>
+                      <a:r>
+                        <a:rPr lang="en-US" dirty="0"/>
+                        <a:t>Pointer</a:t>
+                      </a:r>
+                    </a:p>
+                  </a:txBody>
+                  <a:tcPr>
                     <a:lnR w="12700" cap="flat" cmpd="sng" algn="ctr">
                       <a:solidFill>
                         <a:schemeClr val="tx1"/>
@@ -8135,7 +8222,7 @@
                     </a:lnR>
                   </a:tcPr>
                 </a:tc>
-                <a:tc gridSpan="2">
+                <a:tc gridSpan="3">
                   <a:txBody>
                     <a:bodyPr/>
                     <a:lstStyle/>
@@ -8143,7 +8230,7 @@
                       <a:pPr algn="ctr"/>
                       <a:r>
                         <a:rPr lang="en-US" dirty="0"/>
-                        <a:t>Checksum</a:t>
+                        <a:t>Unused</a:t>
                       </a:r>
                     </a:p>
                   </a:txBody>
@@ -8169,14 +8256,24 @@
                   </a:txBody>
                   <a:tcPr/>
                 </a:tc>
+                <a:tc hMerge="1">
+                  <a:txBody>
+                    <a:bodyPr/>
+                    <a:lstStyle/>
+                    <a:p>
+                      <a:endParaRPr lang="en-US" dirty="0"/>
+                    </a:p>
+                  </a:txBody>
+                  <a:tcPr/>
+                </a:tc>
                 <a:extLst>
                   <a:ext uri="{0D108BD9-81ED-4DB2-BD59-A6C34878D82A}">
-                    <a16:rowId xmlns:a16="http://schemas.microsoft.com/office/drawing/2014/main" val="2673285938"/>
+                    <a16:rowId xmlns:a16="http://schemas.microsoft.com/office/drawing/2014/main" xmlns="" val="761915796"/>
                   </a:ext>
                 </a:extLst>
               </a:tr>
               <a:tr h="370840">
-                <a:tc gridSpan="2">
+                <a:tc gridSpan="4">
                   <a:txBody>
                     <a:bodyPr/>
                     <a:lstStyle/>
@@ -8184,66 +8281,31 @@
                       <a:pPr algn="ctr"/>
                       <a:r>
                         <a:rPr lang="en-US" dirty="0"/>
-                        <a:t>Identifier</a:t>
+                        <a:t>Internet Header + 64 bits of Original Data Datagram </a:t>
                       </a:r>
                     </a:p>
                   </a:txBody>
-                  <a:tcPr>
-                    <a:lnR w="12700" cap="flat" cmpd="sng" algn="ctr">
-                      <a:solidFill>
-                        <a:schemeClr val="tx1"/>
-                      </a:solidFill>
-                      <a:prstDash val="solid"/>
-                      <a:round/>
-                      <a:headEnd type="none" w="med" len="med"/>
-                      <a:tailEnd type="none" w="med" len="med"/>
-                    </a:lnR>
-                  </a:tcPr>
+                  <a:tcPr/>
                 </a:tc>
                 <a:tc hMerge="1">
                   <a:txBody>
                     <a:bodyPr/>
                     <a:lstStyle/>
                     <a:p>
-                      <a:pPr algn="ctr"/>
                       <a:endParaRPr lang="en-US" dirty="0"/>
                     </a:p>
                   </a:txBody>
-                  <a:tcPr>
-                    <a:lnL w="12700" cap="flat" cmpd="sng" algn="ctr">
-                      <a:solidFill>
-                        <a:schemeClr val="tx1"/>
-                      </a:solidFill>
-                      <a:prstDash val="solid"/>
-                      <a:round/>
-                      <a:headEnd type="none" w="med" len="med"/>
-                      <a:tailEnd type="none" w="med" len="med"/>
-                    </a:lnL>
-                  </a:tcPr>
-                </a:tc>
-                <a:tc gridSpan="2">
-                  <a:txBody>
-                    <a:bodyPr/>
-                    <a:lstStyle/>
-                    <a:p>
-                      <a:pPr algn="ctr"/>
-                      <a:r>
-                        <a:rPr lang="en-US" dirty="0"/>
-                        <a:t>Sequence Number</a:t>
-                      </a:r>
-                    </a:p>
-                  </a:txBody>
-                  <a:tcPr>
-                    <a:lnL w="12700" cap="flat" cmpd="sng" algn="ctr">
-                      <a:solidFill>
-                        <a:schemeClr val="tx1"/>
-                      </a:solidFill>
-                      <a:prstDash val="solid"/>
-                      <a:round/>
-                      <a:headEnd type="none" w="med" len="med"/>
-                      <a:tailEnd type="none" w="med" len="med"/>
-                    </a:lnL>
-                  </a:tcPr>
+                  <a:tcPr/>
+                </a:tc>
+                <a:tc hMerge="1">
+                  <a:txBody>
+                    <a:bodyPr/>
+                    <a:lstStyle/>
+                    <a:p>
+                      <a:endParaRPr lang="en-US" dirty="0"/>
+                    </a:p>
+                  </a:txBody>
+                  <a:tcPr/>
                 </a:tc>
                 <a:tc hMerge="1">
                   <a:txBody>
@@ -8257,69 +8319,7 @@
                 </a:tc>
                 <a:extLst>
                   <a:ext uri="{0D108BD9-81ED-4DB2-BD59-A6C34878D82A}">
-                    <a16:rowId xmlns:a16="http://schemas.microsoft.com/office/drawing/2014/main" val="761915796"/>
-                  </a:ext>
-                </a:extLst>
-              </a:tr>
-              <a:tr h="790476">
-                <a:tc gridSpan="4">
-                  <a:txBody>
-                    <a:bodyPr/>
-                    <a:lstStyle/>
-                    <a:p>
-                      <a:pPr algn="ctr"/>
-                      <a:r>
-                        <a:rPr lang="en-US" dirty="0"/>
-                        <a:t>Data…</a:t>
-                      </a:r>
-                    </a:p>
-                  </a:txBody>
-                  <a:tcPr anchor="ctr"/>
-                </a:tc>
-                <a:tc hMerge="1">
-                  <a:txBody>
-                    <a:bodyPr/>
-                    <a:lstStyle/>
-                    <a:p>
-                      <a:endParaRPr lang="en-US" dirty="0"/>
-                    </a:p>
-                  </a:txBody>
-                  <a:tcPr/>
-                </a:tc>
-                <a:tc hMerge="1">
-                  <a:txBody>
-                    <a:bodyPr/>
-                    <a:lstStyle/>
-                    <a:p>
-                      <a:pPr algn="ctr"/>
-                      <a:endParaRPr lang="en-US" dirty="0"/>
-                    </a:p>
-                  </a:txBody>
-                  <a:tcPr>
-                    <a:lnL w="12700" cap="flat" cmpd="sng" algn="ctr">
-                      <a:solidFill>
-                        <a:schemeClr val="tx1"/>
-                      </a:solidFill>
-                      <a:prstDash val="solid"/>
-                      <a:round/>
-                      <a:headEnd type="none" w="med" len="med"/>
-                      <a:tailEnd type="none" w="med" len="med"/>
-                    </a:lnL>
-                  </a:tcPr>
-                </a:tc>
-                <a:tc hMerge="1">
-                  <a:txBody>
-                    <a:bodyPr/>
-                    <a:lstStyle/>
-                    <a:p>
-                      <a:endParaRPr lang="en-US" dirty="0"/>
-                    </a:p>
-                  </a:txBody>
-                  <a:tcPr/>
-                </a:tc>
-                <a:extLst>
-                  <a:ext uri="{0D108BD9-81ED-4DB2-BD59-A6C34878D82A}">
-                    <a16:rowId xmlns:a16="http://schemas.microsoft.com/office/drawing/2014/main" val="3849345575"/>
+                    <a16:rowId xmlns:a16="http://schemas.microsoft.com/office/drawing/2014/main" xmlns="" val="3849345575"/>
                   </a:ext>
                 </a:extLst>
               </a:tr>
@@ -8330,7 +8330,7 @@
     </p:spTree>
     <p:extLst>
       <p:ext uri="{BB962C8B-B14F-4D97-AF65-F5344CB8AC3E}">
-        <p14:creationId xmlns:p14="http://schemas.microsoft.com/office/powerpoint/2010/main" val="1667191860"/>
+        <p14:creationId xmlns:p14="http://schemas.microsoft.com/office/powerpoint/2010/main" val="472754971"/>
       </p:ext>
     </p:extLst>
   </p:cSld>
@@ -8362,7 +8362,7 @@
           <p:cNvPr id="2" name="Title 1">
             <a:extLst>
               <a:ext uri="{FF2B5EF4-FFF2-40B4-BE49-F238E27FC236}">
-                <a16:creationId xmlns:a16="http://schemas.microsoft.com/office/drawing/2014/main" id="{0A2A4053-83BE-448D-8877-DBBA7D7FBA62}"/>
+                <a16:creationId xmlns:a16="http://schemas.microsoft.com/office/drawing/2014/main" xmlns="" id="{0A2A4053-83BE-448D-8877-DBBA7D7FBA62}"/>
               </a:ext>
             </a:extLst>
           </p:cNvPr>
@@ -8387,14 +8387,14 @@
           <a:p>
             <a:r>
               <a:rPr lang="en-US" dirty="0"/>
-              <a:t>Type: 15 – Information Request Message</a:t>
+              <a:t>Type: 13 – Timestamp Request Message</a:t>
             </a:r>
             <a:br>
               <a:rPr lang="en-US" dirty="0"/>
             </a:br>
             <a:r>
               <a:rPr lang="en-US" dirty="0"/>
-              <a:t>Type: 16 – Information Reply Message</a:t>
+              <a:t>Type: 14 – Timestamp Reply Message</a:t>
             </a:r>
             <a:br>
               <a:rPr lang="en-US" dirty="0"/>
@@ -8408,7 +8408,7 @@
           <p:cNvPr id="3" name="Content Placeholder 2">
             <a:extLst>
               <a:ext uri="{FF2B5EF4-FFF2-40B4-BE49-F238E27FC236}">
-                <a16:creationId xmlns:a16="http://schemas.microsoft.com/office/drawing/2014/main" id="{2C05FB4C-A7FE-45D7-A696-BFFC90E02159}"/>
+                <a16:creationId xmlns:a16="http://schemas.microsoft.com/office/drawing/2014/main" xmlns="" id="{2C05FB4C-A7FE-45D7-A696-BFFC90E02159}"/>
               </a:ext>
             </a:extLst>
           </p:cNvPr>
@@ -8475,6 +8475,36 @@
             </a:pPr>
             <a:endParaRPr lang="en-US" sz="2400" dirty="0"/>
           </a:p>
+          <a:p>
+            <a:pPr marL="0" indent="0">
+              <a:lnSpc>
+                <a:spcPct val="70000"/>
+              </a:lnSpc>
+              <a:buFont typeface="Arial" panose="020B0604020202020204" pitchFamily="34" charset="0"/>
+              <a:buNone/>
+            </a:pPr>
+            <a:endParaRPr lang="en-US" sz="2400" dirty="0"/>
+          </a:p>
+          <a:p>
+            <a:pPr marL="0" indent="0">
+              <a:lnSpc>
+                <a:spcPct val="70000"/>
+              </a:lnSpc>
+              <a:buFont typeface="Arial" panose="020B0604020202020204" pitchFamily="34" charset="0"/>
+              <a:buNone/>
+            </a:pPr>
+            <a:endParaRPr lang="en-US" sz="2400" dirty="0"/>
+          </a:p>
+          <a:p>
+            <a:pPr marL="0" indent="0">
+              <a:lnSpc>
+                <a:spcPct val="70000"/>
+              </a:lnSpc>
+              <a:buFont typeface="Arial" panose="020B0604020202020204" pitchFamily="34" charset="0"/>
+              <a:buNone/>
+            </a:pPr>
+            <a:endParaRPr lang="en-US" sz="2400" dirty="0"/>
+          </a:p>
         </p:txBody>
       </p:sp>
       <p:graphicFrame>
@@ -8482,7 +8512,7 @@
           <p:cNvPr id="6" name="Content Placeholder 3">
             <a:extLst>
               <a:ext uri="{FF2B5EF4-FFF2-40B4-BE49-F238E27FC236}">
-                <a16:creationId xmlns:a16="http://schemas.microsoft.com/office/drawing/2014/main" id="{25204249-12E6-4182-A578-16B88125DAD3}"/>
+                <a16:creationId xmlns:a16="http://schemas.microsoft.com/office/drawing/2014/main" xmlns="" id="{25204249-12E6-4182-A578-16B88125DAD3}"/>
               </a:ext>
             </a:extLst>
           </p:cNvPr>
@@ -8493,7 +8523,7 @@
         </p:nvGraphicFramePr>
         <p:xfrm>
           <a:off x="838200" y="2296142"/>
-          <a:ext cx="10515600" cy="1112520"/>
+          <a:ext cx="10515600" cy="2225040"/>
         </p:xfrm>
         <a:graphic>
           <a:graphicData uri="http://schemas.openxmlformats.org/drawingml/2006/table">
@@ -8505,28 +8535,28 @@
                 <a:gridCol w="2628900">
                   <a:extLst>
                     <a:ext uri="{9D8B030D-6E8A-4147-A177-3AD203B41FA5}">
-                      <a16:colId xmlns:a16="http://schemas.microsoft.com/office/drawing/2014/main" val="3470846463"/>
+                      <a16:colId xmlns:a16="http://schemas.microsoft.com/office/drawing/2014/main" xmlns="" val="3470846463"/>
                     </a:ext>
                   </a:extLst>
                 </a:gridCol>
                 <a:gridCol w="2628900">
                   <a:extLst>
                     <a:ext uri="{9D8B030D-6E8A-4147-A177-3AD203B41FA5}">
-                      <a16:colId xmlns:a16="http://schemas.microsoft.com/office/drawing/2014/main" val="3990732175"/>
+                      <a16:colId xmlns:a16="http://schemas.microsoft.com/office/drawing/2014/main" xmlns="" val="3990732175"/>
                     </a:ext>
                   </a:extLst>
                 </a:gridCol>
                 <a:gridCol w="2628900">
                   <a:extLst>
                     <a:ext uri="{9D8B030D-6E8A-4147-A177-3AD203B41FA5}">
-                      <a16:colId xmlns:a16="http://schemas.microsoft.com/office/drawing/2014/main" val="3113442537"/>
+                      <a16:colId xmlns:a16="http://schemas.microsoft.com/office/drawing/2014/main" xmlns="" val="3113442537"/>
                     </a:ext>
                   </a:extLst>
                 </a:gridCol>
                 <a:gridCol w="2628900">
                   <a:extLst>
                     <a:ext uri="{9D8B030D-6E8A-4147-A177-3AD203B41FA5}">
-                      <a16:colId xmlns:a16="http://schemas.microsoft.com/office/drawing/2014/main" val="3734812451"/>
+                      <a16:colId xmlns:a16="http://schemas.microsoft.com/office/drawing/2014/main" xmlns="" val="3734812451"/>
                     </a:ext>
                   </a:extLst>
                 </a:gridCol>
@@ -8590,7 +8620,7 @@
                 </a:tc>
                 <a:extLst>
                   <a:ext uri="{0D108BD9-81ED-4DB2-BD59-A6C34878D82A}">
-                    <a16:rowId xmlns:a16="http://schemas.microsoft.com/office/drawing/2014/main" val="3547791680"/>
+                    <a16:rowId xmlns:a16="http://schemas.microsoft.com/office/drawing/2014/main" xmlns="" val="3547791680"/>
                   </a:ext>
                 </a:extLst>
               </a:tr>
@@ -8669,7 +8699,7 @@
                 </a:tc>
                 <a:extLst>
                   <a:ext uri="{0D108BD9-81ED-4DB2-BD59-A6C34878D82A}">
-                    <a16:rowId xmlns:a16="http://schemas.microsoft.com/office/drawing/2014/main" val="2673285938"/>
+                    <a16:rowId xmlns:a16="http://schemas.microsoft.com/office/drawing/2014/main" xmlns="" val="2673285938"/>
                   </a:ext>
                 </a:extLst>
               </a:tr>
@@ -8744,7 +8774,193 @@
                 </a:tc>
                 <a:extLst>
                   <a:ext uri="{0D108BD9-81ED-4DB2-BD59-A6C34878D82A}">
-                    <a16:rowId xmlns:a16="http://schemas.microsoft.com/office/drawing/2014/main" val="761915796"/>
+                    <a16:rowId xmlns:a16="http://schemas.microsoft.com/office/drawing/2014/main" xmlns="" val="761915796"/>
+                  </a:ext>
+                </a:extLst>
+              </a:tr>
+              <a:tr h="370840">
+                <a:tc gridSpan="4">
+                  <a:txBody>
+                    <a:bodyPr/>
+                    <a:lstStyle/>
+                    <a:p>
+                      <a:pPr algn="ctr"/>
+                      <a:r>
+                        <a:rPr lang="en-US" dirty="0"/>
+                        <a:t>Originate Timestamp</a:t>
+                      </a:r>
+                    </a:p>
+                  </a:txBody>
+                  <a:tcPr/>
+                </a:tc>
+                <a:tc hMerge="1">
+                  <a:txBody>
+                    <a:bodyPr/>
+                    <a:lstStyle/>
+                    <a:p>
+                      <a:endParaRPr lang="en-US"/>
+                    </a:p>
+                  </a:txBody>
+                  <a:tcPr/>
+                </a:tc>
+                <a:tc hMerge="1">
+                  <a:txBody>
+                    <a:bodyPr/>
+                    <a:lstStyle/>
+                    <a:p>
+                      <a:pPr algn="ctr"/>
+                      <a:endParaRPr lang="en-US" dirty="0"/>
+                    </a:p>
+                  </a:txBody>
+                  <a:tcPr>
+                    <a:lnL w="12700" cap="flat" cmpd="sng" algn="ctr">
+                      <a:solidFill>
+                        <a:schemeClr val="tx1"/>
+                      </a:solidFill>
+                      <a:prstDash val="solid"/>
+                      <a:round/>
+                      <a:headEnd type="none" w="med" len="med"/>
+                      <a:tailEnd type="none" w="med" len="med"/>
+                    </a:lnL>
+                  </a:tcPr>
+                </a:tc>
+                <a:tc hMerge="1">
+                  <a:txBody>
+                    <a:bodyPr/>
+                    <a:lstStyle/>
+                    <a:p>
+                      <a:endParaRPr lang="en-US"/>
+                    </a:p>
+                  </a:txBody>
+                  <a:tcPr/>
+                </a:tc>
+                <a:extLst>
+                  <a:ext uri="{0D108BD9-81ED-4DB2-BD59-A6C34878D82A}">
+                    <a16:rowId xmlns:a16="http://schemas.microsoft.com/office/drawing/2014/main" xmlns="" val="10003"/>
+                  </a:ext>
+                </a:extLst>
+              </a:tr>
+              <a:tr h="370840">
+                <a:tc gridSpan="4">
+                  <a:txBody>
+                    <a:bodyPr/>
+                    <a:lstStyle/>
+                    <a:p>
+                      <a:pPr algn="ctr"/>
+                      <a:r>
+                        <a:rPr lang="en-US" dirty="0"/>
+                        <a:t>Receive Timestamp</a:t>
+                      </a:r>
+                    </a:p>
+                  </a:txBody>
+                  <a:tcPr/>
+                </a:tc>
+                <a:tc hMerge="1">
+                  <a:txBody>
+                    <a:bodyPr/>
+                    <a:lstStyle/>
+                    <a:p>
+                      <a:endParaRPr lang="en-US"/>
+                    </a:p>
+                  </a:txBody>
+                  <a:tcPr/>
+                </a:tc>
+                <a:tc hMerge="1">
+                  <a:txBody>
+                    <a:bodyPr/>
+                    <a:lstStyle/>
+                    <a:p>
+                      <a:pPr algn="ctr"/>
+                      <a:endParaRPr lang="en-US" dirty="0"/>
+                    </a:p>
+                  </a:txBody>
+                  <a:tcPr>
+                    <a:lnL w="12700" cap="flat" cmpd="sng" algn="ctr">
+                      <a:solidFill>
+                        <a:schemeClr val="tx1"/>
+                      </a:solidFill>
+                      <a:prstDash val="solid"/>
+                      <a:round/>
+                      <a:headEnd type="none" w="med" len="med"/>
+                      <a:tailEnd type="none" w="med" len="med"/>
+                    </a:lnL>
+                  </a:tcPr>
+                </a:tc>
+                <a:tc hMerge="1">
+                  <a:txBody>
+                    <a:bodyPr/>
+                    <a:lstStyle/>
+                    <a:p>
+                      <a:endParaRPr lang="en-US"/>
+                    </a:p>
+                  </a:txBody>
+                  <a:tcPr/>
+                </a:tc>
+                <a:extLst>
+                  <a:ext uri="{0D108BD9-81ED-4DB2-BD59-A6C34878D82A}">
+                    <a16:rowId xmlns:a16="http://schemas.microsoft.com/office/drawing/2014/main" xmlns="" val="10004"/>
+                  </a:ext>
+                </a:extLst>
+              </a:tr>
+              <a:tr h="370840">
+                <a:tc gridSpan="4">
+                  <a:txBody>
+                    <a:bodyPr/>
+                    <a:lstStyle/>
+                    <a:p>
+                      <a:pPr algn="ctr"/>
+                      <a:r>
+                        <a:rPr lang="en-US" dirty="0"/>
+                        <a:t>Transmit Timestamp</a:t>
+                      </a:r>
+                    </a:p>
+                  </a:txBody>
+                  <a:tcPr/>
+                </a:tc>
+                <a:tc hMerge="1">
+                  <a:txBody>
+                    <a:bodyPr/>
+                    <a:lstStyle/>
+                    <a:p>
+                      <a:endParaRPr lang="en-US"/>
+                    </a:p>
+                  </a:txBody>
+                  <a:tcPr/>
+                </a:tc>
+                <a:tc hMerge="1">
+                  <a:txBody>
+                    <a:bodyPr/>
+                    <a:lstStyle/>
+                    <a:p>
+                      <a:pPr algn="ctr"/>
+                      <a:endParaRPr lang="en-US" dirty="0"/>
+                    </a:p>
+                  </a:txBody>
+                  <a:tcPr>
+                    <a:lnL w="12700" cap="flat" cmpd="sng" algn="ctr">
+                      <a:solidFill>
+                        <a:schemeClr val="tx1"/>
+                      </a:solidFill>
+                      <a:prstDash val="solid"/>
+                      <a:round/>
+                      <a:headEnd type="none" w="med" len="med"/>
+                      <a:tailEnd type="none" w="med" len="med"/>
+                    </a:lnL>
+                  </a:tcPr>
+                </a:tc>
+                <a:tc hMerge="1">
+                  <a:txBody>
+                    <a:bodyPr/>
+                    <a:lstStyle/>
+                    <a:p>
+                      <a:endParaRPr lang="en-US"/>
+                    </a:p>
+                  </a:txBody>
+                  <a:tcPr/>
+                </a:tc>
+                <a:extLst>
+                  <a:ext uri="{0D108BD9-81ED-4DB2-BD59-A6C34878D82A}">
+                    <a16:rowId xmlns:a16="http://schemas.microsoft.com/office/drawing/2014/main" xmlns="" val="10005"/>
                   </a:ext>
                 </a:extLst>
               </a:tr>
@@ -8755,7 +8971,7 @@
     </p:spTree>
     <p:extLst>
       <p:ext uri="{BB962C8B-B14F-4D97-AF65-F5344CB8AC3E}">
-        <p14:creationId xmlns:p14="http://schemas.microsoft.com/office/powerpoint/2010/main" val="2462303588"/>
+        <p14:creationId xmlns:p14="http://schemas.microsoft.com/office/powerpoint/2010/main" val="3438297116"/>
       </p:ext>
     </p:extLst>
   </p:cSld>
@@ -8787,7 +9003,7 @@
           <p:cNvPr id="2" name="Title 1">
             <a:extLst>
               <a:ext uri="{FF2B5EF4-FFF2-40B4-BE49-F238E27FC236}">
-                <a16:creationId xmlns:a16="http://schemas.microsoft.com/office/drawing/2014/main" id="{0A2A4053-83BE-448D-8877-DBBA7D7FBA62}"/>
+                <a16:creationId xmlns:a16="http://schemas.microsoft.com/office/drawing/2014/main" xmlns="" id="{0A2A4053-83BE-448D-8877-DBBA7D7FBA62}"/>
               </a:ext>
             </a:extLst>
           </p:cNvPr>
@@ -8812,14 +9028,14 @@
           <a:p>
             <a:r>
               <a:rPr lang="en-US" dirty="0"/>
-              <a:t>Type: 13 – Timestamp Request Message</a:t>
+              <a:t>Type: 15 – Information Request Message</a:t>
             </a:r>
             <a:br>
               <a:rPr lang="en-US" dirty="0"/>
             </a:br>
             <a:r>
               <a:rPr lang="en-US" dirty="0"/>
-              <a:t>Type: 14 – Timestamp Reply Message</a:t>
+              <a:t>Type: 16 – Information Reply Message</a:t>
             </a:r>
             <a:br>
               <a:rPr lang="en-US" dirty="0"/>
@@ -8833,7 +9049,7 @@
           <p:cNvPr id="3" name="Content Placeholder 2">
             <a:extLst>
               <a:ext uri="{FF2B5EF4-FFF2-40B4-BE49-F238E27FC236}">
-                <a16:creationId xmlns:a16="http://schemas.microsoft.com/office/drawing/2014/main" id="{2C05FB4C-A7FE-45D7-A696-BFFC90E02159}"/>
+                <a16:creationId xmlns:a16="http://schemas.microsoft.com/office/drawing/2014/main" xmlns="" id="{2C05FB4C-A7FE-45D7-A696-BFFC90E02159}"/>
               </a:ext>
             </a:extLst>
           </p:cNvPr>
@@ -8900,36 +9116,6 @@
             </a:pPr>
             <a:endParaRPr lang="en-US" sz="2400" dirty="0"/>
           </a:p>
-          <a:p>
-            <a:pPr marL="0" indent="0">
-              <a:lnSpc>
-                <a:spcPct val="70000"/>
-              </a:lnSpc>
-              <a:buFont typeface="Arial" panose="020B0604020202020204" pitchFamily="34" charset="0"/>
-              <a:buNone/>
-            </a:pPr>
-            <a:endParaRPr lang="en-US" sz="2400" dirty="0"/>
-          </a:p>
-          <a:p>
-            <a:pPr marL="0" indent="0">
-              <a:lnSpc>
-                <a:spcPct val="70000"/>
-              </a:lnSpc>
-              <a:buFont typeface="Arial" panose="020B0604020202020204" pitchFamily="34" charset="0"/>
-              <a:buNone/>
-            </a:pPr>
-            <a:endParaRPr lang="en-US" sz="2400" dirty="0"/>
-          </a:p>
-          <a:p>
-            <a:pPr marL="0" indent="0">
-              <a:lnSpc>
-                <a:spcPct val="70000"/>
-              </a:lnSpc>
-              <a:buFont typeface="Arial" panose="020B0604020202020204" pitchFamily="34" charset="0"/>
-              <a:buNone/>
-            </a:pPr>
-            <a:endParaRPr lang="en-US" sz="2400" dirty="0"/>
-          </a:p>
         </p:txBody>
       </p:sp>
       <p:graphicFrame>
@@ -8937,7 +9123,7 @@
           <p:cNvPr id="6" name="Content Placeholder 3">
             <a:extLst>
               <a:ext uri="{FF2B5EF4-FFF2-40B4-BE49-F238E27FC236}">
-                <a16:creationId xmlns:a16="http://schemas.microsoft.com/office/drawing/2014/main" id="{25204249-12E6-4182-A578-16B88125DAD3}"/>
+                <a16:creationId xmlns:a16="http://schemas.microsoft.com/office/drawing/2014/main" xmlns="" id="{25204249-12E6-4182-A578-16B88125DAD3}"/>
               </a:ext>
             </a:extLst>
           </p:cNvPr>
@@ -8948,7 +9134,7 @@
         </p:nvGraphicFramePr>
         <p:xfrm>
           <a:off x="838200" y="2296142"/>
-          <a:ext cx="10515600" cy="2225040"/>
+          <a:ext cx="10515600" cy="1112520"/>
         </p:xfrm>
         <a:graphic>
           <a:graphicData uri="http://schemas.openxmlformats.org/drawingml/2006/table">
@@ -8960,28 +9146,28 @@
                 <a:gridCol w="2628900">
                   <a:extLst>
                     <a:ext uri="{9D8B030D-6E8A-4147-A177-3AD203B41FA5}">
-                      <a16:colId xmlns:a16="http://schemas.microsoft.com/office/drawing/2014/main" val="3470846463"/>
+                      <a16:colId xmlns:a16="http://schemas.microsoft.com/office/drawing/2014/main" xmlns="" val="3470846463"/>
                     </a:ext>
                   </a:extLst>
                 </a:gridCol>
                 <a:gridCol w="2628900">
                   <a:extLst>
                     <a:ext uri="{9D8B030D-6E8A-4147-A177-3AD203B41FA5}">
-                      <a16:colId xmlns:a16="http://schemas.microsoft.com/office/drawing/2014/main" val="3990732175"/>
+                      <a16:colId xmlns:a16="http://schemas.microsoft.com/office/drawing/2014/main" xmlns="" val="3990732175"/>
                     </a:ext>
                   </a:extLst>
                 </a:gridCol>
                 <a:gridCol w="2628900">
                   <a:extLst>
                     <a:ext uri="{9D8B030D-6E8A-4147-A177-3AD203B41FA5}">
-                      <a16:colId xmlns:a16="http://schemas.microsoft.com/office/drawing/2014/main" val="3113442537"/>
+                      <a16:colId xmlns:a16="http://schemas.microsoft.com/office/drawing/2014/main" xmlns="" val="3113442537"/>
                     </a:ext>
                   </a:extLst>
                 </a:gridCol>
                 <a:gridCol w="2628900">
                   <a:extLst>
                     <a:ext uri="{9D8B030D-6E8A-4147-A177-3AD203B41FA5}">
-                      <a16:colId xmlns:a16="http://schemas.microsoft.com/office/drawing/2014/main" val="3734812451"/>
+                      <a16:colId xmlns:a16="http://schemas.microsoft.com/office/drawing/2014/main" xmlns="" val="3734812451"/>
                     </a:ext>
                   </a:extLst>
                 </a:gridCol>
@@ -9045,7 +9231,7 @@
                 </a:tc>
                 <a:extLst>
                   <a:ext uri="{0D108BD9-81ED-4DB2-BD59-A6C34878D82A}">
-                    <a16:rowId xmlns:a16="http://schemas.microsoft.com/office/drawing/2014/main" val="3547791680"/>
+                    <a16:rowId xmlns:a16="http://schemas.microsoft.com/office/drawing/2014/main" xmlns="" val="3547791680"/>
                   </a:ext>
                 </a:extLst>
               </a:tr>
@@ -9124,7 +9310,7 @@
                 </a:tc>
                 <a:extLst>
                   <a:ext uri="{0D108BD9-81ED-4DB2-BD59-A6C34878D82A}">
-                    <a16:rowId xmlns:a16="http://schemas.microsoft.com/office/drawing/2014/main" val="2673285938"/>
+                    <a16:rowId xmlns:a16="http://schemas.microsoft.com/office/drawing/2014/main" xmlns="" val="2673285938"/>
                   </a:ext>
                 </a:extLst>
               </a:tr>
@@ -9199,193 +9385,7 @@
                 </a:tc>
                 <a:extLst>
                   <a:ext uri="{0D108BD9-81ED-4DB2-BD59-A6C34878D82A}">
-                    <a16:rowId xmlns:a16="http://schemas.microsoft.com/office/drawing/2014/main" val="761915796"/>
-                  </a:ext>
-                </a:extLst>
-              </a:tr>
-              <a:tr h="370840">
-                <a:tc gridSpan="4">
-                  <a:txBody>
-                    <a:bodyPr/>
-                    <a:lstStyle/>
-                    <a:p>
-                      <a:pPr algn="ctr"/>
-                      <a:r>
-                        <a:rPr lang="en-US" dirty="0"/>
-                        <a:t>Originate Timestamp</a:t>
-                      </a:r>
-                    </a:p>
-                  </a:txBody>
-                  <a:tcPr/>
-                </a:tc>
-                <a:tc hMerge="1">
-                  <a:txBody>
-                    <a:bodyPr/>
-                    <a:lstStyle/>
-                    <a:p>
-                      <a:endParaRPr lang="en-US"/>
-                    </a:p>
-                  </a:txBody>
-                  <a:tcPr/>
-                </a:tc>
-                <a:tc hMerge="1">
-                  <a:txBody>
-                    <a:bodyPr/>
-                    <a:lstStyle/>
-                    <a:p>
-                      <a:pPr algn="ctr"/>
-                      <a:endParaRPr lang="en-US" dirty="0"/>
-                    </a:p>
-                  </a:txBody>
-                  <a:tcPr>
-                    <a:lnL w="12700" cap="flat" cmpd="sng" algn="ctr">
-                      <a:solidFill>
-                        <a:schemeClr val="tx1"/>
-                      </a:solidFill>
-                      <a:prstDash val="solid"/>
-                      <a:round/>
-                      <a:headEnd type="none" w="med" len="med"/>
-                      <a:tailEnd type="none" w="med" len="med"/>
-                    </a:lnL>
-                  </a:tcPr>
-                </a:tc>
-                <a:tc hMerge="1">
-                  <a:txBody>
-                    <a:bodyPr/>
-                    <a:lstStyle/>
-                    <a:p>
-                      <a:endParaRPr lang="en-US"/>
-                    </a:p>
-                  </a:txBody>
-                  <a:tcPr/>
-                </a:tc>
-                <a:extLst>
-                  <a:ext uri="{0D108BD9-81ED-4DB2-BD59-A6C34878D82A}">
-                    <a16:rowId xmlns:a16="http://schemas.microsoft.com/office/drawing/2014/main" val="10003"/>
-                  </a:ext>
-                </a:extLst>
-              </a:tr>
-              <a:tr h="370840">
-                <a:tc gridSpan="4">
-                  <a:txBody>
-                    <a:bodyPr/>
-                    <a:lstStyle/>
-                    <a:p>
-                      <a:pPr algn="ctr"/>
-                      <a:r>
-                        <a:rPr lang="en-US" dirty="0"/>
-                        <a:t>Receive Timestamp</a:t>
-                      </a:r>
-                    </a:p>
-                  </a:txBody>
-                  <a:tcPr/>
-                </a:tc>
-                <a:tc hMerge="1">
-                  <a:txBody>
-                    <a:bodyPr/>
-                    <a:lstStyle/>
-                    <a:p>
-                      <a:endParaRPr lang="en-US"/>
-                    </a:p>
-                  </a:txBody>
-                  <a:tcPr/>
-                </a:tc>
-                <a:tc hMerge="1">
-                  <a:txBody>
-                    <a:bodyPr/>
-                    <a:lstStyle/>
-                    <a:p>
-                      <a:pPr algn="ctr"/>
-                      <a:endParaRPr lang="en-US" dirty="0"/>
-                    </a:p>
-                  </a:txBody>
-                  <a:tcPr>
-                    <a:lnL w="12700" cap="flat" cmpd="sng" algn="ctr">
-                      <a:solidFill>
-                        <a:schemeClr val="tx1"/>
-                      </a:solidFill>
-                      <a:prstDash val="solid"/>
-                      <a:round/>
-                      <a:headEnd type="none" w="med" len="med"/>
-                      <a:tailEnd type="none" w="med" len="med"/>
-                    </a:lnL>
-                  </a:tcPr>
-                </a:tc>
-                <a:tc hMerge="1">
-                  <a:txBody>
-                    <a:bodyPr/>
-                    <a:lstStyle/>
-                    <a:p>
-                      <a:endParaRPr lang="en-US"/>
-                    </a:p>
-                  </a:txBody>
-                  <a:tcPr/>
-                </a:tc>
-                <a:extLst>
-                  <a:ext uri="{0D108BD9-81ED-4DB2-BD59-A6C34878D82A}">
-                    <a16:rowId xmlns:a16="http://schemas.microsoft.com/office/drawing/2014/main" val="10004"/>
-                  </a:ext>
-                </a:extLst>
-              </a:tr>
-              <a:tr h="370840">
-                <a:tc gridSpan="4">
-                  <a:txBody>
-                    <a:bodyPr/>
-                    <a:lstStyle/>
-                    <a:p>
-                      <a:pPr algn="ctr"/>
-                      <a:r>
-                        <a:rPr lang="en-US" dirty="0"/>
-                        <a:t>Transmit Timestamp</a:t>
-                      </a:r>
-                    </a:p>
-                  </a:txBody>
-                  <a:tcPr/>
-                </a:tc>
-                <a:tc hMerge="1">
-                  <a:txBody>
-                    <a:bodyPr/>
-                    <a:lstStyle/>
-                    <a:p>
-                      <a:endParaRPr lang="en-US"/>
-                    </a:p>
-                  </a:txBody>
-                  <a:tcPr/>
-                </a:tc>
-                <a:tc hMerge="1">
-                  <a:txBody>
-                    <a:bodyPr/>
-                    <a:lstStyle/>
-                    <a:p>
-                      <a:pPr algn="ctr"/>
-                      <a:endParaRPr lang="en-US" dirty="0"/>
-                    </a:p>
-                  </a:txBody>
-                  <a:tcPr>
-                    <a:lnL w="12700" cap="flat" cmpd="sng" algn="ctr">
-                      <a:solidFill>
-                        <a:schemeClr val="tx1"/>
-                      </a:solidFill>
-                      <a:prstDash val="solid"/>
-                      <a:round/>
-                      <a:headEnd type="none" w="med" len="med"/>
-                      <a:tailEnd type="none" w="med" len="med"/>
-                    </a:lnL>
-                  </a:tcPr>
-                </a:tc>
-                <a:tc hMerge="1">
-                  <a:txBody>
-                    <a:bodyPr/>
-                    <a:lstStyle/>
-                    <a:p>
-                      <a:endParaRPr lang="en-US"/>
-                    </a:p>
-                  </a:txBody>
-                  <a:tcPr/>
-                </a:tc>
-                <a:extLst>
-                  <a:ext uri="{0D108BD9-81ED-4DB2-BD59-A6C34878D82A}">
-                    <a16:rowId xmlns:a16="http://schemas.microsoft.com/office/drawing/2014/main" val="10005"/>
+                    <a16:rowId xmlns:a16="http://schemas.microsoft.com/office/drawing/2014/main" xmlns="" val="761915796"/>
                   </a:ext>
                 </a:extLst>
               </a:tr>
@@ -9396,7 +9396,7 @@
     </p:spTree>
     <p:extLst>
       <p:ext uri="{BB962C8B-B14F-4D97-AF65-F5344CB8AC3E}">
-        <p14:creationId xmlns:p14="http://schemas.microsoft.com/office/powerpoint/2010/main" val="3438297116"/>
+        <p14:creationId xmlns:p14="http://schemas.microsoft.com/office/powerpoint/2010/main" val="2462303588"/>
       </p:ext>
     </p:extLst>
   </p:cSld>
@@ -9428,7 +9428,7 @@
           <p:cNvPr id="2" name="Title 1">
             <a:extLst>
               <a:ext uri="{FF2B5EF4-FFF2-40B4-BE49-F238E27FC236}">
-                <a16:creationId xmlns:a16="http://schemas.microsoft.com/office/drawing/2014/main" id="{A0B268A8-A72C-4737-84E8-60BF2279B7FD}"/>
+                <a16:creationId xmlns:a16="http://schemas.microsoft.com/office/drawing/2014/main" xmlns="" id="{A0B268A8-A72C-4737-84E8-60BF2279B7FD}"/>
               </a:ext>
             </a:extLst>
           </p:cNvPr>
@@ -9456,7 +9456,7 @@
           <p:cNvPr id="3" name="Content Placeholder 2">
             <a:extLst>
               <a:ext uri="{FF2B5EF4-FFF2-40B4-BE49-F238E27FC236}">
-                <a16:creationId xmlns:a16="http://schemas.microsoft.com/office/drawing/2014/main" id="{B8E511E5-8C11-43E6-BF32-6636DE8670C0}"/>
+                <a16:creationId xmlns:a16="http://schemas.microsoft.com/office/drawing/2014/main" xmlns="" id="{B8E511E5-8C11-43E6-BF32-6636DE8670C0}"/>
               </a:ext>
             </a:extLst>
           </p:cNvPr>
@@ -9531,7 +9531,7 @@
           <p:cNvPr id="2" name="Title 1">
             <a:extLst>
               <a:ext uri="{FF2B5EF4-FFF2-40B4-BE49-F238E27FC236}">
-                <a16:creationId xmlns:a16="http://schemas.microsoft.com/office/drawing/2014/main" id="{970538AF-0C23-45AC-8BCF-0FA6D57069AC}"/>
+                <a16:creationId xmlns:a16="http://schemas.microsoft.com/office/drawing/2014/main" xmlns="" id="{970538AF-0C23-45AC-8BCF-0FA6D57069AC}"/>
               </a:ext>
             </a:extLst>
           </p:cNvPr>
@@ -9559,7 +9559,7 @@
           <p:cNvPr id="3" name="Content Placeholder 2">
             <a:extLst>
               <a:ext uri="{FF2B5EF4-FFF2-40B4-BE49-F238E27FC236}">
-                <a16:creationId xmlns:a16="http://schemas.microsoft.com/office/drawing/2014/main" id="{3D5CC124-2E1C-4EA4-AC37-A22CFC3018BB}"/>
+                <a16:creationId xmlns:a16="http://schemas.microsoft.com/office/drawing/2014/main" xmlns="" id="{3D5CC124-2E1C-4EA4-AC37-A22CFC3018BB}"/>
               </a:ext>
             </a:extLst>
           </p:cNvPr>
@@ -9633,7 +9633,7 @@
           <p:cNvPr id="2" name="Title 1">
             <a:extLst>
               <a:ext uri="{FF2B5EF4-FFF2-40B4-BE49-F238E27FC236}">
-                <a16:creationId xmlns:a16="http://schemas.microsoft.com/office/drawing/2014/main" id="{91A00BFE-4F5D-4B04-914B-F4A4E09628A7}"/>
+                <a16:creationId xmlns:a16="http://schemas.microsoft.com/office/drawing/2014/main" xmlns="" id="{91A00BFE-4F5D-4B04-914B-F4A4E09628A7}"/>
               </a:ext>
             </a:extLst>
           </p:cNvPr>
@@ -9661,7 +9661,7 @@
           <p:cNvPr id="3" name="Content Placeholder 2">
             <a:extLst>
               <a:ext uri="{FF2B5EF4-FFF2-40B4-BE49-F238E27FC236}">
-                <a16:creationId xmlns:a16="http://schemas.microsoft.com/office/drawing/2014/main" id="{2CA22CB7-8649-493F-845E-A30C6D39BD40}"/>
+                <a16:creationId xmlns:a16="http://schemas.microsoft.com/office/drawing/2014/main" xmlns="" id="{2CA22CB7-8649-493F-845E-A30C6D39BD40}"/>
               </a:ext>
             </a:extLst>
           </p:cNvPr>
@@ -9716,7 +9716,7 @@
           <p:cNvPr id="2" name="Title 1">
             <a:extLst>
               <a:ext uri="{FF2B5EF4-FFF2-40B4-BE49-F238E27FC236}">
-                <a16:creationId xmlns:a16="http://schemas.microsoft.com/office/drawing/2014/main" id="{97551541-ABFB-4759-AE01-FA3169BED6F7}"/>
+                <a16:creationId xmlns:a16="http://schemas.microsoft.com/office/drawing/2014/main" xmlns="" id="{97551541-ABFB-4759-AE01-FA3169BED6F7}"/>
               </a:ext>
             </a:extLst>
           </p:cNvPr>
@@ -9744,7 +9744,7 @@
           <p:cNvPr id="3" name="Content Placeholder 2">
             <a:extLst>
               <a:ext uri="{FF2B5EF4-FFF2-40B4-BE49-F238E27FC236}">
-                <a16:creationId xmlns:a16="http://schemas.microsoft.com/office/drawing/2014/main" id="{B0C538DF-22F3-4DF4-9CF3-D9E640470939}"/>
+                <a16:creationId xmlns:a16="http://schemas.microsoft.com/office/drawing/2014/main" xmlns="" id="{B0C538DF-22F3-4DF4-9CF3-D9E640470939}"/>
               </a:ext>
             </a:extLst>
           </p:cNvPr>
@@ -9799,7 +9799,7 @@
           <p:cNvPr id="2" name="Title 1">
             <a:extLst>
               <a:ext uri="{FF2B5EF4-FFF2-40B4-BE49-F238E27FC236}">
-                <a16:creationId xmlns:a16="http://schemas.microsoft.com/office/drawing/2014/main" id="{AE506A4F-0D49-4980-8090-858D92BC6945}"/>
+                <a16:creationId xmlns:a16="http://schemas.microsoft.com/office/drawing/2014/main" xmlns="" id="{AE506A4F-0D49-4980-8090-858D92BC6945}"/>
               </a:ext>
             </a:extLst>
           </p:cNvPr>
@@ -9827,7 +9827,7 @@
           <p:cNvPr id="3" name="Content Placeholder 2">
             <a:extLst>
               <a:ext uri="{FF2B5EF4-FFF2-40B4-BE49-F238E27FC236}">
-                <a16:creationId xmlns:a16="http://schemas.microsoft.com/office/drawing/2014/main" id="{747CEBF4-294E-482B-A1EA-56E3CC9FF4DC}"/>
+                <a16:creationId xmlns:a16="http://schemas.microsoft.com/office/drawing/2014/main" xmlns="" id="{747CEBF4-294E-482B-A1EA-56E3CC9FF4DC}"/>
               </a:ext>
             </a:extLst>
           </p:cNvPr>
@@ -9882,7 +9882,7 @@
           <p:cNvPr id="2" name="Title 1">
             <a:extLst>
               <a:ext uri="{FF2B5EF4-FFF2-40B4-BE49-F238E27FC236}">
-                <a16:creationId xmlns:a16="http://schemas.microsoft.com/office/drawing/2014/main" id="{8AB0FBD8-8A49-435E-8E4F-2E0B4A6134DE}"/>
+                <a16:creationId xmlns:a16="http://schemas.microsoft.com/office/drawing/2014/main" xmlns="" id="{8AB0FBD8-8A49-435E-8E4F-2E0B4A6134DE}"/>
               </a:ext>
             </a:extLst>
           </p:cNvPr>
@@ -9918,7 +9918,7 @@
           <p:cNvPr id="3" name="Content Placeholder 2">
             <a:extLst>
               <a:ext uri="{FF2B5EF4-FFF2-40B4-BE49-F238E27FC236}">
-                <a16:creationId xmlns:a16="http://schemas.microsoft.com/office/drawing/2014/main" id="{BB9D0FD2-9C4D-42FC-9343-0F77A20DFF53}"/>
+                <a16:creationId xmlns:a16="http://schemas.microsoft.com/office/drawing/2014/main" xmlns="" id="{BB9D0FD2-9C4D-42FC-9343-0F77A20DFF53}"/>
               </a:ext>
             </a:extLst>
           </p:cNvPr>
@@ -9973,7 +9973,7 @@
           <p:cNvPr id="2" name="Title 1">
             <a:extLst>
               <a:ext uri="{FF2B5EF4-FFF2-40B4-BE49-F238E27FC236}">
-                <a16:creationId xmlns:a16="http://schemas.microsoft.com/office/drawing/2014/main" id="{BD741483-B11E-445B-82D4-F69120BFE4F4}"/>
+                <a16:creationId xmlns:a16="http://schemas.microsoft.com/office/drawing/2014/main" xmlns="" id="{BD741483-B11E-445B-82D4-F69120BFE4F4}"/>
               </a:ext>
             </a:extLst>
           </p:cNvPr>
@@ -10002,7 +10002,7 @@
           <p:cNvPr id="3" name="Subtitle 2">
             <a:extLst>
               <a:ext uri="{FF2B5EF4-FFF2-40B4-BE49-F238E27FC236}">
-                <a16:creationId xmlns:a16="http://schemas.microsoft.com/office/drawing/2014/main" id="{25543615-085F-4258-A2E2-34551553B4FC}"/>
+                <a16:creationId xmlns:a16="http://schemas.microsoft.com/office/drawing/2014/main" xmlns="" id="{25543615-085F-4258-A2E2-34551553B4FC}"/>
               </a:ext>
             </a:extLst>
           </p:cNvPr>
@@ -10057,7 +10057,7 @@
           <p:cNvPr id="2" name="Title 1">
             <a:extLst>
               <a:ext uri="{FF2B5EF4-FFF2-40B4-BE49-F238E27FC236}">
-                <a16:creationId xmlns:a16="http://schemas.microsoft.com/office/drawing/2014/main" id="{FA4DE641-7FF5-442D-ADF9-35AF23968215}"/>
+                <a16:creationId xmlns:a16="http://schemas.microsoft.com/office/drawing/2014/main" xmlns="" id="{FA4DE641-7FF5-442D-ADF9-35AF23968215}"/>
               </a:ext>
             </a:extLst>
           </p:cNvPr>
@@ -10085,7 +10085,7 @@
           <p:cNvPr id="3" name="Content Placeholder 2">
             <a:extLst>
               <a:ext uri="{FF2B5EF4-FFF2-40B4-BE49-F238E27FC236}">
-                <a16:creationId xmlns:a16="http://schemas.microsoft.com/office/drawing/2014/main" id="{8F0149D8-BF24-4C80-959F-7DF566C80856}"/>
+                <a16:creationId xmlns:a16="http://schemas.microsoft.com/office/drawing/2014/main" xmlns="" id="{8F0149D8-BF24-4C80-959F-7DF566C80856}"/>
               </a:ext>
             </a:extLst>
           </p:cNvPr>
@@ -10143,7 +10143,7 @@
           <p:cNvPr id="2" name="Title 1">
             <a:extLst>
               <a:ext uri="{FF2B5EF4-FFF2-40B4-BE49-F238E27FC236}">
-                <a16:creationId xmlns:a16="http://schemas.microsoft.com/office/drawing/2014/main" id="{BD741483-B11E-445B-82D4-F69120BFE4F4}"/>
+                <a16:creationId xmlns:a16="http://schemas.microsoft.com/office/drawing/2014/main" xmlns="" id="{BD741483-B11E-445B-82D4-F69120BFE4F4}"/>
               </a:ext>
             </a:extLst>
           </p:cNvPr>
@@ -10171,7 +10171,7 @@
           <p:cNvPr id="3" name="Subtitle 2">
             <a:extLst>
               <a:ext uri="{FF2B5EF4-FFF2-40B4-BE49-F238E27FC236}">
-                <a16:creationId xmlns:a16="http://schemas.microsoft.com/office/drawing/2014/main" id="{25543615-085F-4258-A2E2-34551553B4FC}"/>
+                <a16:creationId xmlns:a16="http://schemas.microsoft.com/office/drawing/2014/main" xmlns="" id="{25543615-085F-4258-A2E2-34551553B4FC}"/>
               </a:ext>
             </a:extLst>
           </p:cNvPr>

</xml_diff>

<commit_message>
Some typo fixes + added sections
</commit_message>
<xml_diff>
--- a/raw socket & libpcap & icmp.pptx
+++ b/raw socket & libpcap & icmp.pptx
@@ -30146,7 +30146,7 @@
               <a:t>Injecting a Datagram Using </a:t>
             </a:r>
             <a:r>
-              <a:rPr lang="en-US" sz="5000" kern="1200">
+              <a:rPr lang="en-US" sz="5000" kern="1200" dirty="0" err="1">
                 <a:solidFill>
                   <a:schemeClr val="tx1"/>
                 </a:solidFill>
@@ -30154,7 +30154,7 @@
                 <a:ea typeface="+mj-ea"/>
                 <a:cs typeface="+mj-cs"/>
               </a:rPr>
-              <a:t>Scay</a:t>
+              <a:t>Scapy</a:t>
             </a:r>
             <a:endParaRPr lang="en-US" sz="5000" kern="1200" dirty="0">
               <a:solidFill>
@@ -35773,7 +35773,7 @@
       </p:grpSpPr>
       <p:sp>
         <p:nvSpPr>
-          <p:cNvPr id="9" name="Rectangle 8">
+          <p:cNvPr id="14" name="Rectangle 13">
             <a:extLst>
               <a:ext uri="{FF2B5EF4-FFF2-40B4-BE49-F238E27FC236}">
                 <a16:creationId xmlns:a16="http://schemas.microsoft.com/office/drawing/2014/main" id="{A4AC5506-6312-4701-8D3C-40187889A947}"/>
@@ -35875,7 +35875,7 @@
               <a:t>Back to </a:t>
             </a:r>
             <a:r>
-              <a:rPr lang="en-US" sz="2800" kern="1200" dirty="0" err="1">
+              <a:rPr lang="en-US" sz="2800" kern="1200">
                 <a:solidFill>
                   <a:schemeClr val="bg1"/>
                 </a:solidFill>
@@ -35901,10 +35901,10 @@
       </p:sp>
       <p:pic>
         <p:nvPicPr>
-          <p:cNvPr id="4" name="Content Placeholder 3">
+          <p:cNvPr id="8" name="Content Placeholder 7">
             <a:extLst>
               <a:ext uri="{FF2B5EF4-FFF2-40B4-BE49-F238E27FC236}">
-                <a16:creationId xmlns:a16="http://schemas.microsoft.com/office/drawing/2014/main" id="{095F770E-E80B-4A67-941D-43B56931DD35}"/>
+                <a16:creationId xmlns:a16="http://schemas.microsoft.com/office/drawing/2014/main" id="{54929826-B842-4742-BD78-D1C38CE663D6}"/>
               </a:ext>
             </a:extLst>
           </p:cNvPr>
@@ -35923,8 +35923,8 @@
         </p:blipFill>
         <p:spPr>
           <a:xfrm>
-            <a:off x="1695264" y="1675227"/>
-            <a:ext cx="5753471" cy="4394199"/>
+            <a:off x="1886924" y="1675227"/>
+            <a:ext cx="5370151" cy="4671144"/>
           </a:xfrm>
           <a:prstGeom prst="rect">
             <a:avLst/>

</xml_diff>